<commit_message>
Updated Slides and Trees_Forest_GBoost.ipynb
</commit_message>
<xml_diff>
--- a/Least Squares Presentation.pptx
+++ b/Least Squares Presentation.pptx
@@ -107,8 +107,8 @@
         </p:nvSpPr>
         <p:spPr>
           <a:xfrm>
-            <a:off x="503640" y="301320"/>
-            <a:ext cx="9068040" cy="1261800"/>
+            <a:off x="503640" y="301680"/>
+            <a:ext cx="9069120" cy="1262520"/>
           </a:xfrm>
           <a:prstGeom prst="rect">
             <a:avLst/>
@@ -144,8 +144,8 @@
         </p:nvSpPr>
         <p:spPr>
           <a:xfrm>
-            <a:off x="503640" y="1769040"/>
-            <a:ext cx="9068040" cy="2091600"/>
+            <a:off x="503640" y="1769400"/>
+            <a:ext cx="9069120" cy="2091960"/>
           </a:xfrm>
           <a:prstGeom prst="rect">
             <a:avLst/>
@@ -182,8 +182,8 @@
         </p:nvSpPr>
         <p:spPr>
           <a:xfrm>
-            <a:off x="503640" y="4059720"/>
-            <a:ext cx="9068040" cy="2091600"/>
+            <a:off x="503640" y="4060440"/>
+            <a:ext cx="9069120" cy="2091960"/>
           </a:xfrm>
           <a:prstGeom prst="rect">
             <a:avLst/>
@@ -242,8 +242,8 @@
         </p:nvSpPr>
         <p:spPr>
           <a:xfrm>
-            <a:off x="503640" y="301320"/>
-            <a:ext cx="9068040" cy="1261800"/>
+            <a:off x="503640" y="301680"/>
+            <a:ext cx="9069120" cy="1262520"/>
           </a:xfrm>
           <a:prstGeom prst="rect">
             <a:avLst/>
@@ -279,8 +279,8 @@
         </p:nvSpPr>
         <p:spPr>
           <a:xfrm>
-            <a:off x="503640" y="1769040"/>
-            <a:ext cx="4425120" cy="2091600"/>
+            <a:off x="503640" y="1769400"/>
+            <a:ext cx="4425480" cy="2091960"/>
           </a:xfrm>
           <a:prstGeom prst="rect">
             <a:avLst/>
@@ -317,8 +317,8 @@
         </p:nvSpPr>
         <p:spPr>
           <a:xfrm>
-            <a:off x="5150520" y="1769040"/>
-            <a:ext cx="4425120" cy="2091600"/>
+            <a:off x="5150880" y="1769400"/>
+            <a:ext cx="4425480" cy="2091960"/>
           </a:xfrm>
           <a:prstGeom prst="rect">
             <a:avLst/>
@@ -355,8 +355,8 @@
         </p:nvSpPr>
         <p:spPr>
           <a:xfrm>
-            <a:off x="5150520" y="4059720"/>
-            <a:ext cx="4425120" cy="2091600"/>
+            <a:off x="5150880" y="4060440"/>
+            <a:ext cx="4425480" cy="2091960"/>
           </a:xfrm>
           <a:prstGeom prst="rect">
             <a:avLst/>
@@ -393,8 +393,8 @@
         </p:nvSpPr>
         <p:spPr>
           <a:xfrm>
-            <a:off x="503640" y="4059720"/>
-            <a:ext cx="4425120" cy="2091600"/>
+            <a:off x="503640" y="4060440"/>
+            <a:ext cx="4425480" cy="2091960"/>
           </a:xfrm>
           <a:prstGeom prst="rect">
             <a:avLst/>
@@ -453,8 +453,8 @@
         </p:nvSpPr>
         <p:spPr>
           <a:xfrm>
-            <a:off x="503640" y="301320"/>
-            <a:ext cx="9068040" cy="1261800"/>
+            <a:off x="503640" y="301680"/>
+            <a:ext cx="9069120" cy="1262520"/>
           </a:xfrm>
           <a:prstGeom prst="rect">
             <a:avLst/>
@@ -490,8 +490,8 @@
         </p:nvSpPr>
         <p:spPr>
           <a:xfrm>
-            <a:off x="503640" y="1769040"/>
-            <a:ext cx="2919600" cy="2091600"/>
+            <a:off x="503640" y="1769400"/>
+            <a:ext cx="2919960" cy="2091960"/>
           </a:xfrm>
           <a:prstGeom prst="rect">
             <a:avLst/>
@@ -528,8 +528,8 @@
         </p:nvSpPr>
         <p:spPr>
           <a:xfrm>
-            <a:off x="3569760" y="1769040"/>
-            <a:ext cx="2919600" cy="2091600"/>
+            <a:off x="3570120" y="1769400"/>
+            <a:ext cx="2919960" cy="2091960"/>
           </a:xfrm>
           <a:prstGeom prst="rect">
             <a:avLst/>
@@ -566,8 +566,8 @@
         </p:nvSpPr>
         <p:spPr>
           <a:xfrm>
-            <a:off x="6635520" y="1769040"/>
-            <a:ext cx="2919600" cy="2091600"/>
+            <a:off x="6636240" y="1769400"/>
+            <a:ext cx="2919960" cy="2091960"/>
           </a:xfrm>
           <a:prstGeom prst="rect">
             <a:avLst/>
@@ -604,8 +604,8 @@
         </p:nvSpPr>
         <p:spPr>
           <a:xfrm>
-            <a:off x="6635520" y="4059720"/>
-            <a:ext cx="2919600" cy="2091600"/>
+            <a:off x="6636240" y="4060440"/>
+            <a:ext cx="2919960" cy="2091960"/>
           </a:xfrm>
           <a:prstGeom prst="rect">
             <a:avLst/>
@@ -642,8 +642,8 @@
         </p:nvSpPr>
         <p:spPr>
           <a:xfrm>
-            <a:off x="3569760" y="4059720"/>
-            <a:ext cx="2919600" cy="2091600"/>
+            <a:off x="3570120" y="4060440"/>
+            <a:ext cx="2919960" cy="2091960"/>
           </a:xfrm>
           <a:prstGeom prst="rect">
             <a:avLst/>
@@ -680,8 +680,8 @@
         </p:nvSpPr>
         <p:spPr>
           <a:xfrm>
-            <a:off x="503640" y="4059720"/>
-            <a:ext cx="2919600" cy="2091600"/>
+            <a:off x="503640" y="4060440"/>
+            <a:ext cx="2919960" cy="2091960"/>
           </a:xfrm>
           <a:prstGeom prst="rect">
             <a:avLst/>
@@ -762,8 +762,8 @@
         </p:nvSpPr>
         <p:spPr>
           <a:xfrm>
-            <a:off x="503640" y="301320"/>
-            <a:ext cx="9068040" cy="1261800"/>
+            <a:off x="503640" y="301680"/>
+            <a:ext cx="9069120" cy="1262520"/>
           </a:xfrm>
           <a:prstGeom prst="rect">
             <a:avLst/>
@@ -799,8 +799,8 @@
         </p:nvSpPr>
         <p:spPr>
           <a:xfrm>
-            <a:off x="503640" y="1769040"/>
-            <a:ext cx="9068040" cy="4385160"/>
+            <a:off x="503640" y="1769400"/>
+            <a:ext cx="9069120" cy="4385880"/>
           </a:xfrm>
           <a:prstGeom prst="rect">
             <a:avLst/>
@@ -858,8 +858,8 @@
         </p:nvSpPr>
         <p:spPr>
           <a:xfrm>
-            <a:off x="503640" y="301320"/>
-            <a:ext cx="9068040" cy="1261800"/>
+            <a:off x="503640" y="301680"/>
+            <a:ext cx="9069120" cy="1262520"/>
           </a:xfrm>
           <a:prstGeom prst="rect">
             <a:avLst/>
@@ -895,8 +895,8 @@
         </p:nvSpPr>
         <p:spPr>
           <a:xfrm>
-            <a:off x="503640" y="1769040"/>
-            <a:ext cx="9068040" cy="4385160"/>
+            <a:off x="503640" y="1769400"/>
+            <a:ext cx="9069120" cy="4385880"/>
           </a:xfrm>
           <a:prstGeom prst="rect">
             <a:avLst/>
@@ -955,8 +955,8 @@
         </p:nvSpPr>
         <p:spPr>
           <a:xfrm>
-            <a:off x="503640" y="301320"/>
-            <a:ext cx="9068040" cy="1261800"/>
+            <a:off x="503640" y="301680"/>
+            <a:ext cx="9069120" cy="1262520"/>
           </a:xfrm>
           <a:prstGeom prst="rect">
             <a:avLst/>
@@ -992,8 +992,8 @@
         </p:nvSpPr>
         <p:spPr>
           <a:xfrm>
-            <a:off x="503640" y="1769040"/>
-            <a:ext cx="4425120" cy="4385160"/>
+            <a:off x="503640" y="1769400"/>
+            <a:ext cx="4425480" cy="4385880"/>
           </a:xfrm>
           <a:prstGeom prst="rect">
             <a:avLst/>
@@ -1030,8 +1030,8 @@
         </p:nvSpPr>
         <p:spPr>
           <a:xfrm>
-            <a:off x="5150520" y="1769040"/>
-            <a:ext cx="4425120" cy="4385160"/>
+            <a:off x="5150880" y="1769400"/>
+            <a:ext cx="4425480" cy="4385880"/>
           </a:xfrm>
           <a:prstGeom prst="rect">
             <a:avLst/>
@@ -1090,8 +1090,8 @@
         </p:nvSpPr>
         <p:spPr>
           <a:xfrm>
-            <a:off x="503640" y="301320"/>
-            <a:ext cx="9068040" cy="1261800"/>
+            <a:off x="503640" y="301680"/>
+            <a:ext cx="9069120" cy="1262520"/>
           </a:xfrm>
           <a:prstGeom prst="rect">
             <a:avLst/>
@@ -1149,8 +1149,8 @@
         </p:nvSpPr>
         <p:spPr>
           <a:xfrm>
-            <a:off x="503640" y="301320"/>
-            <a:ext cx="9068040" cy="5850360"/>
+            <a:off x="503640" y="301680"/>
+            <a:ext cx="9069120" cy="5853600"/>
           </a:xfrm>
           <a:prstGeom prst="rect">
             <a:avLst/>
@@ -1208,8 +1208,8 @@
         </p:nvSpPr>
         <p:spPr>
           <a:xfrm>
-            <a:off x="503640" y="301320"/>
-            <a:ext cx="9068040" cy="1261800"/>
+            <a:off x="503640" y="301680"/>
+            <a:ext cx="9069120" cy="1262520"/>
           </a:xfrm>
           <a:prstGeom prst="rect">
             <a:avLst/>
@@ -1245,8 +1245,8 @@
         </p:nvSpPr>
         <p:spPr>
           <a:xfrm>
-            <a:off x="503640" y="1769040"/>
-            <a:ext cx="4425120" cy="2091600"/>
+            <a:off x="503640" y="1769400"/>
+            <a:ext cx="4425480" cy="2091960"/>
           </a:xfrm>
           <a:prstGeom prst="rect">
             <a:avLst/>
@@ -1283,8 +1283,8 @@
         </p:nvSpPr>
         <p:spPr>
           <a:xfrm>
-            <a:off x="503640" y="4059720"/>
-            <a:ext cx="4425120" cy="2091600"/>
+            <a:off x="503640" y="4060440"/>
+            <a:ext cx="4425480" cy="2091960"/>
           </a:xfrm>
           <a:prstGeom prst="rect">
             <a:avLst/>
@@ -1321,8 +1321,8 @@
         </p:nvSpPr>
         <p:spPr>
           <a:xfrm>
-            <a:off x="5150520" y="1769040"/>
-            <a:ext cx="4425120" cy="4385160"/>
+            <a:off x="5150880" y="1769400"/>
+            <a:ext cx="4425480" cy="4385880"/>
           </a:xfrm>
           <a:prstGeom prst="rect">
             <a:avLst/>
@@ -1381,8 +1381,8 @@
         </p:nvSpPr>
         <p:spPr>
           <a:xfrm>
-            <a:off x="503640" y="301320"/>
-            <a:ext cx="9068040" cy="1261800"/>
+            <a:off x="503640" y="301680"/>
+            <a:ext cx="9069120" cy="1262520"/>
           </a:xfrm>
           <a:prstGeom prst="rect">
             <a:avLst/>
@@ -1418,8 +1418,8 @@
         </p:nvSpPr>
         <p:spPr>
           <a:xfrm>
-            <a:off x="503640" y="1769040"/>
-            <a:ext cx="9068040" cy="4385160"/>
+            <a:off x="503640" y="1769400"/>
+            <a:ext cx="9069120" cy="4385880"/>
           </a:xfrm>
           <a:prstGeom prst="rect">
             <a:avLst/>
@@ -1477,8 +1477,8 @@
         </p:nvSpPr>
         <p:spPr>
           <a:xfrm>
-            <a:off x="503640" y="301320"/>
-            <a:ext cx="9068040" cy="1261800"/>
+            <a:off x="503640" y="301680"/>
+            <a:ext cx="9069120" cy="1262520"/>
           </a:xfrm>
           <a:prstGeom prst="rect">
             <a:avLst/>
@@ -1514,8 +1514,8 @@
         </p:nvSpPr>
         <p:spPr>
           <a:xfrm>
-            <a:off x="503640" y="1769040"/>
-            <a:ext cx="4425120" cy="4385160"/>
+            <a:off x="503640" y="1769400"/>
+            <a:ext cx="4425480" cy="4385880"/>
           </a:xfrm>
           <a:prstGeom prst="rect">
             <a:avLst/>
@@ -1552,8 +1552,8 @@
         </p:nvSpPr>
         <p:spPr>
           <a:xfrm>
-            <a:off x="5150520" y="1769040"/>
-            <a:ext cx="4425120" cy="2091600"/>
+            <a:off x="5150880" y="1769400"/>
+            <a:ext cx="4425480" cy="2091960"/>
           </a:xfrm>
           <a:prstGeom prst="rect">
             <a:avLst/>
@@ -1590,8 +1590,8 @@
         </p:nvSpPr>
         <p:spPr>
           <a:xfrm>
-            <a:off x="5150520" y="4059720"/>
-            <a:ext cx="4425120" cy="2091600"/>
+            <a:off x="5150880" y="4060440"/>
+            <a:ext cx="4425480" cy="2091960"/>
           </a:xfrm>
           <a:prstGeom prst="rect">
             <a:avLst/>
@@ -1650,8 +1650,8 @@
         </p:nvSpPr>
         <p:spPr>
           <a:xfrm>
-            <a:off x="503640" y="301320"/>
-            <a:ext cx="9068040" cy="1261800"/>
+            <a:off x="503640" y="301680"/>
+            <a:ext cx="9069120" cy="1262520"/>
           </a:xfrm>
           <a:prstGeom prst="rect">
             <a:avLst/>
@@ -1687,8 +1687,8 @@
         </p:nvSpPr>
         <p:spPr>
           <a:xfrm>
-            <a:off x="503640" y="1769040"/>
-            <a:ext cx="4425120" cy="2091600"/>
+            <a:off x="503640" y="1769400"/>
+            <a:ext cx="4425480" cy="2091960"/>
           </a:xfrm>
           <a:prstGeom prst="rect">
             <a:avLst/>
@@ -1725,8 +1725,8 @@
         </p:nvSpPr>
         <p:spPr>
           <a:xfrm>
-            <a:off x="5150520" y="1769040"/>
-            <a:ext cx="4425120" cy="2091600"/>
+            <a:off x="5150880" y="1769400"/>
+            <a:ext cx="4425480" cy="2091960"/>
           </a:xfrm>
           <a:prstGeom prst="rect">
             <a:avLst/>
@@ -1763,8 +1763,8 @@
         </p:nvSpPr>
         <p:spPr>
           <a:xfrm>
-            <a:off x="503640" y="4059720"/>
-            <a:ext cx="9068040" cy="2091600"/>
+            <a:off x="503640" y="4060440"/>
+            <a:ext cx="9069120" cy="2091960"/>
           </a:xfrm>
           <a:prstGeom prst="rect">
             <a:avLst/>
@@ -1823,8 +1823,8 @@
         </p:nvSpPr>
         <p:spPr>
           <a:xfrm>
-            <a:off x="503640" y="301320"/>
-            <a:ext cx="9068040" cy="1261800"/>
+            <a:off x="503640" y="301680"/>
+            <a:ext cx="9069120" cy="1262520"/>
           </a:xfrm>
           <a:prstGeom prst="rect">
             <a:avLst/>
@@ -1860,8 +1860,8 @@
         </p:nvSpPr>
         <p:spPr>
           <a:xfrm>
-            <a:off x="503640" y="1769040"/>
-            <a:ext cx="9068040" cy="2091600"/>
+            <a:off x="503640" y="1769400"/>
+            <a:ext cx="9069120" cy="2091960"/>
           </a:xfrm>
           <a:prstGeom prst="rect">
             <a:avLst/>
@@ -1898,8 +1898,8 @@
         </p:nvSpPr>
         <p:spPr>
           <a:xfrm>
-            <a:off x="503640" y="4059720"/>
-            <a:ext cx="9068040" cy="2091600"/>
+            <a:off x="503640" y="4060440"/>
+            <a:ext cx="9069120" cy="2091960"/>
           </a:xfrm>
           <a:prstGeom prst="rect">
             <a:avLst/>
@@ -1958,8 +1958,8 @@
         </p:nvSpPr>
         <p:spPr>
           <a:xfrm>
-            <a:off x="503640" y="301320"/>
-            <a:ext cx="9068040" cy="1261800"/>
+            <a:off x="503640" y="301680"/>
+            <a:ext cx="9069120" cy="1262520"/>
           </a:xfrm>
           <a:prstGeom prst="rect">
             <a:avLst/>
@@ -1995,8 +1995,8 @@
         </p:nvSpPr>
         <p:spPr>
           <a:xfrm>
-            <a:off x="503640" y="1769040"/>
-            <a:ext cx="4425120" cy="2091600"/>
+            <a:off x="503640" y="1769400"/>
+            <a:ext cx="4425480" cy="2091960"/>
           </a:xfrm>
           <a:prstGeom prst="rect">
             <a:avLst/>
@@ -2033,8 +2033,8 @@
         </p:nvSpPr>
         <p:spPr>
           <a:xfrm>
-            <a:off x="5150520" y="1769040"/>
-            <a:ext cx="4425120" cy="2091600"/>
+            <a:off x="5150880" y="1769400"/>
+            <a:ext cx="4425480" cy="2091960"/>
           </a:xfrm>
           <a:prstGeom prst="rect">
             <a:avLst/>
@@ -2071,8 +2071,8 @@
         </p:nvSpPr>
         <p:spPr>
           <a:xfrm>
-            <a:off x="5150520" y="4059720"/>
-            <a:ext cx="4425120" cy="2091600"/>
+            <a:off x="5150880" y="4060440"/>
+            <a:ext cx="4425480" cy="2091960"/>
           </a:xfrm>
           <a:prstGeom prst="rect">
             <a:avLst/>
@@ -2109,8 +2109,8 @@
         </p:nvSpPr>
         <p:spPr>
           <a:xfrm>
-            <a:off x="503640" y="4059720"/>
-            <a:ext cx="4425120" cy="2091600"/>
+            <a:off x="503640" y="4060440"/>
+            <a:ext cx="4425480" cy="2091960"/>
           </a:xfrm>
           <a:prstGeom prst="rect">
             <a:avLst/>
@@ -2169,8 +2169,8 @@
         </p:nvSpPr>
         <p:spPr>
           <a:xfrm>
-            <a:off x="503640" y="301320"/>
-            <a:ext cx="9068040" cy="1261800"/>
+            <a:off x="503640" y="301680"/>
+            <a:ext cx="9069120" cy="1262520"/>
           </a:xfrm>
           <a:prstGeom prst="rect">
             <a:avLst/>
@@ -2206,8 +2206,8 @@
         </p:nvSpPr>
         <p:spPr>
           <a:xfrm>
-            <a:off x="503640" y="1769040"/>
-            <a:ext cx="2919600" cy="2091600"/>
+            <a:off x="503640" y="1769400"/>
+            <a:ext cx="2919960" cy="2091960"/>
           </a:xfrm>
           <a:prstGeom prst="rect">
             <a:avLst/>
@@ -2244,8 +2244,8 @@
         </p:nvSpPr>
         <p:spPr>
           <a:xfrm>
-            <a:off x="3569760" y="1769040"/>
-            <a:ext cx="2919600" cy="2091600"/>
+            <a:off x="3570120" y="1769400"/>
+            <a:ext cx="2919960" cy="2091960"/>
           </a:xfrm>
           <a:prstGeom prst="rect">
             <a:avLst/>
@@ -2282,8 +2282,8 @@
         </p:nvSpPr>
         <p:spPr>
           <a:xfrm>
-            <a:off x="6635520" y="1769040"/>
-            <a:ext cx="2919600" cy="2091600"/>
+            <a:off x="6636240" y="1769400"/>
+            <a:ext cx="2919960" cy="2091960"/>
           </a:xfrm>
           <a:prstGeom prst="rect">
             <a:avLst/>
@@ -2320,8 +2320,8 @@
         </p:nvSpPr>
         <p:spPr>
           <a:xfrm>
-            <a:off x="6635520" y="4059720"/>
-            <a:ext cx="2919600" cy="2091600"/>
+            <a:off x="6636240" y="4060440"/>
+            <a:ext cx="2919960" cy="2091960"/>
           </a:xfrm>
           <a:prstGeom prst="rect">
             <a:avLst/>
@@ -2358,8 +2358,8 @@
         </p:nvSpPr>
         <p:spPr>
           <a:xfrm>
-            <a:off x="3569760" y="4059720"/>
-            <a:ext cx="2919600" cy="2091600"/>
+            <a:off x="3570120" y="4060440"/>
+            <a:ext cx="2919960" cy="2091960"/>
           </a:xfrm>
           <a:prstGeom prst="rect">
             <a:avLst/>
@@ -2396,8 +2396,8 @@
         </p:nvSpPr>
         <p:spPr>
           <a:xfrm>
-            <a:off x="503640" y="4059720"/>
-            <a:ext cx="2919600" cy="2091600"/>
+            <a:off x="503640" y="4060440"/>
+            <a:ext cx="2919960" cy="2091960"/>
           </a:xfrm>
           <a:prstGeom prst="rect">
             <a:avLst/>
@@ -2478,8 +2478,8 @@
         </p:nvSpPr>
         <p:spPr>
           <a:xfrm>
-            <a:off x="503640" y="301320"/>
-            <a:ext cx="9068040" cy="1261800"/>
+            <a:off x="503640" y="301680"/>
+            <a:ext cx="9069120" cy="1262520"/>
           </a:xfrm>
           <a:prstGeom prst="rect">
             <a:avLst/>
@@ -2515,8 +2515,8 @@
         </p:nvSpPr>
         <p:spPr>
           <a:xfrm>
-            <a:off x="503640" y="1769040"/>
-            <a:ext cx="9068040" cy="4385160"/>
+            <a:off x="503640" y="1769400"/>
+            <a:ext cx="9069120" cy="4385880"/>
           </a:xfrm>
           <a:prstGeom prst="rect">
             <a:avLst/>
@@ -2574,8 +2574,8 @@
         </p:nvSpPr>
         <p:spPr>
           <a:xfrm>
-            <a:off x="503640" y="301320"/>
-            <a:ext cx="9068040" cy="1261800"/>
+            <a:off x="503640" y="301680"/>
+            <a:ext cx="9069120" cy="1262520"/>
           </a:xfrm>
           <a:prstGeom prst="rect">
             <a:avLst/>
@@ -2611,8 +2611,8 @@
         </p:nvSpPr>
         <p:spPr>
           <a:xfrm>
-            <a:off x="503640" y="1769040"/>
-            <a:ext cx="9068040" cy="4385160"/>
+            <a:off x="503640" y="1769400"/>
+            <a:ext cx="9069120" cy="4385880"/>
           </a:xfrm>
           <a:prstGeom prst="rect">
             <a:avLst/>
@@ -2671,8 +2671,8 @@
         </p:nvSpPr>
         <p:spPr>
           <a:xfrm>
-            <a:off x="503640" y="301320"/>
-            <a:ext cx="9068040" cy="1261800"/>
+            <a:off x="503640" y="301680"/>
+            <a:ext cx="9069120" cy="1262520"/>
           </a:xfrm>
           <a:prstGeom prst="rect">
             <a:avLst/>
@@ -2708,8 +2708,8 @@
         </p:nvSpPr>
         <p:spPr>
           <a:xfrm>
-            <a:off x="503640" y="1769040"/>
-            <a:ext cx="4425120" cy="4385160"/>
+            <a:off x="503640" y="1769400"/>
+            <a:ext cx="4425480" cy="4385880"/>
           </a:xfrm>
           <a:prstGeom prst="rect">
             <a:avLst/>
@@ -2746,8 +2746,8 @@
         </p:nvSpPr>
         <p:spPr>
           <a:xfrm>
-            <a:off x="5150520" y="1769040"/>
-            <a:ext cx="4425120" cy="4385160"/>
+            <a:off x="5150880" y="1769400"/>
+            <a:ext cx="4425480" cy="4385880"/>
           </a:xfrm>
           <a:prstGeom prst="rect">
             <a:avLst/>
@@ -2806,8 +2806,8 @@
         </p:nvSpPr>
         <p:spPr>
           <a:xfrm>
-            <a:off x="503640" y="301320"/>
-            <a:ext cx="9068040" cy="1261800"/>
+            <a:off x="503640" y="301680"/>
+            <a:ext cx="9069120" cy="1262520"/>
           </a:xfrm>
           <a:prstGeom prst="rect">
             <a:avLst/>
@@ -2865,8 +2865,8 @@
         </p:nvSpPr>
         <p:spPr>
           <a:xfrm>
-            <a:off x="503640" y="301320"/>
-            <a:ext cx="9068040" cy="1261800"/>
+            <a:off x="503640" y="301680"/>
+            <a:ext cx="9069120" cy="1262520"/>
           </a:xfrm>
           <a:prstGeom prst="rect">
             <a:avLst/>
@@ -2902,8 +2902,8 @@
         </p:nvSpPr>
         <p:spPr>
           <a:xfrm>
-            <a:off x="503640" y="1769040"/>
-            <a:ext cx="9068040" cy="4385160"/>
+            <a:off x="503640" y="1769400"/>
+            <a:ext cx="9069120" cy="4385880"/>
           </a:xfrm>
           <a:prstGeom prst="rect">
             <a:avLst/>
@@ -2962,8 +2962,8 @@
         </p:nvSpPr>
         <p:spPr>
           <a:xfrm>
-            <a:off x="503640" y="301320"/>
-            <a:ext cx="9068040" cy="5850360"/>
+            <a:off x="503640" y="301680"/>
+            <a:ext cx="9069120" cy="5853600"/>
           </a:xfrm>
           <a:prstGeom prst="rect">
             <a:avLst/>
@@ -3021,8 +3021,8 @@
         </p:nvSpPr>
         <p:spPr>
           <a:xfrm>
-            <a:off x="503640" y="301320"/>
-            <a:ext cx="9068040" cy="1261800"/>
+            <a:off x="503640" y="301680"/>
+            <a:ext cx="9069120" cy="1262520"/>
           </a:xfrm>
           <a:prstGeom prst="rect">
             <a:avLst/>
@@ -3058,8 +3058,8 @@
         </p:nvSpPr>
         <p:spPr>
           <a:xfrm>
-            <a:off x="503640" y="1769040"/>
-            <a:ext cx="4425120" cy="2091600"/>
+            <a:off x="503640" y="1769400"/>
+            <a:ext cx="4425480" cy="2091960"/>
           </a:xfrm>
           <a:prstGeom prst="rect">
             <a:avLst/>
@@ -3096,8 +3096,8 @@
         </p:nvSpPr>
         <p:spPr>
           <a:xfrm>
-            <a:off x="503640" y="4059720"/>
-            <a:ext cx="4425120" cy="2091600"/>
+            <a:off x="503640" y="4060440"/>
+            <a:ext cx="4425480" cy="2091960"/>
           </a:xfrm>
           <a:prstGeom prst="rect">
             <a:avLst/>
@@ -3134,8 +3134,8 @@
         </p:nvSpPr>
         <p:spPr>
           <a:xfrm>
-            <a:off x="5150520" y="1769040"/>
-            <a:ext cx="4425120" cy="4385160"/>
+            <a:off x="5150880" y="1769400"/>
+            <a:ext cx="4425480" cy="4385880"/>
           </a:xfrm>
           <a:prstGeom prst="rect">
             <a:avLst/>
@@ -3194,8 +3194,8 @@
         </p:nvSpPr>
         <p:spPr>
           <a:xfrm>
-            <a:off x="503640" y="301320"/>
-            <a:ext cx="9068040" cy="1261800"/>
+            <a:off x="503640" y="301680"/>
+            <a:ext cx="9069120" cy="1262520"/>
           </a:xfrm>
           <a:prstGeom prst="rect">
             <a:avLst/>
@@ -3231,8 +3231,8 @@
         </p:nvSpPr>
         <p:spPr>
           <a:xfrm>
-            <a:off x="503640" y="1769040"/>
-            <a:ext cx="4425120" cy="4385160"/>
+            <a:off x="503640" y="1769400"/>
+            <a:ext cx="4425480" cy="4385880"/>
           </a:xfrm>
           <a:prstGeom prst="rect">
             <a:avLst/>
@@ -3269,8 +3269,8 @@
         </p:nvSpPr>
         <p:spPr>
           <a:xfrm>
-            <a:off x="5150520" y="1769040"/>
-            <a:ext cx="4425120" cy="2091600"/>
+            <a:off x="5150880" y="1769400"/>
+            <a:ext cx="4425480" cy="2091960"/>
           </a:xfrm>
           <a:prstGeom prst="rect">
             <a:avLst/>
@@ -3307,8 +3307,8 @@
         </p:nvSpPr>
         <p:spPr>
           <a:xfrm>
-            <a:off x="5150520" y="4059720"/>
-            <a:ext cx="4425120" cy="2091600"/>
+            <a:off x="5150880" y="4060440"/>
+            <a:ext cx="4425480" cy="2091960"/>
           </a:xfrm>
           <a:prstGeom prst="rect">
             <a:avLst/>
@@ -3367,8 +3367,8 @@
         </p:nvSpPr>
         <p:spPr>
           <a:xfrm>
-            <a:off x="503640" y="301320"/>
-            <a:ext cx="9068040" cy="1261800"/>
+            <a:off x="503640" y="301680"/>
+            <a:ext cx="9069120" cy="1262520"/>
           </a:xfrm>
           <a:prstGeom prst="rect">
             <a:avLst/>
@@ -3404,8 +3404,8 @@
         </p:nvSpPr>
         <p:spPr>
           <a:xfrm>
-            <a:off x="503640" y="1769040"/>
-            <a:ext cx="4425120" cy="2091600"/>
+            <a:off x="503640" y="1769400"/>
+            <a:ext cx="4425480" cy="2091960"/>
           </a:xfrm>
           <a:prstGeom prst="rect">
             <a:avLst/>
@@ -3442,8 +3442,8 @@
         </p:nvSpPr>
         <p:spPr>
           <a:xfrm>
-            <a:off x="5150520" y="1769040"/>
-            <a:ext cx="4425120" cy="2091600"/>
+            <a:off x="5150880" y="1769400"/>
+            <a:ext cx="4425480" cy="2091960"/>
           </a:xfrm>
           <a:prstGeom prst="rect">
             <a:avLst/>
@@ -3480,8 +3480,8 @@
         </p:nvSpPr>
         <p:spPr>
           <a:xfrm>
-            <a:off x="503640" y="4059720"/>
-            <a:ext cx="9068040" cy="2091600"/>
+            <a:off x="503640" y="4060440"/>
+            <a:ext cx="9069120" cy="2091960"/>
           </a:xfrm>
           <a:prstGeom prst="rect">
             <a:avLst/>
@@ -3540,8 +3540,8 @@
         </p:nvSpPr>
         <p:spPr>
           <a:xfrm>
-            <a:off x="503640" y="301320"/>
-            <a:ext cx="9068040" cy="1261800"/>
+            <a:off x="503640" y="301680"/>
+            <a:ext cx="9069120" cy="1262520"/>
           </a:xfrm>
           <a:prstGeom prst="rect">
             <a:avLst/>
@@ -3577,8 +3577,8 @@
         </p:nvSpPr>
         <p:spPr>
           <a:xfrm>
-            <a:off x="503640" y="1769040"/>
-            <a:ext cx="9068040" cy="2091600"/>
+            <a:off x="503640" y="1769400"/>
+            <a:ext cx="9069120" cy="2091960"/>
           </a:xfrm>
           <a:prstGeom prst="rect">
             <a:avLst/>
@@ -3615,8 +3615,8 @@
         </p:nvSpPr>
         <p:spPr>
           <a:xfrm>
-            <a:off x="503640" y="4059720"/>
-            <a:ext cx="9068040" cy="2091600"/>
+            <a:off x="503640" y="4060440"/>
+            <a:ext cx="9069120" cy="2091960"/>
           </a:xfrm>
           <a:prstGeom prst="rect">
             <a:avLst/>
@@ -3675,8 +3675,8 @@
         </p:nvSpPr>
         <p:spPr>
           <a:xfrm>
-            <a:off x="503640" y="301320"/>
-            <a:ext cx="9068040" cy="1261800"/>
+            <a:off x="503640" y="301680"/>
+            <a:ext cx="9069120" cy="1262520"/>
           </a:xfrm>
           <a:prstGeom prst="rect">
             <a:avLst/>
@@ -3712,8 +3712,8 @@
         </p:nvSpPr>
         <p:spPr>
           <a:xfrm>
-            <a:off x="503640" y="1769040"/>
-            <a:ext cx="4425120" cy="2091600"/>
+            <a:off x="503640" y="1769400"/>
+            <a:ext cx="4425480" cy="2091960"/>
           </a:xfrm>
           <a:prstGeom prst="rect">
             <a:avLst/>
@@ -3750,8 +3750,8 @@
         </p:nvSpPr>
         <p:spPr>
           <a:xfrm>
-            <a:off x="5150520" y="1769040"/>
-            <a:ext cx="4425120" cy="2091600"/>
+            <a:off x="5150880" y="1769400"/>
+            <a:ext cx="4425480" cy="2091960"/>
           </a:xfrm>
           <a:prstGeom prst="rect">
             <a:avLst/>
@@ -3788,8 +3788,8 @@
         </p:nvSpPr>
         <p:spPr>
           <a:xfrm>
-            <a:off x="5150520" y="4059720"/>
-            <a:ext cx="4425120" cy="2091600"/>
+            <a:off x="5150880" y="4060440"/>
+            <a:ext cx="4425480" cy="2091960"/>
           </a:xfrm>
           <a:prstGeom prst="rect">
             <a:avLst/>
@@ -3826,8 +3826,8 @@
         </p:nvSpPr>
         <p:spPr>
           <a:xfrm>
-            <a:off x="503640" y="4059720"/>
-            <a:ext cx="4425120" cy="2091600"/>
+            <a:off x="503640" y="4060440"/>
+            <a:ext cx="4425480" cy="2091960"/>
           </a:xfrm>
           <a:prstGeom prst="rect">
             <a:avLst/>
@@ -3886,8 +3886,8 @@
         </p:nvSpPr>
         <p:spPr>
           <a:xfrm>
-            <a:off x="503640" y="301320"/>
-            <a:ext cx="9068040" cy="1261800"/>
+            <a:off x="503640" y="301680"/>
+            <a:ext cx="9069120" cy="1262520"/>
           </a:xfrm>
           <a:prstGeom prst="rect">
             <a:avLst/>
@@ -3923,8 +3923,8 @@
         </p:nvSpPr>
         <p:spPr>
           <a:xfrm>
-            <a:off x="503640" y="1769040"/>
-            <a:ext cx="2919600" cy="2091600"/>
+            <a:off x="503640" y="1769400"/>
+            <a:ext cx="2919960" cy="2091960"/>
           </a:xfrm>
           <a:prstGeom prst="rect">
             <a:avLst/>
@@ -3961,8 +3961,8 @@
         </p:nvSpPr>
         <p:spPr>
           <a:xfrm>
-            <a:off x="3569760" y="1769040"/>
-            <a:ext cx="2919600" cy="2091600"/>
+            <a:off x="3570120" y="1769400"/>
+            <a:ext cx="2919960" cy="2091960"/>
           </a:xfrm>
           <a:prstGeom prst="rect">
             <a:avLst/>
@@ -3999,8 +3999,8 @@
         </p:nvSpPr>
         <p:spPr>
           <a:xfrm>
-            <a:off x="6635520" y="1769040"/>
-            <a:ext cx="2919600" cy="2091600"/>
+            <a:off x="6636240" y="1769400"/>
+            <a:ext cx="2919960" cy="2091960"/>
           </a:xfrm>
           <a:prstGeom prst="rect">
             <a:avLst/>
@@ -4037,8 +4037,8 @@
         </p:nvSpPr>
         <p:spPr>
           <a:xfrm>
-            <a:off x="6635520" y="4059720"/>
-            <a:ext cx="2919600" cy="2091600"/>
+            <a:off x="6636240" y="4060440"/>
+            <a:ext cx="2919960" cy="2091960"/>
           </a:xfrm>
           <a:prstGeom prst="rect">
             <a:avLst/>
@@ -4075,8 +4075,8 @@
         </p:nvSpPr>
         <p:spPr>
           <a:xfrm>
-            <a:off x="3569760" y="4059720"/>
-            <a:ext cx="2919600" cy="2091600"/>
+            <a:off x="3570120" y="4060440"/>
+            <a:ext cx="2919960" cy="2091960"/>
           </a:xfrm>
           <a:prstGeom prst="rect">
             <a:avLst/>
@@ -4113,8 +4113,8 @@
         </p:nvSpPr>
         <p:spPr>
           <a:xfrm>
-            <a:off x="503640" y="4059720"/>
-            <a:ext cx="2919600" cy="2091600"/>
+            <a:off x="503640" y="4060440"/>
+            <a:ext cx="2919960" cy="2091960"/>
           </a:xfrm>
           <a:prstGeom prst="rect">
             <a:avLst/>
@@ -4195,8 +4195,8 @@
         </p:nvSpPr>
         <p:spPr>
           <a:xfrm>
-            <a:off x="503640" y="301320"/>
-            <a:ext cx="9068040" cy="1261800"/>
+            <a:off x="503640" y="301680"/>
+            <a:ext cx="9069120" cy="1262520"/>
           </a:xfrm>
           <a:prstGeom prst="rect">
             <a:avLst/>
@@ -4232,8 +4232,8 @@
         </p:nvSpPr>
         <p:spPr>
           <a:xfrm>
-            <a:off x="503640" y="1769040"/>
-            <a:ext cx="9068040" cy="4385160"/>
+            <a:off x="503640" y="1769400"/>
+            <a:ext cx="9069120" cy="4385880"/>
           </a:xfrm>
           <a:prstGeom prst="rect">
             <a:avLst/>
@@ -4291,8 +4291,8 @@
         </p:nvSpPr>
         <p:spPr>
           <a:xfrm>
-            <a:off x="503640" y="301320"/>
-            <a:ext cx="9068040" cy="1261800"/>
+            <a:off x="503640" y="301680"/>
+            <a:ext cx="9069120" cy="1262520"/>
           </a:xfrm>
           <a:prstGeom prst="rect">
             <a:avLst/>
@@ -4328,8 +4328,8 @@
         </p:nvSpPr>
         <p:spPr>
           <a:xfrm>
-            <a:off x="503640" y="1769040"/>
-            <a:ext cx="9068040" cy="4385160"/>
+            <a:off x="503640" y="1769400"/>
+            <a:ext cx="9069120" cy="4385880"/>
           </a:xfrm>
           <a:prstGeom prst="rect">
             <a:avLst/>
@@ -4388,8 +4388,8 @@
         </p:nvSpPr>
         <p:spPr>
           <a:xfrm>
-            <a:off x="503640" y="301320"/>
-            <a:ext cx="9068040" cy="1261800"/>
+            <a:off x="503640" y="301680"/>
+            <a:ext cx="9069120" cy="1262520"/>
           </a:xfrm>
           <a:prstGeom prst="rect">
             <a:avLst/>
@@ -4425,8 +4425,8 @@
         </p:nvSpPr>
         <p:spPr>
           <a:xfrm>
-            <a:off x="503640" y="1769040"/>
-            <a:ext cx="4425120" cy="4385160"/>
+            <a:off x="503640" y="1769400"/>
+            <a:ext cx="4425480" cy="4385880"/>
           </a:xfrm>
           <a:prstGeom prst="rect">
             <a:avLst/>
@@ -4463,8 +4463,8 @@
         </p:nvSpPr>
         <p:spPr>
           <a:xfrm>
-            <a:off x="5150520" y="1769040"/>
-            <a:ext cx="4425120" cy="4385160"/>
+            <a:off x="5150880" y="1769400"/>
+            <a:ext cx="4425480" cy="4385880"/>
           </a:xfrm>
           <a:prstGeom prst="rect">
             <a:avLst/>
@@ -4523,8 +4523,8 @@
         </p:nvSpPr>
         <p:spPr>
           <a:xfrm>
-            <a:off x="503640" y="301320"/>
-            <a:ext cx="9068040" cy="1261800"/>
+            <a:off x="503640" y="301680"/>
+            <a:ext cx="9069120" cy="1262520"/>
           </a:xfrm>
           <a:prstGeom prst="rect">
             <a:avLst/>
@@ -4560,8 +4560,8 @@
         </p:nvSpPr>
         <p:spPr>
           <a:xfrm>
-            <a:off x="503640" y="1769040"/>
-            <a:ext cx="4425120" cy="4385160"/>
+            <a:off x="503640" y="1769400"/>
+            <a:ext cx="4425480" cy="4385880"/>
           </a:xfrm>
           <a:prstGeom prst="rect">
             <a:avLst/>
@@ -4598,8 +4598,8 @@
         </p:nvSpPr>
         <p:spPr>
           <a:xfrm>
-            <a:off x="5150520" y="1769040"/>
-            <a:ext cx="4425120" cy="4385160"/>
+            <a:off x="5150880" y="1769400"/>
+            <a:ext cx="4425480" cy="4385880"/>
           </a:xfrm>
           <a:prstGeom prst="rect">
             <a:avLst/>
@@ -4658,8 +4658,8 @@
         </p:nvSpPr>
         <p:spPr>
           <a:xfrm>
-            <a:off x="503640" y="301320"/>
-            <a:ext cx="9068040" cy="1261800"/>
+            <a:off x="503640" y="301680"/>
+            <a:ext cx="9069120" cy="1262520"/>
           </a:xfrm>
           <a:prstGeom prst="rect">
             <a:avLst/>
@@ -4717,8 +4717,8 @@
         </p:nvSpPr>
         <p:spPr>
           <a:xfrm>
-            <a:off x="503640" y="301320"/>
-            <a:ext cx="9068040" cy="5850360"/>
+            <a:off x="503640" y="301680"/>
+            <a:ext cx="9069120" cy="5853600"/>
           </a:xfrm>
           <a:prstGeom prst="rect">
             <a:avLst/>
@@ -4776,8 +4776,8 @@
         </p:nvSpPr>
         <p:spPr>
           <a:xfrm>
-            <a:off x="503640" y="301320"/>
-            <a:ext cx="9068040" cy="1261800"/>
+            <a:off x="503640" y="301680"/>
+            <a:ext cx="9069120" cy="1262520"/>
           </a:xfrm>
           <a:prstGeom prst="rect">
             <a:avLst/>
@@ -4813,8 +4813,8 @@
         </p:nvSpPr>
         <p:spPr>
           <a:xfrm>
-            <a:off x="503640" y="1769040"/>
-            <a:ext cx="4425120" cy="2091600"/>
+            <a:off x="503640" y="1769400"/>
+            <a:ext cx="4425480" cy="2091960"/>
           </a:xfrm>
           <a:prstGeom prst="rect">
             <a:avLst/>
@@ -4851,8 +4851,8 @@
         </p:nvSpPr>
         <p:spPr>
           <a:xfrm>
-            <a:off x="503640" y="4059720"/>
-            <a:ext cx="4425120" cy="2091600"/>
+            <a:off x="503640" y="4060440"/>
+            <a:ext cx="4425480" cy="2091960"/>
           </a:xfrm>
           <a:prstGeom prst="rect">
             <a:avLst/>
@@ -4889,8 +4889,8 @@
         </p:nvSpPr>
         <p:spPr>
           <a:xfrm>
-            <a:off x="5150520" y="1769040"/>
-            <a:ext cx="4425120" cy="4385160"/>
+            <a:off x="5150880" y="1769400"/>
+            <a:ext cx="4425480" cy="4385880"/>
           </a:xfrm>
           <a:prstGeom prst="rect">
             <a:avLst/>
@@ -4949,8 +4949,8 @@
         </p:nvSpPr>
         <p:spPr>
           <a:xfrm>
-            <a:off x="503640" y="301320"/>
-            <a:ext cx="9068040" cy="1261800"/>
+            <a:off x="503640" y="301680"/>
+            <a:ext cx="9069120" cy="1262520"/>
           </a:xfrm>
           <a:prstGeom prst="rect">
             <a:avLst/>
@@ -4986,8 +4986,8 @@
         </p:nvSpPr>
         <p:spPr>
           <a:xfrm>
-            <a:off x="503640" y="1769040"/>
-            <a:ext cx="4425120" cy="4385160"/>
+            <a:off x="503640" y="1769400"/>
+            <a:ext cx="4425480" cy="4385880"/>
           </a:xfrm>
           <a:prstGeom prst="rect">
             <a:avLst/>
@@ -5024,8 +5024,8 @@
         </p:nvSpPr>
         <p:spPr>
           <a:xfrm>
-            <a:off x="5150520" y="1769040"/>
-            <a:ext cx="4425120" cy="2091600"/>
+            <a:off x="5150880" y="1769400"/>
+            <a:ext cx="4425480" cy="2091960"/>
           </a:xfrm>
           <a:prstGeom prst="rect">
             <a:avLst/>
@@ -5062,8 +5062,8 @@
         </p:nvSpPr>
         <p:spPr>
           <a:xfrm>
-            <a:off x="5150520" y="4059720"/>
-            <a:ext cx="4425120" cy="2091600"/>
+            <a:off x="5150880" y="4060440"/>
+            <a:ext cx="4425480" cy="2091960"/>
           </a:xfrm>
           <a:prstGeom prst="rect">
             <a:avLst/>
@@ -5122,8 +5122,8 @@
         </p:nvSpPr>
         <p:spPr>
           <a:xfrm>
-            <a:off x="503640" y="301320"/>
-            <a:ext cx="9068040" cy="1261800"/>
+            <a:off x="503640" y="301680"/>
+            <a:ext cx="9069120" cy="1262520"/>
           </a:xfrm>
           <a:prstGeom prst="rect">
             <a:avLst/>
@@ -5159,8 +5159,8 @@
         </p:nvSpPr>
         <p:spPr>
           <a:xfrm>
-            <a:off x="503640" y="1769040"/>
-            <a:ext cx="4425120" cy="2091600"/>
+            <a:off x="503640" y="1769400"/>
+            <a:ext cx="4425480" cy="2091960"/>
           </a:xfrm>
           <a:prstGeom prst="rect">
             <a:avLst/>
@@ -5197,8 +5197,8 @@
         </p:nvSpPr>
         <p:spPr>
           <a:xfrm>
-            <a:off x="5150520" y="1769040"/>
-            <a:ext cx="4425120" cy="2091600"/>
+            <a:off x="5150880" y="1769400"/>
+            <a:ext cx="4425480" cy="2091960"/>
           </a:xfrm>
           <a:prstGeom prst="rect">
             <a:avLst/>
@@ -5235,8 +5235,8 @@
         </p:nvSpPr>
         <p:spPr>
           <a:xfrm>
-            <a:off x="503640" y="4059720"/>
-            <a:ext cx="9068040" cy="2091600"/>
+            <a:off x="503640" y="4060440"/>
+            <a:ext cx="9069120" cy="2091960"/>
           </a:xfrm>
           <a:prstGeom prst="rect">
             <a:avLst/>
@@ -5295,8 +5295,8 @@
         </p:nvSpPr>
         <p:spPr>
           <a:xfrm>
-            <a:off x="503640" y="301320"/>
-            <a:ext cx="9068040" cy="1261800"/>
+            <a:off x="503640" y="301680"/>
+            <a:ext cx="9069120" cy="1262520"/>
           </a:xfrm>
           <a:prstGeom prst="rect">
             <a:avLst/>
@@ -5332,8 +5332,8 @@
         </p:nvSpPr>
         <p:spPr>
           <a:xfrm>
-            <a:off x="503640" y="1769040"/>
-            <a:ext cx="9068040" cy="2091600"/>
+            <a:off x="503640" y="1769400"/>
+            <a:ext cx="9069120" cy="2091960"/>
           </a:xfrm>
           <a:prstGeom prst="rect">
             <a:avLst/>
@@ -5370,8 +5370,8 @@
         </p:nvSpPr>
         <p:spPr>
           <a:xfrm>
-            <a:off x="503640" y="4059720"/>
-            <a:ext cx="9068040" cy="2091600"/>
+            <a:off x="503640" y="4060440"/>
+            <a:ext cx="9069120" cy="2091960"/>
           </a:xfrm>
           <a:prstGeom prst="rect">
             <a:avLst/>
@@ -5430,8 +5430,8 @@
         </p:nvSpPr>
         <p:spPr>
           <a:xfrm>
-            <a:off x="503640" y="301320"/>
-            <a:ext cx="9068040" cy="1261800"/>
+            <a:off x="503640" y="301680"/>
+            <a:ext cx="9069120" cy="1262520"/>
           </a:xfrm>
           <a:prstGeom prst="rect">
             <a:avLst/>
@@ -5467,8 +5467,8 @@
         </p:nvSpPr>
         <p:spPr>
           <a:xfrm>
-            <a:off x="503640" y="1769040"/>
-            <a:ext cx="4425120" cy="2091600"/>
+            <a:off x="503640" y="1769400"/>
+            <a:ext cx="4425480" cy="2091960"/>
           </a:xfrm>
           <a:prstGeom prst="rect">
             <a:avLst/>
@@ -5505,8 +5505,8 @@
         </p:nvSpPr>
         <p:spPr>
           <a:xfrm>
-            <a:off x="5150520" y="1769040"/>
-            <a:ext cx="4425120" cy="2091600"/>
+            <a:off x="5150880" y="1769400"/>
+            <a:ext cx="4425480" cy="2091960"/>
           </a:xfrm>
           <a:prstGeom prst="rect">
             <a:avLst/>
@@ -5543,8 +5543,8 @@
         </p:nvSpPr>
         <p:spPr>
           <a:xfrm>
-            <a:off x="5150520" y="4059720"/>
-            <a:ext cx="4425120" cy="2091600"/>
+            <a:off x="5150880" y="4060440"/>
+            <a:ext cx="4425480" cy="2091960"/>
           </a:xfrm>
           <a:prstGeom prst="rect">
             <a:avLst/>
@@ -5581,8 +5581,8 @@
         </p:nvSpPr>
         <p:spPr>
           <a:xfrm>
-            <a:off x="503640" y="4059720"/>
-            <a:ext cx="4425120" cy="2091600"/>
+            <a:off x="503640" y="4060440"/>
+            <a:ext cx="4425480" cy="2091960"/>
           </a:xfrm>
           <a:prstGeom prst="rect">
             <a:avLst/>
@@ -5641,8 +5641,8 @@
         </p:nvSpPr>
         <p:spPr>
           <a:xfrm>
-            <a:off x="503640" y="301320"/>
-            <a:ext cx="9068040" cy="1261800"/>
+            <a:off x="503640" y="301680"/>
+            <a:ext cx="9069120" cy="1262520"/>
           </a:xfrm>
           <a:prstGeom prst="rect">
             <a:avLst/>
@@ -5678,8 +5678,8 @@
         </p:nvSpPr>
         <p:spPr>
           <a:xfrm>
-            <a:off x="503640" y="1769040"/>
-            <a:ext cx="2919600" cy="2091600"/>
+            <a:off x="503640" y="1769400"/>
+            <a:ext cx="2919960" cy="2091960"/>
           </a:xfrm>
           <a:prstGeom prst="rect">
             <a:avLst/>
@@ -5716,8 +5716,8 @@
         </p:nvSpPr>
         <p:spPr>
           <a:xfrm>
-            <a:off x="3569760" y="1769040"/>
-            <a:ext cx="2919600" cy="2091600"/>
+            <a:off x="3570120" y="1769400"/>
+            <a:ext cx="2919960" cy="2091960"/>
           </a:xfrm>
           <a:prstGeom prst="rect">
             <a:avLst/>
@@ -5754,8 +5754,8 @@
         </p:nvSpPr>
         <p:spPr>
           <a:xfrm>
-            <a:off x="6635520" y="1769040"/>
-            <a:ext cx="2919600" cy="2091600"/>
+            <a:off x="6636240" y="1769400"/>
+            <a:ext cx="2919960" cy="2091960"/>
           </a:xfrm>
           <a:prstGeom prst="rect">
             <a:avLst/>
@@ -5792,8 +5792,8 @@
         </p:nvSpPr>
         <p:spPr>
           <a:xfrm>
-            <a:off x="6635520" y="4059720"/>
-            <a:ext cx="2919600" cy="2091600"/>
+            <a:off x="6636240" y="4060440"/>
+            <a:ext cx="2919960" cy="2091960"/>
           </a:xfrm>
           <a:prstGeom prst="rect">
             <a:avLst/>
@@ -5830,8 +5830,8 @@
         </p:nvSpPr>
         <p:spPr>
           <a:xfrm>
-            <a:off x="3569760" y="4059720"/>
-            <a:ext cx="2919600" cy="2091600"/>
+            <a:off x="3570120" y="4060440"/>
+            <a:ext cx="2919960" cy="2091960"/>
           </a:xfrm>
           <a:prstGeom prst="rect">
             <a:avLst/>
@@ -5868,8 +5868,8 @@
         </p:nvSpPr>
         <p:spPr>
           <a:xfrm>
-            <a:off x="503640" y="4059720"/>
-            <a:ext cx="2919600" cy="2091600"/>
+            <a:off x="503640" y="4060440"/>
+            <a:ext cx="2919960" cy="2091960"/>
           </a:xfrm>
           <a:prstGeom prst="rect">
             <a:avLst/>
@@ -5950,8 +5950,8 @@
         </p:nvSpPr>
         <p:spPr>
           <a:xfrm>
-            <a:off x="503640" y="301320"/>
-            <a:ext cx="9068040" cy="1261800"/>
+            <a:off x="503640" y="301680"/>
+            <a:ext cx="9069120" cy="1262520"/>
           </a:xfrm>
           <a:prstGeom prst="rect">
             <a:avLst/>
@@ -6009,8 +6009,8 @@
         </p:nvSpPr>
         <p:spPr>
           <a:xfrm>
-            <a:off x="503640" y="301320"/>
-            <a:ext cx="9068040" cy="1261800"/>
+            <a:off x="503640" y="301680"/>
+            <a:ext cx="9069120" cy="1262520"/>
           </a:xfrm>
           <a:prstGeom prst="rect">
             <a:avLst/>
@@ -6046,8 +6046,8 @@
         </p:nvSpPr>
         <p:spPr>
           <a:xfrm>
-            <a:off x="503640" y="1769040"/>
-            <a:ext cx="9068040" cy="4385160"/>
+            <a:off x="503640" y="1769400"/>
+            <a:ext cx="9069120" cy="4385880"/>
           </a:xfrm>
           <a:prstGeom prst="rect">
             <a:avLst/>
@@ -6105,8 +6105,8 @@
         </p:nvSpPr>
         <p:spPr>
           <a:xfrm>
-            <a:off x="503640" y="301320"/>
-            <a:ext cx="9068040" cy="1261800"/>
+            <a:off x="503640" y="301680"/>
+            <a:ext cx="9069120" cy="1262520"/>
           </a:xfrm>
           <a:prstGeom prst="rect">
             <a:avLst/>
@@ -6142,8 +6142,8 @@
         </p:nvSpPr>
         <p:spPr>
           <a:xfrm>
-            <a:off x="503640" y="1769040"/>
-            <a:ext cx="9068040" cy="4385160"/>
+            <a:off x="503640" y="1769400"/>
+            <a:ext cx="9069120" cy="4385880"/>
           </a:xfrm>
           <a:prstGeom prst="rect">
             <a:avLst/>
@@ -6202,8 +6202,8 @@
         </p:nvSpPr>
         <p:spPr>
           <a:xfrm>
-            <a:off x="503640" y="301320"/>
-            <a:ext cx="9068040" cy="1261800"/>
+            <a:off x="503640" y="301680"/>
+            <a:ext cx="9069120" cy="1262520"/>
           </a:xfrm>
           <a:prstGeom prst="rect">
             <a:avLst/>
@@ -6239,8 +6239,8 @@
         </p:nvSpPr>
         <p:spPr>
           <a:xfrm>
-            <a:off x="503640" y="1769040"/>
-            <a:ext cx="4425120" cy="4385160"/>
+            <a:off x="503640" y="1769400"/>
+            <a:ext cx="4425480" cy="4385880"/>
           </a:xfrm>
           <a:prstGeom prst="rect">
             <a:avLst/>
@@ -6277,8 +6277,8 @@
         </p:nvSpPr>
         <p:spPr>
           <a:xfrm>
-            <a:off x="5150520" y="1769040"/>
-            <a:ext cx="4425120" cy="4385160"/>
+            <a:off x="5150880" y="1769400"/>
+            <a:ext cx="4425480" cy="4385880"/>
           </a:xfrm>
           <a:prstGeom prst="rect">
             <a:avLst/>
@@ -6337,8 +6337,8 @@
         </p:nvSpPr>
         <p:spPr>
           <a:xfrm>
-            <a:off x="503640" y="301320"/>
-            <a:ext cx="9068040" cy="1261800"/>
+            <a:off x="503640" y="301680"/>
+            <a:ext cx="9069120" cy="1262520"/>
           </a:xfrm>
           <a:prstGeom prst="rect">
             <a:avLst/>
@@ -6396,8 +6396,8 @@
         </p:nvSpPr>
         <p:spPr>
           <a:xfrm>
-            <a:off x="503640" y="301320"/>
-            <a:ext cx="9068040" cy="5850360"/>
+            <a:off x="503640" y="301680"/>
+            <a:ext cx="9069120" cy="5853600"/>
           </a:xfrm>
           <a:prstGeom prst="rect">
             <a:avLst/>
@@ -6455,8 +6455,8 @@
         </p:nvSpPr>
         <p:spPr>
           <a:xfrm>
-            <a:off x="503640" y="301320"/>
-            <a:ext cx="9068040" cy="1261800"/>
+            <a:off x="503640" y="301680"/>
+            <a:ext cx="9069120" cy="1262520"/>
           </a:xfrm>
           <a:prstGeom prst="rect">
             <a:avLst/>
@@ -6492,8 +6492,8 @@
         </p:nvSpPr>
         <p:spPr>
           <a:xfrm>
-            <a:off x="503640" y="1769040"/>
-            <a:ext cx="4425120" cy="2091600"/>
+            <a:off x="503640" y="1769400"/>
+            <a:ext cx="4425480" cy="2091960"/>
           </a:xfrm>
           <a:prstGeom prst="rect">
             <a:avLst/>
@@ -6530,8 +6530,8 @@
         </p:nvSpPr>
         <p:spPr>
           <a:xfrm>
-            <a:off x="503640" y="4059720"/>
-            <a:ext cx="4425120" cy="2091600"/>
+            <a:off x="503640" y="4060440"/>
+            <a:ext cx="4425480" cy="2091960"/>
           </a:xfrm>
           <a:prstGeom prst="rect">
             <a:avLst/>
@@ -6568,8 +6568,8 @@
         </p:nvSpPr>
         <p:spPr>
           <a:xfrm>
-            <a:off x="5150520" y="1769040"/>
-            <a:ext cx="4425120" cy="4385160"/>
+            <a:off x="5150880" y="1769400"/>
+            <a:ext cx="4425480" cy="4385880"/>
           </a:xfrm>
           <a:prstGeom prst="rect">
             <a:avLst/>
@@ -6628,8 +6628,8 @@
         </p:nvSpPr>
         <p:spPr>
           <a:xfrm>
-            <a:off x="503640" y="301320"/>
-            <a:ext cx="9068040" cy="1261800"/>
+            <a:off x="503640" y="301680"/>
+            <a:ext cx="9069120" cy="1262520"/>
           </a:xfrm>
           <a:prstGeom prst="rect">
             <a:avLst/>
@@ -6665,8 +6665,8 @@
         </p:nvSpPr>
         <p:spPr>
           <a:xfrm>
-            <a:off x="503640" y="1769040"/>
-            <a:ext cx="4425120" cy="4385160"/>
+            <a:off x="503640" y="1769400"/>
+            <a:ext cx="4425480" cy="4385880"/>
           </a:xfrm>
           <a:prstGeom prst="rect">
             <a:avLst/>
@@ -6703,8 +6703,8 @@
         </p:nvSpPr>
         <p:spPr>
           <a:xfrm>
-            <a:off x="5150520" y="1769040"/>
-            <a:ext cx="4425120" cy="2091600"/>
+            <a:off x="5150880" y="1769400"/>
+            <a:ext cx="4425480" cy="2091960"/>
           </a:xfrm>
           <a:prstGeom prst="rect">
             <a:avLst/>
@@ -6741,8 +6741,8 @@
         </p:nvSpPr>
         <p:spPr>
           <a:xfrm>
-            <a:off x="5150520" y="4059720"/>
-            <a:ext cx="4425120" cy="2091600"/>
+            <a:off x="5150880" y="4060440"/>
+            <a:ext cx="4425480" cy="2091960"/>
           </a:xfrm>
           <a:prstGeom prst="rect">
             <a:avLst/>
@@ -6801,8 +6801,8 @@
         </p:nvSpPr>
         <p:spPr>
           <a:xfrm>
-            <a:off x="503640" y="301320"/>
-            <a:ext cx="9068040" cy="1261800"/>
+            <a:off x="503640" y="301680"/>
+            <a:ext cx="9069120" cy="1262520"/>
           </a:xfrm>
           <a:prstGeom prst="rect">
             <a:avLst/>
@@ -6838,8 +6838,8 @@
         </p:nvSpPr>
         <p:spPr>
           <a:xfrm>
-            <a:off x="503640" y="1769040"/>
-            <a:ext cx="4425120" cy="2091600"/>
+            <a:off x="503640" y="1769400"/>
+            <a:ext cx="4425480" cy="2091960"/>
           </a:xfrm>
           <a:prstGeom prst="rect">
             <a:avLst/>
@@ -6876,8 +6876,8 @@
         </p:nvSpPr>
         <p:spPr>
           <a:xfrm>
-            <a:off x="5150520" y="1769040"/>
-            <a:ext cx="4425120" cy="2091600"/>
+            <a:off x="5150880" y="1769400"/>
+            <a:ext cx="4425480" cy="2091960"/>
           </a:xfrm>
           <a:prstGeom prst="rect">
             <a:avLst/>
@@ -6914,8 +6914,8 @@
         </p:nvSpPr>
         <p:spPr>
           <a:xfrm>
-            <a:off x="503640" y="4059720"/>
-            <a:ext cx="9068040" cy="2091600"/>
+            <a:off x="503640" y="4060440"/>
+            <a:ext cx="9069120" cy="2091960"/>
           </a:xfrm>
           <a:prstGeom prst="rect">
             <a:avLst/>
@@ -6974,8 +6974,8 @@
         </p:nvSpPr>
         <p:spPr>
           <a:xfrm>
-            <a:off x="503640" y="301320"/>
-            <a:ext cx="9068040" cy="1261800"/>
+            <a:off x="503640" y="301680"/>
+            <a:ext cx="9069120" cy="1262520"/>
           </a:xfrm>
           <a:prstGeom prst="rect">
             <a:avLst/>
@@ -7011,8 +7011,8 @@
         </p:nvSpPr>
         <p:spPr>
           <a:xfrm>
-            <a:off x="503640" y="1769040"/>
-            <a:ext cx="9068040" cy="2091600"/>
+            <a:off x="503640" y="1769400"/>
+            <a:ext cx="9069120" cy="2091960"/>
           </a:xfrm>
           <a:prstGeom prst="rect">
             <a:avLst/>
@@ -7049,8 +7049,8 @@
         </p:nvSpPr>
         <p:spPr>
           <a:xfrm>
-            <a:off x="503640" y="4059720"/>
-            <a:ext cx="9068040" cy="2091600"/>
+            <a:off x="503640" y="4060440"/>
+            <a:ext cx="9069120" cy="2091960"/>
           </a:xfrm>
           <a:prstGeom prst="rect">
             <a:avLst/>
@@ -7109,8 +7109,8 @@
         </p:nvSpPr>
         <p:spPr>
           <a:xfrm>
-            <a:off x="503640" y="301320"/>
-            <a:ext cx="9068040" cy="1261800"/>
+            <a:off x="503640" y="301680"/>
+            <a:ext cx="9069120" cy="1262520"/>
           </a:xfrm>
           <a:prstGeom prst="rect">
             <a:avLst/>
@@ -7146,8 +7146,8 @@
         </p:nvSpPr>
         <p:spPr>
           <a:xfrm>
-            <a:off x="503640" y="1769040"/>
-            <a:ext cx="4425120" cy="2091600"/>
+            <a:off x="503640" y="1769400"/>
+            <a:ext cx="4425480" cy="2091960"/>
           </a:xfrm>
           <a:prstGeom prst="rect">
             <a:avLst/>
@@ -7184,8 +7184,8 @@
         </p:nvSpPr>
         <p:spPr>
           <a:xfrm>
-            <a:off x="5150520" y="1769040"/>
-            <a:ext cx="4425120" cy="2091600"/>
+            <a:off x="5150880" y="1769400"/>
+            <a:ext cx="4425480" cy="2091960"/>
           </a:xfrm>
           <a:prstGeom prst="rect">
             <a:avLst/>
@@ -7222,8 +7222,8 @@
         </p:nvSpPr>
         <p:spPr>
           <a:xfrm>
-            <a:off x="5150520" y="4059720"/>
-            <a:ext cx="4425120" cy="2091600"/>
+            <a:off x="5150880" y="4060440"/>
+            <a:ext cx="4425480" cy="2091960"/>
           </a:xfrm>
           <a:prstGeom prst="rect">
             <a:avLst/>
@@ -7260,8 +7260,8 @@
         </p:nvSpPr>
         <p:spPr>
           <a:xfrm>
-            <a:off x="503640" y="4059720"/>
-            <a:ext cx="4425120" cy="2091600"/>
+            <a:off x="503640" y="4060440"/>
+            <a:ext cx="4425480" cy="2091960"/>
           </a:xfrm>
           <a:prstGeom prst="rect">
             <a:avLst/>
@@ -7320,8 +7320,8 @@
         </p:nvSpPr>
         <p:spPr>
           <a:xfrm>
-            <a:off x="503640" y="301320"/>
-            <a:ext cx="9068040" cy="5850360"/>
+            <a:off x="503640" y="301680"/>
+            <a:ext cx="9069120" cy="5853600"/>
           </a:xfrm>
           <a:prstGeom prst="rect">
             <a:avLst/>
@@ -7379,8 +7379,8 @@
         </p:nvSpPr>
         <p:spPr>
           <a:xfrm>
-            <a:off x="503640" y="301320"/>
-            <a:ext cx="9068040" cy="1261800"/>
+            <a:off x="503640" y="301680"/>
+            <a:ext cx="9069120" cy="1262520"/>
           </a:xfrm>
           <a:prstGeom prst="rect">
             <a:avLst/>
@@ -7416,8 +7416,8 @@
         </p:nvSpPr>
         <p:spPr>
           <a:xfrm>
-            <a:off x="503640" y="1769040"/>
-            <a:ext cx="2919600" cy="2091600"/>
+            <a:off x="503640" y="1769400"/>
+            <a:ext cx="2919960" cy="2091960"/>
           </a:xfrm>
           <a:prstGeom prst="rect">
             <a:avLst/>
@@ -7454,8 +7454,8 @@
         </p:nvSpPr>
         <p:spPr>
           <a:xfrm>
-            <a:off x="3569760" y="1769040"/>
-            <a:ext cx="2919600" cy="2091600"/>
+            <a:off x="3570120" y="1769400"/>
+            <a:ext cx="2919960" cy="2091960"/>
           </a:xfrm>
           <a:prstGeom prst="rect">
             <a:avLst/>
@@ -7492,8 +7492,8 @@
         </p:nvSpPr>
         <p:spPr>
           <a:xfrm>
-            <a:off x="6635520" y="1769040"/>
-            <a:ext cx="2919600" cy="2091600"/>
+            <a:off x="6636240" y="1769400"/>
+            <a:ext cx="2919960" cy="2091960"/>
           </a:xfrm>
           <a:prstGeom prst="rect">
             <a:avLst/>
@@ -7530,8 +7530,8 @@
         </p:nvSpPr>
         <p:spPr>
           <a:xfrm>
-            <a:off x="6635520" y="4059720"/>
-            <a:ext cx="2919600" cy="2091600"/>
+            <a:off x="6636240" y="4060440"/>
+            <a:ext cx="2919960" cy="2091960"/>
           </a:xfrm>
           <a:prstGeom prst="rect">
             <a:avLst/>
@@ -7568,8 +7568,8 @@
         </p:nvSpPr>
         <p:spPr>
           <a:xfrm>
-            <a:off x="3569760" y="4059720"/>
-            <a:ext cx="2919600" cy="2091600"/>
+            <a:off x="3570120" y="4060440"/>
+            <a:ext cx="2919960" cy="2091960"/>
           </a:xfrm>
           <a:prstGeom prst="rect">
             <a:avLst/>
@@ -7606,8 +7606,8 @@
         </p:nvSpPr>
         <p:spPr>
           <a:xfrm>
-            <a:off x="503640" y="4059720"/>
-            <a:ext cx="2919600" cy="2091600"/>
+            <a:off x="503640" y="4060440"/>
+            <a:ext cx="2919960" cy="2091960"/>
           </a:xfrm>
           <a:prstGeom prst="rect">
             <a:avLst/>
@@ -7688,8 +7688,8 @@
         </p:nvSpPr>
         <p:spPr>
           <a:xfrm>
-            <a:off x="503640" y="301320"/>
-            <a:ext cx="9068040" cy="1261800"/>
+            <a:off x="503640" y="301680"/>
+            <a:ext cx="9069120" cy="1262520"/>
           </a:xfrm>
           <a:prstGeom prst="rect">
             <a:avLst/>
@@ -7725,8 +7725,8 @@
         </p:nvSpPr>
         <p:spPr>
           <a:xfrm>
-            <a:off x="503640" y="1769040"/>
-            <a:ext cx="9068040" cy="4385160"/>
+            <a:off x="503640" y="1769400"/>
+            <a:ext cx="9069120" cy="4385880"/>
           </a:xfrm>
           <a:prstGeom prst="rect">
             <a:avLst/>
@@ -7784,8 +7784,8 @@
         </p:nvSpPr>
         <p:spPr>
           <a:xfrm>
-            <a:off x="503640" y="301320"/>
-            <a:ext cx="9068040" cy="1261800"/>
+            <a:off x="503640" y="301680"/>
+            <a:ext cx="9069120" cy="1262520"/>
           </a:xfrm>
           <a:prstGeom prst="rect">
             <a:avLst/>
@@ -7821,8 +7821,8 @@
         </p:nvSpPr>
         <p:spPr>
           <a:xfrm>
-            <a:off x="503640" y="1769040"/>
-            <a:ext cx="9068040" cy="4385160"/>
+            <a:off x="503640" y="1769400"/>
+            <a:ext cx="9069120" cy="4385880"/>
           </a:xfrm>
           <a:prstGeom prst="rect">
             <a:avLst/>
@@ -7881,8 +7881,8 @@
         </p:nvSpPr>
         <p:spPr>
           <a:xfrm>
-            <a:off x="503640" y="301320"/>
-            <a:ext cx="9068040" cy="1261800"/>
+            <a:off x="503640" y="301680"/>
+            <a:ext cx="9069120" cy="1262520"/>
           </a:xfrm>
           <a:prstGeom prst="rect">
             <a:avLst/>
@@ -7918,8 +7918,8 @@
         </p:nvSpPr>
         <p:spPr>
           <a:xfrm>
-            <a:off x="503640" y="1769040"/>
-            <a:ext cx="4425120" cy="4385160"/>
+            <a:off x="503640" y="1769400"/>
+            <a:ext cx="4425480" cy="4385880"/>
           </a:xfrm>
           <a:prstGeom prst="rect">
             <a:avLst/>
@@ -7956,8 +7956,8 @@
         </p:nvSpPr>
         <p:spPr>
           <a:xfrm>
-            <a:off x="5150520" y="1769040"/>
-            <a:ext cx="4425120" cy="4385160"/>
+            <a:off x="5150880" y="1769400"/>
+            <a:ext cx="4425480" cy="4385880"/>
           </a:xfrm>
           <a:prstGeom prst="rect">
             <a:avLst/>
@@ -8016,8 +8016,8 @@
         </p:nvSpPr>
         <p:spPr>
           <a:xfrm>
-            <a:off x="503640" y="301320"/>
-            <a:ext cx="9068040" cy="1261800"/>
+            <a:off x="503640" y="301680"/>
+            <a:ext cx="9069120" cy="1262520"/>
           </a:xfrm>
           <a:prstGeom prst="rect">
             <a:avLst/>
@@ -8075,8 +8075,8 @@
         </p:nvSpPr>
         <p:spPr>
           <a:xfrm>
-            <a:off x="503640" y="301320"/>
-            <a:ext cx="9068040" cy="5850360"/>
+            <a:off x="503640" y="301680"/>
+            <a:ext cx="9069120" cy="5853600"/>
           </a:xfrm>
           <a:prstGeom prst="rect">
             <a:avLst/>
@@ -8134,8 +8134,8 @@
         </p:nvSpPr>
         <p:spPr>
           <a:xfrm>
-            <a:off x="503640" y="301320"/>
-            <a:ext cx="9068040" cy="1261800"/>
+            <a:off x="503640" y="301680"/>
+            <a:ext cx="9069120" cy="1262520"/>
           </a:xfrm>
           <a:prstGeom prst="rect">
             <a:avLst/>
@@ -8171,8 +8171,8 @@
         </p:nvSpPr>
         <p:spPr>
           <a:xfrm>
-            <a:off x="503640" y="1769040"/>
-            <a:ext cx="4425120" cy="2091600"/>
+            <a:off x="503640" y="1769400"/>
+            <a:ext cx="4425480" cy="2091960"/>
           </a:xfrm>
           <a:prstGeom prst="rect">
             <a:avLst/>
@@ -8209,8 +8209,8 @@
         </p:nvSpPr>
         <p:spPr>
           <a:xfrm>
-            <a:off x="503640" y="4059720"/>
-            <a:ext cx="4425120" cy="2091600"/>
+            <a:off x="503640" y="4060440"/>
+            <a:ext cx="4425480" cy="2091960"/>
           </a:xfrm>
           <a:prstGeom prst="rect">
             <a:avLst/>
@@ -8247,8 +8247,8 @@
         </p:nvSpPr>
         <p:spPr>
           <a:xfrm>
-            <a:off x="5150520" y="1769040"/>
-            <a:ext cx="4425120" cy="4385160"/>
+            <a:off x="5150880" y="1769400"/>
+            <a:ext cx="4425480" cy="4385880"/>
           </a:xfrm>
           <a:prstGeom prst="rect">
             <a:avLst/>
@@ -8307,8 +8307,8 @@
         </p:nvSpPr>
         <p:spPr>
           <a:xfrm>
-            <a:off x="503640" y="301320"/>
-            <a:ext cx="9068040" cy="1261800"/>
+            <a:off x="503640" y="301680"/>
+            <a:ext cx="9069120" cy="1262520"/>
           </a:xfrm>
           <a:prstGeom prst="rect">
             <a:avLst/>
@@ -8344,8 +8344,8 @@
         </p:nvSpPr>
         <p:spPr>
           <a:xfrm>
-            <a:off x="503640" y="1769040"/>
-            <a:ext cx="4425120" cy="4385160"/>
+            <a:off x="503640" y="1769400"/>
+            <a:ext cx="4425480" cy="4385880"/>
           </a:xfrm>
           <a:prstGeom prst="rect">
             <a:avLst/>
@@ -8382,8 +8382,8 @@
         </p:nvSpPr>
         <p:spPr>
           <a:xfrm>
-            <a:off x="5150520" y="1769040"/>
-            <a:ext cx="4425120" cy="2091600"/>
+            <a:off x="5150880" y="1769400"/>
+            <a:ext cx="4425480" cy="2091960"/>
           </a:xfrm>
           <a:prstGeom prst="rect">
             <a:avLst/>
@@ -8420,8 +8420,8 @@
         </p:nvSpPr>
         <p:spPr>
           <a:xfrm>
-            <a:off x="5150520" y="4059720"/>
-            <a:ext cx="4425120" cy="2091600"/>
+            <a:off x="5150880" y="4060440"/>
+            <a:ext cx="4425480" cy="2091960"/>
           </a:xfrm>
           <a:prstGeom prst="rect">
             <a:avLst/>
@@ -8480,8 +8480,8 @@
         </p:nvSpPr>
         <p:spPr>
           <a:xfrm>
-            <a:off x="503640" y="301320"/>
-            <a:ext cx="9068040" cy="1261800"/>
+            <a:off x="503640" y="301680"/>
+            <a:ext cx="9069120" cy="1262520"/>
           </a:xfrm>
           <a:prstGeom prst="rect">
             <a:avLst/>
@@ -8517,8 +8517,8 @@
         </p:nvSpPr>
         <p:spPr>
           <a:xfrm>
-            <a:off x="503640" y="1769040"/>
-            <a:ext cx="4425120" cy="2091600"/>
+            <a:off x="503640" y="1769400"/>
+            <a:ext cx="4425480" cy="2091960"/>
           </a:xfrm>
           <a:prstGeom prst="rect">
             <a:avLst/>
@@ -8555,8 +8555,8 @@
         </p:nvSpPr>
         <p:spPr>
           <a:xfrm>
-            <a:off x="5150520" y="1769040"/>
-            <a:ext cx="4425120" cy="2091600"/>
+            <a:off x="5150880" y="1769400"/>
+            <a:ext cx="4425480" cy="2091960"/>
           </a:xfrm>
           <a:prstGeom prst="rect">
             <a:avLst/>
@@ -8593,8 +8593,8 @@
         </p:nvSpPr>
         <p:spPr>
           <a:xfrm>
-            <a:off x="503640" y="4059720"/>
-            <a:ext cx="9068040" cy="2091600"/>
+            <a:off x="503640" y="4060440"/>
+            <a:ext cx="9069120" cy="2091960"/>
           </a:xfrm>
           <a:prstGeom prst="rect">
             <a:avLst/>
@@ -8653,8 +8653,8 @@
         </p:nvSpPr>
         <p:spPr>
           <a:xfrm>
-            <a:off x="503640" y="301320"/>
-            <a:ext cx="9068040" cy="1261800"/>
+            <a:off x="503640" y="301680"/>
+            <a:ext cx="9069120" cy="1262520"/>
           </a:xfrm>
           <a:prstGeom prst="rect">
             <a:avLst/>
@@ -8690,8 +8690,8 @@
         </p:nvSpPr>
         <p:spPr>
           <a:xfrm>
-            <a:off x="503640" y="1769040"/>
-            <a:ext cx="4425120" cy="2091600"/>
+            <a:off x="503640" y="1769400"/>
+            <a:ext cx="4425480" cy="2091960"/>
           </a:xfrm>
           <a:prstGeom prst="rect">
             <a:avLst/>
@@ -8728,8 +8728,8 @@
         </p:nvSpPr>
         <p:spPr>
           <a:xfrm>
-            <a:off x="503640" y="4059720"/>
-            <a:ext cx="4425120" cy="2091600"/>
+            <a:off x="503640" y="4060440"/>
+            <a:ext cx="4425480" cy="2091960"/>
           </a:xfrm>
           <a:prstGeom prst="rect">
             <a:avLst/>
@@ -8766,8 +8766,8 @@
         </p:nvSpPr>
         <p:spPr>
           <a:xfrm>
-            <a:off x="5150520" y="1769040"/>
-            <a:ext cx="4425120" cy="4385160"/>
+            <a:off x="5150880" y="1769400"/>
+            <a:ext cx="4425480" cy="4385880"/>
           </a:xfrm>
           <a:prstGeom prst="rect">
             <a:avLst/>
@@ -8826,8 +8826,8 @@
         </p:nvSpPr>
         <p:spPr>
           <a:xfrm>
-            <a:off x="503640" y="301320"/>
-            <a:ext cx="9068040" cy="1261800"/>
+            <a:off x="503640" y="301680"/>
+            <a:ext cx="9069120" cy="1262520"/>
           </a:xfrm>
           <a:prstGeom prst="rect">
             <a:avLst/>
@@ -8863,8 +8863,8 @@
         </p:nvSpPr>
         <p:spPr>
           <a:xfrm>
-            <a:off x="503640" y="1769040"/>
-            <a:ext cx="9068040" cy="2091600"/>
+            <a:off x="503640" y="1769400"/>
+            <a:ext cx="9069120" cy="2091960"/>
           </a:xfrm>
           <a:prstGeom prst="rect">
             <a:avLst/>
@@ -8901,8 +8901,8 @@
         </p:nvSpPr>
         <p:spPr>
           <a:xfrm>
-            <a:off x="503640" y="4059720"/>
-            <a:ext cx="9068040" cy="2091600"/>
+            <a:off x="503640" y="4060440"/>
+            <a:ext cx="9069120" cy="2091960"/>
           </a:xfrm>
           <a:prstGeom prst="rect">
             <a:avLst/>
@@ -8961,8 +8961,8 @@
         </p:nvSpPr>
         <p:spPr>
           <a:xfrm>
-            <a:off x="503640" y="301320"/>
-            <a:ext cx="9068040" cy="1261800"/>
+            <a:off x="503640" y="301680"/>
+            <a:ext cx="9069120" cy="1262520"/>
           </a:xfrm>
           <a:prstGeom prst="rect">
             <a:avLst/>
@@ -8998,8 +8998,8 @@
         </p:nvSpPr>
         <p:spPr>
           <a:xfrm>
-            <a:off x="503640" y="1769040"/>
-            <a:ext cx="4425120" cy="2091600"/>
+            <a:off x="503640" y="1769400"/>
+            <a:ext cx="4425480" cy="2091960"/>
           </a:xfrm>
           <a:prstGeom prst="rect">
             <a:avLst/>
@@ -9036,8 +9036,8 @@
         </p:nvSpPr>
         <p:spPr>
           <a:xfrm>
-            <a:off x="5150520" y="1769040"/>
-            <a:ext cx="4425120" cy="2091600"/>
+            <a:off x="5150880" y="1769400"/>
+            <a:ext cx="4425480" cy="2091960"/>
           </a:xfrm>
           <a:prstGeom prst="rect">
             <a:avLst/>
@@ -9074,8 +9074,8 @@
         </p:nvSpPr>
         <p:spPr>
           <a:xfrm>
-            <a:off x="5150520" y="4059720"/>
-            <a:ext cx="4425120" cy="2091600"/>
+            <a:off x="5150880" y="4060440"/>
+            <a:ext cx="4425480" cy="2091960"/>
           </a:xfrm>
           <a:prstGeom prst="rect">
             <a:avLst/>
@@ -9112,8 +9112,8 @@
         </p:nvSpPr>
         <p:spPr>
           <a:xfrm>
-            <a:off x="503640" y="4059720"/>
-            <a:ext cx="4425120" cy="2091600"/>
+            <a:off x="503640" y="4060440"/>
+            <a:ext cx="4425480" cy="2091960"/>
           </a:xfrm>
           <a:prstGeom prst="rect">
             <a:avLst/>
@@ -9172,8 +9172,8 @@
         </p:nvSpPr>
         <p:spPr>
           <a:xfrm>
-            <a:off x="503640" y="301320"/>
-            <a:ext cx="9068040" cy="1261800"/>
+            <a:off x="503640" y="301680"/>
+            <a:ext cx="9069120" cy="1262520"/>
           </a:xfrm>
           <a:prstGeom prst="rect">
             <a:avLst/>
@@ -9209,8 +9209,8 @@
         </p:nvSpPr>
         <p:spPr>
           <a:xfrm>
-            <a:off x="503640" y="1769040"/>
-            <a:ext cx="2919600" cy="2091600"/>
+            <a:off x="503640" y="1769400"/>
+            <a:ext cx="2919960" cy="2091960"/>
           </a:xfrm>
           <a:prstGeom prst="rect">
             <a:avLst/>
@@ -9247,8 +9247,8 @@
         </p:nvSpPr>
         <p:spPr>
           <a:xfrm>
-            <a:off x="3569760" y="1769040"/>
-            <a:ext cx="2919600" cy="2091600"/>
+            <a:off x="3570120" y="1769400"/>
+            <a:ext cx="2919960" cy="2091960"/>
           </a:xfrm>
           <a:prstGeom prst="rect">
             <a:avLst/>
@@ -9285,8 +9285,8 @@
         </p:nvSpPr>
         <p:spPr>
           <a:xfrm>
-            <a:off x="6635520" y="1769040"/>
-            <a:ext cx="2919600" cy="2091600"/>
+            <a:off x="6636240" y="1769400"/>
+            <a:ext cx="2919960" cy="2091960"/>
           </a:xfrm>
           <a:prstGeom prst="rect">
             <a:avLst/>
@@ -9323,8 +9323,8 @@
         </p:nvSpPr>
         <p:spPr>
           <a:xfrm>
-            <a:off x="6635520" y="4059720"/>
-            <a:ext cx="2919600" cy="2091600"/>
+            <a:off x="6636240" y="4060440"/>
+            <a:ext cx="2919960" cy="2091960"/>
           </a:xfrm>
           <a:prstGeom prst="rect">
             <a:avLst/>
@@ -9361,8 +9361,8 @@
         </p:nvSpPr>
         <p:spPr>
           <a:xfrm>
-            <a:off x="3569760" y="4059720"/>
-            <a:ext cx="2919600" cy="2091600"/>
+            <a:off x="3570120" y="4060440"/>
+            <a:ext cx="2919960" cy="2091960"/>
           </a:xfrm>
           <a:prstGeom prst="rect">
             <a:avLst/>
@@ -9399,8 +9399,8 @@
         </p:nvSpPr>
         <p:spPr>
           <a:xfrm>
-            <a:off x="503640" y="4059720"/>
-            <a:ext cx="2919600" cy="2091600"/>
+            <a:off x="503640" y="4060440"/>
+            <a:ext cx="2919960" cy="2091960"/>
           </a:xfrm>
           <a:prstGeom prst="rect">
             <a:avLst/>
@@ -9459,8 +9459,8 @@
         </p:nvSpPr>
         <p:spPr>
           <a:xfrm>
-            <a:off x="503640" y="301320"/>
-            <a:ext cx="9068040" cy="1261800"/>
+            <a:off x="503640" y="301680"/>
+            <a:ext cx="9069120" cy="1262520"/>
           </a:xfrm>
           <a:prstGeom prst="rect">
             <a:avLst/>
@@ -9496,8 +9496,8 @@
         </p:nvSpPr>
         <p:spPr>
           <a:xfrm>
-            <a:off x="503640" y="1769040"/>
-            <a:ext cx="4425120" cy="4385160"/>
+            <a:off x="503640" y="1769400"/>
+            <a:ext cx="4425480" cy="4385880"/>
           </a:xfrm>
           <a:prstGeom prst="rect">
             <a:avLst/>
@@ -9534,8 +9534,8 @@
         </p:nvSpPr>
         <p:spPr>
           <a:xfrm>
-            <a:off x="5150520" y="1769040"/>
-            <a:ext cx="4425120" cy="2091600"/>
+            <a:off x="5150880" y="1769400"/>
+            <a:ext cx="4425480" cy="2091960"/>
           </a:xfrm>
           <a:prstGeom prst="rect">
             <a:avLst/>
@@ -9572,8 +9572,8 @@
         </p:nvSpPr>
         <p:spPr>
           <a:xfrm>
-            <a:off x="5150520" y="4059720"/>
-            <a:ext cx="4425120" cy="2091600"/>
+            <a:off x="5150880" y="4060440"/>
+            <a:ext cx="4425480" cy="2091960"/>
           </a:xfrm>
           <a:prstGeom prst="rect">
             <a:avLst/>
@@ -9632,8 +9632,8 @@
         </p:nvSpPr>
         <p:spPr>
           <a:xfrm>
-            <a:off x="503640" y="301320"/>
-            <a:ext cx="9068040" cy="1261800"/>
+            <a:off x="503640" y="301680"/>
+            <a:ext cx="9069120" cy="1262520"/>
           </a:xfrm>
           <a:prstGeom prst="rect">
             <a:avLst/>
@@ -9669,8 +9669,8 @@
         </p:nvSpPr>
         <p:spPr>
           <a:xfrm>
-            <a:off x="503640" y="1769040"/>
-            <a:ext cx="4425120" cy="2091600"/>
+            <a:off x="503640" y="1769400"/>
+            <a:ext cx="4425480" cy="2091960"/>
           </a:xfrm>
           <a:prstGeom prst="rect">
             <a:avLst/>
@@ -9707,8 +9707,8 @@
         </p:nvSpPr>
         <p:spPr>
           <a:xfrm>
-            <a:off x="5150520" y="1769040"/>
-            <a:ext cx="4425120" cy="2091600"/>
+            <a:off x="5150880" y="1769400"/>
+            <a:ext cx="4425480" cy="2091960"/>
           </a:xfrm>
           <a:prstGeom prst="rect">
             <a:avLst/>
@@ -9745,8 +9745,8 @@
         </p:nvSpPr>
         <p:spPr>
           <a:xfrm>
-            <a:off x="503640" y="4059720"/>
-            <a:ext cx="9068040" cy="2091600"/>
+            <a:off x="503640" y="4060440"/>
+            <a:ext cx="9069120" cy="2091960"/>
           </a:xfrm>
           <a:prstGeom prst="rect">
             <a:avLst/>
@@ -9813,7 +9813,7 @@
         <p:spPr>
           <a:xfrm>
             <a:off x="503640" y="301320"/>
-            <a:ext cx="9068040" cy="1261800"/>
+            <a:ext cx="9067680" cy="1261440"/>
           </a:xfrm>
           <a:prstGeom prst="rect">
             <a:avLst/>
@@ -9862,8 +9862,8 @@
         </p:nvSpPr>
         <p:spPr>
           <a:xfrm>
-            <a:off x="503640" y="1769040"/>
-            <a:ext cx="9068400" cy="4385520"/>
+            <a:off x="503640" y="1769400"/>
+            <a:ext cx="9069120" cy="4385880"/>
           </a:xfrm>
           <a:prstGeom prst="rect">
             <a:avLst/>
@@ -9876,7 +9876,7 @@
           <a:p>
             <a:pPr marL="432000" indent="-324000">
               <a:spcBef>
-                <a:spcPts val="1414"/>
+                <a:spcPts val="1417"/>
               </a:spcBef>
               <a:buClr>
                 <a:srgbClr val="000000"/>
@@ -10197,8 +10197,8 @@
         </p:nvSpPr>
         <p:spPr>
           <a:xfrm>
-            <a:off x="503640" y="301320"/>
-            <a:ext cx="9068400" cy="1262160"/>
+            <a:off x="503640" y="301680"/>
+            <a:ext cx="9069120" cy="1262520"/>
           </a:xfrm>
           <a:prstGeom prst="rect">
             <a:avLst/>
@@ -10248,8 +10248,8 @@
         </p:nvSpPr>
         <p:spPr>
           <a:xfrm>
-            <a:off x="503640" y="1769040"/>
-            <a:ext cx="9068400" cy="4385520"/>
+            <a:off x="503640" y="1769400"/>
+            <a:ext cx="9069120" cy="4385880"/>
           </a:xfrm>
           <a:prstGeom prst="rect">
             <a:avLst/>
@@ -10262,7 +10262,7 @@
           <a:p>
             <a:pPr marL="432000" indent="-324000">
               <a:spcBef>
-                <a:spcPts val="1414"/>
+                <a:spcPts val="1417"/>
               </a:spcBef>
               <a:buClr>
                 <a:srgbClr val="000000"/>
@@ -10583,8 +10583,8 @@
         </p:nvSpPr>
         <p:spPr>
           <a:xfrm>
-            <a:off x="503640" y="301320"/>
-            <a:ext cx="9068400" cy="1262160"/>
+            <a:off x="503640" y="301680"/>
+            <a:ext cx="9069120" cy="1262520"/>
           </a:xfrm>
           <a:prstGeom prst="rect">
             <a:avLst/>
@@ -10634,8 +10634,8 @@
         </p:nvSpPr>
         <p:spPr>
           <a:xfrm>
-            <a:off x="503640" y="1769040"/>
-            <a:ext cx="9068400" cy="4385520"/>
+            <a:off x="503640" y="1769400"/>
+            <a:ext cx="9069120" cy="4385880"/>
           </a:xfrm>
           <a:prstGeom prst="rect">
             <a:avLst/>
@@ -10648,7 +10648,7 @@
           <a:p>
             <a:pPr marL="432000" indent="-324000">
               <a:spcBef>
-                <a:spcPts val="1414"/>
+                <a:spcPts val="1417"/>
               </a:spcBef>
               <a:buClr>
                 <a:srgbClr val="000000"/>
@@ -10969,8 +10969,8 @@
         </p:nvSpPr>
         <p:spPr>
           <a:xfrm>
-            <a:off x="503640" y="301320"/>
-            <a:ext cx="9068400" cy="1262160"/>
+            <a:off x="503640" y="301680"/>
+            <a:ext cx="9069120" cy="1262520"/>
           </a:xfrm>
           <a:prstGeom prst="rect">
             <a:avLst/>
@@ -11020,8 +11020,8 @@
         </p:nvSpPr>
         <p:spPr>
           <a:xfrm>
-            <a:off x="503640" y="1769040"/>
-            <a:ext cx="9068400" cy="4385520"/>
+            <a:off x="503640" y="1769400"/>
+            <a:ext cx="9069120" cy="4385880"/>
           </a:xfrm>
           <a:prstGeom prst="rect">
             <a:avLst/>
@@ -11034,7 +11034,7 @@
           <a:p>
             <a:pPr marL="432000" indent="-324000">
               <a:spcBef>
-                <a:spcPts val="1414"/>
+                <a:spcPts val="1417"/>
               </a:spcBef>
               <a:buClr>
                 <a:srgbClr val="000000"/>
@@ -11355,8 +11355,8 @@
         </p:nvSpPr>
         <p:spPr>
           <a:xfrm>
-            <a:off x="503640" y="301320"/>
-            <a:ext cx="9068400" cy="1262160"/>
+            <a:off x="503640" y="301680"/>
+            <a:ext cx="9069120" cy="1262520"/>
           </a:xfrm>
           <a:prstGeom prst="rect">
             <a:avLst/>
@@ -11406,8 +11406,8 @@
         </p:nvSpPr>
         <p:spPr>
           <a:xfrm>
-            <a:off x="503640" y="1769040"/>
-            <a:ext cx="9068400" cy="4385520"/>
+            <a:off x="503640" y="1769400"/>
+            <a:ext cx="9069120" cy="4385880"/>
           </a:xfrm>
           <a:prstGeom prst="rect">
             <a:avLst/>
@@ -11420,7 +11420,7 @@
           <a:p>
             <a:pPr marL="432000" indent="-324000">
               <a:spcBef>
-                <a:spcPts val="1414"/>
+                <a:spcPts val="1417"/>
               </a:spcBef>
               <a:buClr>
                 <a:srgbClr val="000000"/>
@@ -11741,8 +11741,8 @@
         </p:nvSpPr>
         <p:spPr>
           <a:xfrm>
-            <a:off x="503640" y="301320"/>
-            <a:ext cx="9068040" cy="1261800"/>
+            <a:off x="503640" y="301680"/>
+            <a:ext cx="9069120" cy="1262520"/>
           </a:xfrm>
           <a:prstGeom prst="rect">
             <a:avLst/>
@@ -11751,8 +11751,9 @@
         <p:txBody>
           <a:bodyPr lIns="0" rIns="0" tIns="0" bIns="0" anchor="ctr"/>
           <a:p>
+            <a:pPr algn="ctr"/>
             <a:r>
-              <a:rPr b="0" lang="en-US" sz="1800" spc="-1" strike="noStrike">
+              <a:rPr b="0" lang="en-US" sz="4400" spc="-1" strike="noStrike">
                 <a:solidFill>
                   <a:srgbClr val="000000"/>
                 </a:solidFill>
@@ -11765,7 +11766,7 @@
               </a:rPr>
               <a:t>Click to edit the title text format</a:t>
             </a:r>
-            <a:endParaRPr b="0" lang="en-US" sz="1800" spc="-1" strike="noStrike">
+            <a:endParaRPr b="0" lang="en-US" sz="4400" spc="-1" strike="noStrike">
               <a:solidFill>
                 <a:srgbClr val="000000"/>
               </a:solidFill>
@@ -11791,8 +11792,8 @@
         </p:nvSpPr>
         <p:spPr>
           <a:xfrm>
-            <a:off x="503640" y="1769040"/>
-            <a:ext cx="9068040" cy="4385160"/>
+            <a:off x="503640" y="1769400"/>
+            <a:ext cx="9069120" cy="4385880"/>
           </a:xfrm>
           <a:prstGeom prst="rect">
             <a:avLst/>
@@ -11805,7 +11806,7 @@
           <a:p>
             <a:pPr marL="432000" indent="-324000">
               <a:spcBef>
-                <a:spcPts val="1414"/>
+                <a:spcPts val="1417"/>
               </a:spcBef>
               <a:buClr>
                 <a:srgbClr val="000000"/>
@@ -11815,7 +11816,7 @@
               <a:buChar char=""/>
             </a:pPr>
             <a:r>
-              <a:rPr b="0" lang="en-US" sz="1800" spc="-1" strike="noStrike">
+              <a:rPr b="0" lang="en-US" sz="3200" spc="-1" strike="noStrike">
                 <a:solidFill>
                   <a:srgbClr val="000000"/>
                 </a:solidFill>
@@ -11828,7 +11829,7 @@
               </a:rPr>
               <a:t>Click to edit the outline text format</a:t>
             </a:r>
-            <a:endParaRPr b="0" lang="en-US" sz="1800" spc="-1" strike="noStrike">
+            <a:endParaRPr b="0" lang="en-US" sz="3200" spc="-1" strike="noStrike">
               <a:solidFill>
                 <a:srgbClr val="000000"/>
               </a:solidFill>
@@ -11853,7 +11854,7 @@
               <a:buChar char=""/>
             </a:pPr>
             <a:r>
-              <a:rPr b="0" lang="en-US" sz="1800" spc="-1" strike="noStrike">
+              <a:rPr b="0" lang="en-US" sz="2800" spc="-1" strike="noStrike">
                 <a:solidFill>
                   <a:srgbClr val="000000"/>
                 </a:solidFill>
@@ -11866,7 +11867,7 @@
               </a:rPr>
               <a:t>Second Outline Level</a:t>
             </a:r>
-            <a:endParaRPr b="0" lang="en-US" sz="1800" spc="-1" strike="noStrike">
+            <a:endParaRPr b="0" lang="en-US" sz="2800" spc="-1" strike="noStrike">
               <a:solidFill>
                 <a:srgbClr val="000000"/>
               </a:solidFill>
@@ -11891,7 +11892,7 @@
               <a:buChar char=""/>
             </a:pPr>
             <a:r>
-              <a:rPr b="0" lang="en-US" sz="1800" spc="-1" strike="noStrike">
+              <a:rPr b="0" lang="en-US" sz="2400" spc="-1" strike="noStrike">
                 <a:solidFill>
                   <a:srgbClr val="000000"/>
                 </a:solidFill>
@@ -11904,7 +11905,7 @@
               </a:rPr>
               <a:t>Third Outline Level</a:t>
             </a:r>
-            <a:endParaRPr b="0" lang="en-US" sz="1800" spc="-1" strike="noStrike">
+            <a:endParaRPr b="0" lang="en-US" sz="2400" spc="-1" strike="noStrike">
               <a:solidFill>
                 <a:srgbClr val="000000"/>
               </a:solidFill>
@@ -11929,7 +11930,7 @@
               <a:buChar char=""/>
             </a:pPr>
             <a:r>
-              <a:rPr b="0" lang="en-US" sz="1800" spc="-1" strike="noStrike">
+              <a:rPr b="0" lang="en-US" sz="2000" spc="-1" strike="noStrike">
                 <a:solidFill>
                   <a:srgbClr val="000000"/>
                 </a:solidFill>
@@ -11942,7 +11943,7 @@
               </a:rPr>
               <a:t>Fourth Outline Level</a:t>
             </a:r>
-            <a:endParaRPr b="0" lang="en-US" sz="1800" spc="-1" strike="noStrike">
+            <a:endParaRPr b="0" lang="en-US" sz="2000" spc="-1" strike="noStrike">
               <a:solidFill>
                 <a:srgbClr val="000000"/>
               </a:solidFill>
@@ -11967,7 +11968,7 @@
               <a:buChar char=""/>
             </a:pPr>
             <a:r>
-              <a:rPr b="0" lang="en-US" sz="1800" spc="-1" strike="noStrike">
+              <a:rPr b="0" lang="en-US" sz="2000" spc="-1" strike="noStrike">
                 <a:solidFill>
                   <a:srgbClr val="000000"/>
                 </a:solidFill>
@@ -11980,7 +11981,7 @@
               </a:rPr>
               <a:t>Fifth Outline Level</a:t>
             </a:r>
-            <a:endParaRPr b="0" lang="en-US" sz="1800" spc="-1" strike="noStrike">
+            <a:endParaRPr b="0" lang="en-US" sz="2000" spc="-1" strike="noStrike">
               <a:solidFill>
                 <a:srgbClr val="000000"/>
               </a:solidFill>
@@ -12005,7 +12006,7 @@
               <a:buChar char=""/>
             </a:pPr>
             <a:r>
-              <a:rPr b="0" lang="en-US" sz="1800" spc="-1" strike="noStrike">
+              <a:rPr b="0" lang="en-US" sz="2000" spc="-1" strike="noStrike">
                 <a:solidFill>
                   <a:srgbClr val="000000"/>
                 </a:solidFill>
@@ -12018,7 +12019,7 @@
               </a:rPr>
               <a:t>Sixth Outline Level</a:t>
             </a:r>
-            <a:endParaRPr b="0" lang="en-US" sz="1800" spc="-1" strike="noStrike">
+            <a:endParaRPr b="0" lang="en-US" sz="2000" spc="-1" strike="noStrike">
               <a:solidFill>
                 <a:srgbClr val="000000"/>
               </a:solidFill>
@@ -12043,7 +12044,7 @@
               <a:buChar char=""/>
             </a:pPr>
             <a:r>
-              <a:rPr b="0" lang="en-US" sz="1800" spc="-1" strike="noStrike">
+              <a:rPr b="0" lang="en-US" sz="2000" spc="-1" strike="noStrike">
                 <a:solidFill>
                   <a:srgbClr val="000000"/>
                 </a:solidFill>
@@ -12056,7 +12057,7 @@
               </a:rPr>
               <a:t>Seventh Outline Level</a:t>
             </a:r>
-            <a:endParaRPr b="0" lang="en-US" sz="1800" spc="-1" strike="noStrike">
+            <a:endParaRPr b="0" lang="en-US" sz="2000" spc="-1" strike="noStrike">
               <a:solidFill>
                 <a:srgbClr val="000000"/>
               </a:solidFill>
@@ -12116,7 +12117,7 @@
         <p:spPr>
           <a:xfrm>
             <a:off x="468000" y="2340360"/>
-            <a:ext cx="9065520" cy="1260360"/>
+            <a:ext cx="9065160" cy="1260000"/>
           </a:xfrm>
           <a:prstGeom prst="rect">
             <a:avLst/>
@@ -12294,7 +12295,7 @@
         <p:spPr>
           <a:xfrm>
             <a:off x="503640" y="301320"/>
-            <a:ext cx="9065520" cy="1260000"/>
+            <a:ext cx="9065160" cy="1259640"/>
           </a:xfrm>
           <a:prstGeom prst="rect">
             <a:avLst/>
@@ -12360,7 +12361,7 @@
         <p:spPr>
           <a:xfrm>
             <a:off x="617760" y="1440360"/>
-            <a:ext cx="9001800" cy="5742720"/>
+            <a:ext cx="9001440" cy="5742360"/>
           </a:xfrm>
           <a:prstGeom prst="rect">
             <a:avLst/>
@@ -12428,7 +12429,7 @@
         <p:spPr>
           <a:xfrm>
             <a:off x="468000" y="2700720"/>
-            <a:ext cx="9066240" cy="1260720"/>
+            <a:ext cx="9065880" cy="1260360"/>
           </a:xfrm>
           <a:prstGeom prst="rect">
             <a:avLst/>
@@ -12539,7 +12540,7 @@
         <p:spPr>
           <a:xfrm>
             <a:off x="4935600" y="1554840"/>
-            <a:ext cx="4477680" cy="5670000"/>
+            <a:ext cx="4477320" cy="5669640"/>
           </a:xfrm>
           <a:prstGeom prst="rect">
             <a:avLst/>
@@ -12569,7 +12570,7 @@
         <p:spPr>
           <a:xfrm>
             <a:off x="1096560" y="1554840"/>
-            <a:ext cx="3472200" cy="5670000"/>
+            <a:ext cx="3471840" cy="5669640"/>
           </a:xfrm>
           <a:prstGeom prst="rect">
             <a:avLst/>
@@ -12599,7 +12600,7 @@
         <p:spPr>
           <a:xfrm>
             <a:off x="1736640" y="1737720"/>
-            <a:ext cx="2101320" cy="769320"/>
+            <a:ext cx="2100960" cy="768960"/>
           </a:xfrm>
           <a:prstGeom prst="rect">
             <a:avLst/>
@@ -12684,7 +12685,7 @@
         <p:spPr>
           <a:xfrm>
             <a:off x="1462320" y="2574720"/>
-            <a:ext cx="2558160" cy="1553760"/>
+            <a:ext cx="2557800" cy="1553400"/>
           </a:xfrm>
           <a:prstGeom prst="rect">
             <a:avLst/>
@@ -12714,7 +12715,7 @@
         <p:spPr>
           <a:xfrm>
             <a:off x="1553760" y="2682000"/>
-            <a:ext cx="2009880" cy="1355040"/>
+            <a:ext cx="2009520" cy="1354680"/>
           </a:xfrm>
           <a:prstGeom prst="rect">
             <a:avLst/>
@@ -12761,7 +12762,7 @@
             </a:endParaRPr>
           </a:p>
           <a:p>
-            <a:pPr marL="216000" indent="-214920">
+            <a:pPr marL="216000" indent="-214560">
               <a:lnSpc>
                 <a:spcPct val="100000"/>
               </a:lnSpc>
@@ -12800,7 +12801,7 @@
             </a:endParaRPr>
           </a:p>
           <a:p>
-            <a:pPr marL="216000" indent="-214920">
+            <a:pPr marL="216000" indent="-214560">
               <a:lnSpc>
                 <a:spcPct val="100000"/>
               </a:lnSpc>
@@ -12839,7 +12840,7 @@
             </a:endParaRPr>
           </a:p>
           <a:p>
-            <a:pPr marL="216000" indent="-214920">
+            <a:pPr marL="216000" indent="-214560">
               <a:lnSpc>
                 <a:spcPct val="100000"/>
               </a:lnSpc>
@@ -12878,7 +12879,7 @@
             </a:endParaRPr>
           </a:p>
           <a:p>
-            <a:pPr marL="216000" indent="-214920">
+            <a:pPr marL="216000" indent="-214560">
               <a:lnSpc>
                 <a:spcPct val="100000"/>
               </a:lnSpc>
@@ -12927,7 +12928,7 @@
         <p:spPr>
           <a:xfrm>
             <a:off x="5591880" y="2610720"/>
-            <a:ext cx="3015360" cy="1096560"/>
+            <a:ext cx="3015000" cy="1096200"/>
           </a:xfrm>
           <a:prstGeom prst="rect">
             <a:avLst/>
@@ -12957,7 +12958,7 @@
         <p:spPr>
           <a:xfrm>
             <a:off x="1462320" y="4427640"/>
-            <a:ext cx="2558160" cy="1882800"/>
+            <a:ext cx="2557800" cy="1882440"/>
           </a:xfrm>
           <a:prstGeom prst="rect">
             <a:avLst/>
@@ -12987,7 +12988,7 @@
         <p:spPr>
           <a:xfrm>
             <a:off x="1553760" y="4390560"/>
-            <a:ext cx="2192760" cy="1861560"/>
+            <a:ext cx="2192400" cy="1861200"/>
           </a:xfrm>
           <a:prstGeom prst="rect">
             <a:avLst/>
@@ -13034,7 +13035,7 @@
             </a:endParaRPr>
           </a:p>
           <a:p>
-            <a:pPr marL="216000" indent="-214920">
+            <a:pPr marL="216000" indent="-214560">
               <a:lnSpc>
                 <a:spcPct val="100000"/>
               </a:lnSpc>
@@ -13073,7 +13074,7 @@
             </a:endParaRPr>
           </a:p>
           <a:p>
-            <a:pPr marL="216000" indent="-214920">
+            <a:pPr marL="216000" indent="-214560">
               <a:lnSpc>
                 <a:spcPct val="100000"/>
               </a:lnSpc>
@@ -13112,7 +13113,7 @@
             </a:endParaRPr>
           </a:p>
           <a:p>
-            <a:pPr marL="216000" indent="-214920">
+            <a:pPr marL="216000" indent="-214560">
               <a:lnSpc>
                 <a:spcPct val="100000"/>
               </a:lnSpc>
@@ -13151,7 +13152,7 @@
             </a:endParaRPr>
           </a:p>
           <a:p>
-            <a:pPr marL="216000" indent="-214920">
+            <a:pPr marL="216000" indent="-214560">
               <a:lnSpc>
                 <a:spcPct val="100000"/>
               </a:lnSpc>
@@ -13190,7 +13191,7 @@
             </a:endParaRPr>
           </a:p>
           <a:p>
-            <a:pPr marL="216000" indent="-214920">
+            <a:pPr marL="216000" indent="-214560">
               <a:lnSpc>
                 <a:spcPct val="100000"/>
               </a:lnSpc>
@@ -13229,7 +13230,7 @@
             </a:endParaRPr>
           </a:p>
           <a:p>
-            <a:pPr marL="216000" indent="-214920">
+            <a:pPr marL="216000" indent="-214560">
               <a:lnSpc>
                 <a:spcPct val="100000"/>
               </a:lnSpc>
@@ -13278,7 +13279,7 @@
         <p:spPr>
           <a:xfrm>
             <a:off x="5941080" y="1738080"/>
-            <a:ext cx="1918440" cy="824760"/>
+            <a:ext cx="1918080" cy="824400"/>
           </a:xfrm>
           <a:prstGeom prst="rect">
             <a:avLst/>
@@ -13363,7 +13364,7 @@
         <p:spPr>
           <a:xfrm>
             <a:off x="5666760" y="2718000"/>
-            <a:ext cx="3198240" cy="1080720"/>
+            <a:ext cx="3197880" cy="1080360"/>
           </a:xfrm>
           <a:prstGeom prst="rect">
             <a:avLst/>
@@ -13410,7 +13411,7 @@
             </a:endParaRPr>
           </a:p>
           <a:p>
-            <a:pPr marL="216000" indent="-214920">
+            <a:pPr marL="216000" indent="-214560">
               <a:lnSpc>
                 <a:spcPct val="100000"/>
               </a:lnSpc>
@@ -13449,7 +13450,7 @@
             </a:endParaRPr>
           </a:p>
           <a:p>
-            <a:pPr marL="216000" indent="-214920">
+            <a:pPr marL="216000" indent="-214560">
               <a:lnSpc>
                 <a:spcPct val="100000"/>
               </a:lnSpc>
@@ -13498,7 +13499,7 @@
         <p:spPr>
           <a:xfrm>
             <a:off x="5849640" y="4427640"/>
-            <a:ext cx="2558160" cy="1882800"/>
+            <a:ext cx="2557800" cy="1882440"/>
           </a:xfrm>
           <a:prstGeom prst="rect">
             <a:avLst/>
@@ -13528,7 +13529,7 @@
         <p:spPr>
           <a:xfrm>
             <a:off x="5941080" y="4519080"/>
-            <a:ext cx="2192760" cy="1608120"/>
+            <a:ext cx="2192400" cy="1607760"/>
           </a:xfrm>
           <a:prstGeom prst="rect">
             <a:avLst/>
@@ -13575,7 +13576,7 @@
             </a:endParaRPr>
           </a:p>
           <a:p>
-            <a:pPr marL="216000" indent="-214920">
+            <a:pPr marL="216000" indent="-214560">
               <a:lnSpc>
                 <a:spcPct val="100000"/>
               </a:lnSpc>
@@ -13614,7 +13615,7 @@
             </a:endParaRPr>
           </a:p>
           <a:p>
-            <a:pPr marL="216000" indent="-214920">
+            <a:pPr marL="216000" indent="-214560">
               <a:lnSpc>
                 <a:spcPct val="100000"/>
               </a:lnSpc>
@@ -13653,7 +13654,7 @@
             </a:endParaRPr>
           </a:p>
           <a:p>
-            <a:pPr marL="216000" indent="-214920">
+            <a:pPr marL="216000" indent="-214560">
               <a:lnSpc>
                 <a:spcPct val="100000"/>
               </a:lnSpc>
@@ -13692,7 +13693,7 @@
             </a:endParaRPr>
           </a:p>
           <a:p>
-            <a:pPr marL="216000" indent="-214920">
+            <a:pPr marL="216000" indent="-214560">
               <a:lnSpc>
                 <a:spcPct val="100000"/>
               </a:lnSpc>
@@ -13741,7 +13742,7 @@
         <p:spPr>
           <a:xfrm>
             <a:off x="3228480" y="640080"/>
-            <a:ext cx="3259800" cy="713160"/>
+            <a:ext cx="3259440" cy="712800"/>
           </a:xfrm>
           <a:prstGeom prst="rect">
             <a:avLst/>
@@ -13852,7 +13853,7 @@
         <p:spPr>
           <a:xfrm>
             <a:off x="539640" y="-166680"/>
-            <a:ext cx="9065520" cy="1260000"/>
+            <a:ext cx="9065160" cy="1259640"/>
           </a:xfrm>
           <a:prstGeom prst="rect">
             <a:avLst/>
@@ -13918,7 +13919,7 @@
         <p:spPr>
           <a:xfrm>
             <a:off x="1046160" y="767520"/>
-            <a:ext cx="8093160" cy="6683760"/>
+            <a:ext cx="8092800" cy="6683400"/>
           </a:xfrm>
           <a:prstGeom prst="rect">
             <a:avLst/>
@@ -13937,7 +13938,7 @@
         <p:spPr>
           <a:xfrm>
             <a:off x="4661280" y="1737720"/>
-            <a:ext cx="546480" cy="363960"/>
+            <a:ext cx="546120" cy="363600"/>
           </a:xfrm>
           <a:custGeom>
             <a:avLst/>
@@ -13999,7 +14000,7 @@
         <p:spPr>
           <a:xfrm>
             <a:off x="4661280" y="3897000"/>
-            <a:ext cx="546480" cy="363960"/>
+            <a:ext cx="546120" cy="363600"/>
           </a:xfrm>
           <a:custGeom>
             <a:avLst/>
@@ -14061,7 +14062,7 @@
         <p:spPr>
           <a:xfrm>
             <a:off x="4680720" y="6036840"/>
-            <a:ext cx="546480" cy="363960"/>
+            <a:ext cx="546120" cy="363600"/>
           </a:xfrm>
           <a:custGeom>
             <a:avLst/>
@@ -14172,7 +14173,7 @@
         <p:spPr>
           <a:xfrm>
             <a:off x="503640" y="301320"/>
-            <a:ext cx="9067320" cy="1261800"/>
+            <a:ext cx="9066960" cy="1261440"/>
           </a:xfrm>
           <a:prstGeom prst="rect">
             <a:avLst/>
@@ -14234,7 +14235,7 @@
         <p:spPr>
           <a:xfrm>
             <a:off x="503640" y="1769400"/>
-            <a:ext cx="9067320" cy="5103360"/>
+            <a:ext cx="9066960" cy="5103000"/>
           </a:xfrm>
           <a:prstGeom prst="rect">
             <a:avLst/>
@@ -14253,7 +14254,7 @@
         <p:txBody>
           <a:bodyPr lIns="0" rIns="0" tIns="0" bIns="0"/>
           <a:p>
-            <a:pPr marL="432000" indent="-329760">
+            <a:pPr marL="432000" indent="-329400">
               <a:lnSpc>
                 <a:spcPct val="100000"/>
               </a:lnSpc>
@@ -14292,7 +14293,7 @@
             </a:endParaRPr>
           </a:p>
           <a:p>
-            <a:pPr lvl="1" marL="864000" indent="-342720">
+            <a:pPr lvl="1" marL="864000" indent="-342360">
               <a:lnSpc>
                 <a:spcPct val="100000"/>
               </a:lnSpc>
@@ -14331,7 +14332,7 @@
             </a:endParaRPr>
           </a:p>
           <a:p>
-            <a:pPr lvl="1" marL="864000" indent="-342720">
+            <a:pPr lvl="1" marL="864000" indent="-342360">
               <a:lnSpc>
                 <a:spcPct val="100000"/>
               </a:lnSpc>
@@ -14370,7 +14371,7 @@
             </a:endParaRPr>
           </a:p>
           <a:p>
-            <a:pPr lvl="1" marL="864000" indent="-342720">
+            <a:pPr lvl="1" marL="864000" indent="-342360">
               <a:lnSpc>
                 <a:spcPct val="100000"/>
               </a:lnSpc>
@@ -14409,7 +14410,7 @@
             </a:endParaRPr>
           </a:p>
           <a:p>
-            <a:pPr marL="457200" indent="-354960">
+            <a:pPr marL="457200" indent="-354600">
               <a:lnSpc>
                 <a:spcPct val="100000"/>
               </a:lnSpc>
@@ -14427,7 +14428,7 @@
             </a:endParaRPr>
           </a:p>
           <a:p>
-            <a:pPr marL="432000" indent="-329760">
+            <a:pPr marL="432000" indent="-329400">
               <a:lnSpc>
                 <a:spcPct val="100000"/>
               </a:lnSpc>
@@ -14469,7 +14470,7 @@
             </a:endParaRPr>
           </a:p>
           <a:p>
-            <a:pPr lvl="1" marL="864000" indent="-329760">
+            <a:pPr lvl="1" marL="864000" indent="-329400">
               <a:lnSpc>
                 <a:spcPct val="100000"/>
               </a:lnSpc>
@@ -14511,7 +14512,7 @@
             </a:endParaRPr>
           </a:p>
           <a:p>
-            <a:pPr lvl="1" marL="864000" indent="-329760">
+            <a:pPr lvl="1" marL="864000" indent="-329400">
               <a:lnSpc>
                 <a:spcPct val="100000"/>
               </a:lnSpc>
@@ -14633,7 +14634,7 @@
         <p:spPr>
           <a:xfrm>
             <a:off x="503640" y="301320"/>
-            <a:ext cx="9066600" cy="1261080"/>
+            <a:ext cx="9066240" cy="1260720"/>
           </a:xfrm>
           <a:prstGeom prst="rect">
             <a:avLst/>
@@ -14695,7 +14696,7 @@
         <p:spPr>
           <a:xfrm>
             <a:off x="581760" y="1714680"/>
-            <a:ext cx="9066600" cy="5754600"/>
+            <a:ext cx="9066240" cy="5754240"/>
           </a:xfrm>
           <a:prstGeom prst="rect">
             <a:avLst/>
@@ -14819,7 +14820,7 @@
         </p:nvGraphicFramePr>
         <p:xfrm>
           <a:off x="896400" y="2900160"/>
-          <a:ext cx="8438040" cy="3625920"/>
+          <a:ext cx="8437680" cy="3625560"/>
         </p:xfrm>
         <a:graphic>
           <a:graphicData uri="http://schemas.openxmlformats.org/drawingml/2006/table">
@@ -16665,7 +16666,7 @@
         <p:spPr>
           <a:xfrm>
             <a:off x="503640" y="301320"/>
-            <a:ext cx="9066600" cy="1261080"/>
+            <a:ext cx="9066240" cy="1260720"/>
           </a:xfrm>
           <a:prstGeom prst="rect">
             <a:avLst/>
@@ -16731,7 +16732,7 @@
         <p:spPr>
           <a:xfrm>
             <a:off x="1541160" y="1563840"/>
-            <a:ext cx="7049520" cy="5984640"/>
+            <a:ext cx="7049160" cy="5984280"/>
           </a:xfrm>
           <a:prstGeom prst="rect">
             <a:avLst/>
@@ -16799,7 +16800,7 @@
         <p:spPr>
           <a:xfrm>
             <a:off x="573840" y="1755360"/>
-            <a:ext cx="9066600" cy="4384800"/>
+            <a:ext cx="9066240" cy="4384440"/>
           </a:xfrm>
           <a:prstGeom prst="rect">
             <a:avLst/>
@@ -16824,7 +16825,7 @@
         </p:nvGraphicFramePr>
         <p:xfrm>
           <a:off x="692640" y="2267640"/>
-          <a:ext cx="8689320" cy="2024640"/>
+          <a:ext cx="8688960" cy="2024280"/>
         </p:xfrm>
         <a:graphic>
           <a:graphicData uri="http://schemas.openxmlformats.org/drawingml/2006/table">
@@ -17385,7 +17386,7 @@
         <p:spPr>
           <a:xfrm>
             <a:off x="503640" y="301320"/>
-            <a:ext cx="9066600" cy="1261080"/>
+            <a:ext cx="9066240" cy="1260720"/>
           </a:xfrm>
           <a:prstGeom prst="rect">
             <a:avLst/>
@@ -17496,7 +17497,7 @@
         <p:spPr>
           <a:xfrm>
             <a:off x="468000" y="2700720"/>
-            <a:ext cx="9066240" cy="1260720"/>
+            <a:ext cx="9065880" cy="1260360"/>
           </a:xfrm>
           <a:prstGeom prst="rect">
             <a:avLst/>
@@ -17607,7 +17608,7 @@
         <p:spPr>
           <a:xfrm>
             <a:off x="503640" y="301320"/>
-            <a:ext cx="9067320" cy="1261800"/>
+            <a:ext cx="9066960" cy="1261440"/>
           </a:xfrm>
           <a:prstGeom prst="rect">
             <a:avLst/>
@@ -17669,7 +17670,7 @@
         <p:spPr>
           <a:xfrm>
             <a:off x="573840" y="1755360"/>
-            <a:ext cx="9067320" cy="4385520"/>
+            <a:ext cx="9066960" cy="4385160"/>
           </a:xfrm>
           <a:prstGeom prst="rect">
             <a:avLst/>
@@ -17688,7 +17689,7 @@
         <p:txBody>
           <a:bodyPr lIns="0" rIns="0" tIns="0" bIns="0"/>
           <a:p>
-            <a:pPr marL="457200" indent="-430920">
+            <a:pPr marL="457200" indent="-430560">
               <a:lnSpc>
                 <a:spcPct val="100000"/>
               </a:lnSpc>
@@ -17744,7 +17745,7 @@
             </a:endParaRPr>
           </a:p>
           <a:p>
-            <a:pPr marL="457200" indent="-430920">
+            <a:pPr marL="457200" indent="-430560">
               <a:lnSpc>
                 <a:spcPct val="100000"/>
               </a:lnSpc>
@@ -17782,7 +17783,7 @@
             </a:endParaRPr>
           </a:p>
           <a:p>
-            <a:pPr marL="457200" indent="-430920">
+            <a:pPr marL="457200" indent="-430560">
               <a:lnSpc>
                 <a:spcPct val="100000"/>
               </a:lnSpc>
@@ -17853,7 +17854,7 @@
             </a:endParaRPr>
           </a:p>
           <a:p>
-            <a:pPr marL="457200" indent="-430920">
+            <a:pPr marL="457200" indent="-430560">
               <a:lnSpc>
                 <a:spcPct val="100000"/>
               </a:lnSpc>
@@ -18046,7 +18047,7 @@
         <p:spPr>
           <a:xfrm>
             <a:off x="503640" y="301320"/>
-            <a:ext cx="9066240" cy="1260720"/>
+            <a:ext cx="9065880" cy="1260360"/>
           </a:xfrm>
           <a:prstGeom prst="rect">
             <a:avLst/>
@@ -18108,7 +18109,7 @@
         <p:spPr>
           <a:xfrm>
             <a:off x="503640" y="1769400"/>
-            <a:ext cx="9066240" cy="4384440"/>
+            <a:ext cx="9065880" cy="4384080"/>
           </a:xfrm>
           <a:prstGeom prst="rect">
             <a:avLst/>
@@ -18138,7 +18139,7 @@
         <p:spPr>
           <a:xfrm>
             <a:off x="392040" y="1700280"/>
-            <a:ext cx="9330120" cy="5439240"/>
+            <a:ext cx="9329760" cy="5438880"/>
           </a:xfrm>
           <a:prstGeom prst="rect">
             <a:avLst/>
@@ -18206,7 +18207,7 @@
         <p:spPr>
           <a:xfrm>
             <a:off x="503640" y="301320"/>
-            <a:ext cx="9067320" cy="1261800"/>
+            <a:ext cx="9066960" cy="1261440"/>
           </a:xfrm>
           <a:prstGeom prst="rect">
             <a:avLst/>
@@ -18268,7 +18269,7 @@
         <p:spPr>
           <a:xfrm>
             <a:off x="573840" y="1755360"/>
-            <a:ext cx="9067320" cy="4385520"/>
+            <a:ext cx="9066960" cy="4385160"/>
           </a:xfrm>
           <a:prstGeom prst="rect">
             <a:avLst/>
@@ -18320,7 +18321,7 @@
             </a:endParaRPr>
           </a:p>
           <a:p>
-            <a:pPr marL="914400" indent="-430920">
+            <a:pPr marL="914400" indent="-430560">
               <a:lnSpc>
                 <a:spcPct val="100000"/>
               </a:lnSpc>
@@ -18358,7 +18359,7 @@
             </a:endParaRPr>
           </a:p>
           <a:p>
-            <a:pPr marL="914400" indent="-430920">
+            <a:pPr marL="914400" indent="-430560">
               <a:lnSpc>
                 <a:spcPct val="100000"/>
               </a:lnSpc>
@@ -18447,7 +18448,7 @@
             </a:endParaRPr>
           </a:p>
           <a:p>
-            <a:pPr marL="914400" indent="-430920">
+            <a:pPr marL="914400" indent="-430560">
               <a:lnSpc>
                 <a:spcPct val="100000"/>
               </a:lnSpc>
@@ -18485,7 +18486,7 @@
             </a:endParaRPr>
           </a:p>
           <a:p>
-            <a:pPr marL="914400" indent="-430920">
+            <a:pPr marL="914400" indent="-430560">
               <a:lnSpc>
                 <a:spcPct val="100000"/>
               </a:lnSpc>
@@ -18600,7 +18601,7 @@
         <p:spPr>
           <a:xfrm>
             <a:off x="503640" y="301320"/>
-            <a:ext cx="9067320" cy="1261800"/>
+            <a:ext cx="9066960" cy="1261440"/>
           </a:xfrm>
           <a:prstGeom prst="rect">
             <a:avLst/>
@@ -18662,7 +18663,7 @@
         <p:spPr>
           <a:xfrm>
             <a:off x="573840" y="1755360"/>
-            <a:ext cx="9067320" cy="4385520"/>
+            <a:ext cx="9066960" cy="4385160"/>
           </a:xfrm>
           <a:prstGeom prst="rect">
             <a:avLst/>
@@ -18681,7 +18682,7 @@
         <p:txBody>
           <a:bodyPr lIns="0" rIns="0" tIns="0" bIns="0"/>
           <a:p>
-            <a:pPr marL="457200" indent="-430920">
+            <a:pPr marL="457200" indent="-430560">
               <a:lnSpc>
                 <a:spcPct val="150000"/>
               </a:lnSpc>
@@ -18719,7 +18720,7 @@
             </a:endParaRPr>
           </a:p>
           <a:p>
-            <a:pPr marL="457200" indent="-430920">
+            <a:pPr marL="457200" indent="-430560">
               <a:lnSpc>
                 <a:spcPct val="150000"/>
               </a:lnSpc>
@@ -18757,7 +18758,7 @@
             </a:endParaRPr>
           </a:p>
           <a:p>
-            <a:pPr lvl="1" marL="914400" indent="-430920">
+            <a:pPr lvl="1" marL="914400" indent="-430560">
               <a:lnSpc>
                 <a:spcPct val="150000"/>
               </a:lnSpc>
@@ -18795,7 +18796,7 @@
             </a:endParaRPr>
           </a:p>
           <a:p>
-            <a:pPr marL="457200" indent="-430920">
+            <a:pPr marL="457200" indent="-430560">
               <a:lnSpc>
                 <a:spcPct val="150000"/>
               </a:lnSpc>
@@ -18833,7 +18834,7 @@
             </a:endParaRPr>
           </a:p>
           <a:p>
-            <a:pPr marL="457200" indent="-430920">
+            <a:pPr marL="457200" indent="-430560">
               <a:lnSpc>
                 <a:spcPct val="150000"/>
               </a:lnSpc>
@@ -18930,7 +18931,7 @@
         <p:spPr>
           <a:xfrm>
             <a:off x="503640" y="301320"/>
-            <a:ext cx="9067320" cy="1261800"/>
+            <a:ext cx="9066960" cy="1261440"/>
           </a:xfrm>
           <a:prstGeom prst="rect">
             <a:avLst/>
@@ -18992,7 +18993,7 @@
         <p:spPr>
           <a:xfrm>
             <a:off x="573840" y="1666080"/>
-            <a:ext cx="9067320" cy="4385520"/>
+            <a:ext cx="9066960" cy="4385160"/>
           </a:xfrm>
           <a:prstGeom prst="rect">
             <a:avLst/>
@@ -19058,7 +19059,7 @@
         <p:spPr>
           <a:xfrm>
             <a:off x="1267560" y="2342160"/>
-            <a:ext cx="7514640" cy="3932280"/>
+            <a:ext cx="7514280" cy="3931920"/>
           </a:xfrm>
           <a:prstGeom prst="rect">
             <a:avLst/>
@@ -19126,7 +19127,7 @@
         <p:spPr>
           <a:xfrm>
             <a:off x="503640" y="301320"/>
-            <a:ext cx="9067320" cy="1261800"/>
+            <a:ext cx="9066960" cy="1261440"/>
           </a:xfrm>
           <a:prstGeom prst="rect">
             <a:avLst/>
@@ -19188,7 +19189,7 @@
         <p:spPr>
           <a:xfrm>
             <a:off x="573840" y="1755360"/>
-            <a:ext cx="9067320" cy="4385520"/>
+            <a:ext cx="9066960" cy="4385160"/>
           </a:xfrm>
           <a:prstGeom prst="rect">
             <a:avLst/>
@@ -19213,7 +19214,7 @@
         </p:nvGraphicFramePr>
         <p:xfrm>
           <a:off x="692640" y="2267640"/>
-          <a:ext cx="8689320" cy="2700000"/>
+          <a:ext cx="8688960" cy="2699640"/>
         </p:xfrm>
         <a:graphic>
           <a:graphicData uri="http://schemas.openxmlformats.org/drawingml/2006/table">
@@ -19990,7 +19991,7 @@
         <p:spPr>
           <a:xfrm>
             <a:off x="579960" y="301320"/>
-            <a:ext cx="9067320" cy="1261800"/>
+            <a:ext cx="9066960" cy="1261440"/>
           </a:xfrm>
           <a:prstGeom prst="rect">
             <a:avLst/>
@@ -20052,7 +20053,7 @@
         <p:spPr>
           <a:xfrm>
             <a:off x="650160" y="1755360"/>
-            <a:ext cx="9067320" cy="4385520"/>
+            <a:ext cx="9066960" cy="4385160"/>
           </a:xfrm>
           <a:prstGeom prst="rect">
             <a:avLst/>
@@ -20116,7 +20117,7 @@
         </p:nvGraphicFramePr>
         <p:xfrm>
           <a:off x="1177200" y="2140920"/>
-          <a:ext cx="7274520" cy="4861800"/>
+          <a:ext cx="7274160" cy="4861440"/>
         </p:xfrm>
         <a:graphic>
           <a:graphicData uri="http://schemas.openxmlformats.org/drawingml/2006/table">
@@ -21552,7 +21553,7 @@
         <p:spPr>
           <a:xfrm>
             <a:off x="503640" y="301320"/>
-            <a:ext cx="9067320" cy="1261800"/>
+            <a:ext cx="9066960" cy="1261440"/>
           </a:xfrm>
           <a:prstGeom prst="rect">
             <a:avLst/>
@@ -21614,7 +21615,7 @@
         <p:spPr>
           <a:xfrm>
             <a:off x="573840" y="1755360"/>
-            <a:ext cx="9067320" cy="4385520"/>
+            <a:ext cx="9066960" cy="4385160"/>
           </a:xfrm>
           <a:prstGeom prst="rect">
             <a:avLst/>
@@ -21644,7 +21645,7 @@
         <p:spPr>
           <a:xfrm>
             <a:off x="932040" y="1838880"/>
-            <a:ext cx="8345520" cy="4507560"/>
+            <a:ext cx="8345160" cy="4507200"/>
           </a:xfrm>
           <a:prstGeom prst="rect">
             <a:avLst/>
@@ -21712,7 +21713,7 @@
         <p:spPr>
           <a:xfrm>
             <a:off x="503640" y="301320"/>
-            <a:ext cx="9067320" cy="1261800"/>
+            <a:ext cx="9066960" cy="1261440"/>
           </a:xfrm>
           <a:prstGeom prst="rect">
             <a:avLst/>
@@ -21774,7 +21775,7 @@
         <p:spPr>
           <a:xfrm>
             <a:off x="573840" y="1755360"/>
-            <a:ext cx="9067320" cy="4385520"/>
+            <a:ext cx="9066960" cy="4385160"/>
           </a:xfrm>
           <a:prstGeom prst="rect">
             <a:avLst/>
@@ -21799,7 +21800,7 @@
         </p:nvGraphicFramePr>
         <p:xfrm>
           <a:off x="692640" y="2267640"/>
-          <a:ext cx="8689320" cy="2700000"/>
+          <a:ext cx="8688960" cy="2699640"/>
         </p:xfrm>
         <a:graphic>
           <a:graphicData uri="http://schemas.openxmlformats.org/drawingml/2006/table">
@@ -22576,7 +22577,7 @@
         <p:spPr>
           <a:xfrm>
             <a:off x="503640" y="301320"/>
-            <a:ext cx="9067320" cy="1261800"/>
+            <a:ext cx="9066960" cy="1261440"/>
           </a:xfrm>
           <a:prstGeom prst="rect">
             <a:avLst/>
@@ -22637,7 +22638,7 @@
         </p:nvGraphicFramePr>
         <p:xfrm>
           <a:off x="1477080" y="1647360"/>
-          <a:ext cx="7230600" cy="4861800"/>
+          <a:ext cx="7230240" cy="4861440"/>
         </p:xfrm>
         <a:graphic>
           <a:graphicData uri="http://schemas.openxmlformats.org/drawingml/2006/table">
@@ -24119,7 +24120,7 @@
         <p:spPr>
           <a:xfrm>
             <a:off x="468000" y="2700720"/>
-            <a:ext cx="9066240" cy="1260720"/>
+            <a:ext cx="9065880" cy="1260360"/>
           </a:xfrm>
           <a:prstGeom prst="rect">
             <a:avLst/>
@@ -24230,7 +24231,7 @@
         <p:spPr>
           <a:xfrm>
             <a:off x="503640" y="301320"/>
-            <a:ext cx="9065520" cy="1260000"/>
+            <a:ext cx="9065160" cy="1259640"/>
           </a:xfrm>
           <a:prstGeom prst="rect">
             <a:avLst/>
@@ -24296,7 +24297,7 @@
         <p:spPr>
           <a:xfrm>
             <a:off x="62280" y="2110320"/>
-            <a:ext cx="9772200" cy="4007880"/>
+            <a:ext cx="9771840" cy="4007520"/>
           </a:xfrm>
           <a:prstGeom prst="rect">
             <a:avLst/>
@@ -24364,7 +24365,7 @@
         <p:spPr>
           <a:xfrm>
             <a:off x="468000" y="2700720"/>
-            <a:ext cx="9065520" cy="1260000"/>
+            <a:ext cx="9065160" cy="1259640"/>
           </a:xfrm>
           <a:prstGeom prst="rect">
             <a:avLst/>
@@ -24475,7 +24476,7 @@
         <p:spPr>
           <a:xfrm>
             <a:off x="503640" y="301320"/>
-            <a:ext cx="9065520" cy="1260000"/>
+            <a:ext cx="9065160" cy="1259640"/>
           </a:xfrm>
           <a:prstGeom prst="rect">
             <a:avLst/>
@@ -24541,7 +24542,7 @@
         <p:spPr>
           <a:xfrm>
             <a:off x="1300320" y="1980360"/>
-            <a:ext cx="7142760" cy="4378320"/>
+            <a:ext cx="7142400" cy="4377960"/>
           </a:xfrm>
           <a:prstGeom prst="rect">
             <a:avLst/>
@@ -24613,7 +24614,7 @@
         <p:spPr>
           <a:xfrm>
             <a:off x="1073160" y="1829160"/>
-            <a:ext cx="7911720" cy="4620600"/>
+            <a:ext cx="7911360" cy="4620240"/>
           </a:xfrm>
           <a:prstGeom prst="rect">
             <a:avLst/>
@@ -24632,7 +24633,7 @@
         <p:spPr>
           <a:xfrm>
             <a:off x="503640" y="301320"/>
-            <a:ext cx="9066960" cy="1260720"/>
+            <a:ext cx="9066600" cy="1260360"/>
           </a:xfrm>
           <a:prstGeom prst="rect">
             <a:avLst/>
@@ -24743,7 +24744,7 @@
         <p:spPr>
           <a:xfrm>
             <a:off x="503640" y="301320"/>
-            <a:ext cx="9065520" cy="1260000"/>
+            <a:ext cx="9065160" cy="1259640"/>
           </a:xfrm>
           <a:prstGeom prst="rect">
             <a:avLst/>
@@ -24809,7 +24810,7 @@
         <p:spPr>
           <a:xfrm>
             <a:off x="60120" y="2120040"/>
-            <a:ext cx="9773280" cy="3998160"/>
+            <a:ext cx="9772920" cy="3997800"/>
           </a:xfrm>
           <a:prstGeom prst="rect">
             <a:avLst/>
@@ -24881,7 +24882,7 @@
         <p:spPr>
           <a:xfrm>
             <a:off x="205200" y="1427400"/>
-            <a:ext cx="9589320" cy="5600520"/>
+            <a:ext cx="9588960" cy="5600160"/>
           </a:xfrm>
           <a:prstGeom prst="rect">
             <a:avLst/>
@@ -24900,7 +24901,7 @@
         <p:spPr>
           <a:xfrm>
             <a:off x="503640" y="301320"/>
-            <a:ext cx="9066960" cy="1260720"/>
+            <a:ext cx="9066600" cy="1260360"/>
           </a:xfrm>
           <a:prstGeom prst="rect">
             <a:avLst/>
@@ -25011,7 +25012,7 @@
         <p:spPr>
           <a:xfrm>
             <a:off x="503640" y="301320"/>
-            <a:ext cx="9065520" cy="1260000"/>
+            <a:ext cx="9065160" cy="1259640"/>
           </a:xfrm>
           <a:prstGeom prst="rect">
             <a:avLst/>
@@ -25066,7 +25067,7 @@
       </p:sp>
       <p:pic>
         <p:nvPicPr>
-          <p:cNvPr id="312" name="Shape 308" descr=""/>
+          <p:cNvPr id="312" name="" descr=""/>
           <p:cNvPicPr/>
           <p:nvPr/>
         </p:nvPicPr>
@@ -25076,8 +25077,8 @@
         </p:blipFill>
         <p:spPr>
           <a:xfrm>
-            <a:off x="62640" y="2108520"/>
-            <a:ext cx="9757080" cy="4009680"/>
+            <a:off x="29160" y="1916280"/>
+            <a:ext cx="9937800" cy="4060800"/>
           </a:xfrm>
           <a:prstGeom prst="rect">
             <a:avLst/>
@@ -25149,7 +25150,7 @@
         <p:spPr>
           <a:xfrm>
             <a:off x="135000" y="1313640"/>
-            <a:ext cx="9600480" cy="5607000"/>
+            <a:ext cx="9600120" cy="5606640"/>
           </a:xfrm>
           <a:prstGeom prst="rect">
             <a:avLst/>
@@ -25168,7 +25169,7 @@
         <p:spPr>
           <a:xfrm>
             <a:off x="503640" y="301320"/>
-            <a:ext cx="9066960" cy="1260720"/>
+            <a:ext cx="9066600" cy="1260360"/>
           </a:xfrm>
           <a:prstGeom prst="rect">
             <a:avLst/>
@@ -25279,7 +25280,7 @@
         <p:spPr>
           <a:xfrm>
             <a:off x="503640" y="301320"/>
-            <a:ext cx="9066600" cy="1260360"/>
+            <a:ext cx="9066240" cy="1260000"/>
           </a:xfrm>
           <a:prstGeom prst="rect">
             <a:avLst/>
@@ -25374,7 +25375,7 @@
         <p:spPr>
           <a:xfrm>
             <a:off x="503640" y="1769040"/>
-            <a:ext cx="9066600" cy="4383720"/>
+            <a:ext cx="9066240" cy="4383360"/>
           </a:xfrm>
           <a:prstGeom prst="rect">
             <a:avLst/>
@@ -25399,7 +25400,7 @@
         </p:nvGraphicFramePr>
         <p:xfrm>
           <a:off x="922320" y="2195280"/>
-          <a:ext cx="8454240" cy="2286360"/>
+          <a:ext cx="8453880" cy="2286000"/>
         </p:xfrm>
         <a:graphic>
           <a:graphicData uri="http://schemas.openxmlformats.org/presentationml/2006/ole">
@@ -25418,7 +25419,7 @@
                 <p:spPr>
                   <a:xfrm>
                     <a:off x="922320" y="2195280"/>
-                    <a:ext cx="8454240" cy="2286360"/>
+                    <a:ext cx="8453880" cy="2286000"/>
                   </a:xfrm>
                   <a:prstGeom prst="rect">
                     <a:avLst/>
@@ -25490,7 +25491,7 @@
         <p:spPr>
           <a:xfrm>
             <a:off x="182520" y="1920600"/>
-            <a:ext cx="2649600" cy="2468520"/>
+            <a:ext cx="2649240" cy="2468160"/>
           </a:xfrm>
           <a:prstGeom prst="rect">
             <a:avLst/>
@@ -25520,7 +25521,7 @@
         <p:spPr>
           <a:xfrm>
             <a:off x="833760" y="277200"/>
-            <a:ext cx="8408520" cy="1368360"/>
+            <a:ext cx="8408160" cy="1368000"/>
           </a:xfrm>
           <a:prstGeom prst="rect">
             <a:avLst/>
@@ -25729,7 +25730,7 @@
         <p:spPr>
           <a:xfrm>
             <a:off x="3747240" y="1554840"/>
-            <a:ext cx="5848920" cy="4788360"/>
+            <a:ext cx="5848560" cy="4788000"/>
           </a:xfrm>
           <a:prstGeom prst="rect">
             <a:avLst/>
@@ -25748,7 +25749,7 @@
         <p:spPr>
           <a:xfrm>
             <a:off x="273960" y="2286720"/>
-            <a:ext cx="3289320" cy="1638000"/>
+            <a:ext cx="3288960" cy="1637640"/>
           </a:xfrm>
           <a:prstGeom prst="rect">
             <a:avLst/>
@@ -25887,7 +25888,7 @@
         <p:spPr>
           <a:xfrm>
             <a:off x="2924640" y="2926800"/>
-            <a:ext cx="1004400" cy="456120"/>
+            <a:ext cx="1004040" cy="455760"/>
           </a:xfrm>
           <a:custGeom>
             <a:avLst/>
@@ -25951,7 +25952,7 @@
         <p:spPr>
           <a:xfrm>
             <a:off x="456840" y="6585840"/>
-            <a:ext cx="3289680" cy="456480"/>
+            <a:ext cx="3289320" cy="456120"/>
           </a:xfrm>
           <a:prstGeom prst="rect">
             <a:avLst/>
@@ -26057,7 +26058,7 @@
         <p:spPr>
           <a:xfrm>
             <a:off x="2227680" y="1063080"/>
-            <a:ext cx="5997600" cy="1336320"/>
+            <a:ext cx="5997240" cy="1335960"/>
           </a:xfrm>
           <a:prstGeom prst="rect">
             <a:avLst/>
@@ -26118,7 +26119,7 @@
         </p:nvGraphicFramePr>
         <p:xfrm>
           <a:off x="1333800" y="3056400"/>
-          <a:ext cx="7877880" cy="1516320"/>
+          <a:ext cx="7877520" cy="1515960"/>
         </p:xfrm>
         <a:graphic>
           <a:graphicData uri="http://schemas.openxmlformats.org/presentationml/2006/ole">
@@ -26137,7 +26138,7 @@
                 <p:spPr>
                   <a:xfrm>
                     <a:off x="1333800" y="3056400"/>
-                    <a:ext cx="7877880" cy="1516320"/>
+                    <a:ext cx="7877520" cy="1515960"/>
                   </a:xfrm>
                   <a:prstGeom prst="rect">
                     <a:avLst/>
@@ -26208,7 +26209,7 @@
         </p:nvGraphicFramePr>
         <p:xfrm>
           <a:off x="1279440" y="3018240"/>
-          <a:ext cx="7687800" cy="2657160"/>
+          <a:ext cx="7687440" cy="2656800"/>
         </p:xfrm>
         <a:graphic>
           <a:graphicData uri="http://schemas.openxmlformats.org/presentationml/2006/ole">
@@ -26227,7 +26228,7 @@
                 <p:spPr>
                   <a:xfrm>
                     <a:off x="1279440" y="3018240"/>
-                    <a:ext cx="7687800" cy="2657160"/>
+                    <a:ext cx="7687440" cy="2656800"/>
                   </a:xfrm>
                   <a:prstGeom prst="rect">
                     <a:avLst/>
@@ -26250,7 +26251,7 @@
         <p:spPr>
           <a:xfrm>
             <a:off x="503640" y="301680"/>
-            <a:ext cx="9068040" cy="1261800"/>
+            <a:ext cx="9067680" cy="1261440"/>
           </a:xfrm>
           <a:prstGeom prst="rect">
             <a:avLst/>
@@ -26286,6 +26287,7 @@
                   </a:solidFill>
                 </a:uFill>
                 <a:latin typeface="Arial"/>
+                <a:ea typeface="DejaVu Sans"/>
               </a:rPr>
               <a:t>Models Results</a:t>
             </a:r>
@@ -26361,7 +26363,7 @@
         <p:spPr>
           <a:xfrm>
             <a:off x="503640" y="301320"/>
-            <a:ext cx="9066240" cy="1260720"/>
+            <a:ext cx="9065880" cy="1260360"/>
           </a:xfrm>
           <a:prstGeom prst="rect">
             <a:avLst/>
@@ -26427,7 +26429,7 @@
         <p:spPr>
           <a:xfrm>
             <a:off x="456840" y="1486800"/>
-            <a:ext cx="9236160" cy="5702400"/>
+            <a:ext cx="9235800" cy="5702040"/>
           </a:xfrm>
           <a:prstGeom prst="rect">
             <a:avLst/>
@@ -26495,7 +26497,7 @@
         <p:spPr>
           <a:xfrm>
             <a:off x="503640" y="301320"/>
-            <a:ext cx="9068040" cy="1261800"/>
+            <a:ext cx="9067680" cy="1261440"/>
           </a:xfrm>
           <a:prstGeom prst="rect">
             <a:avLst/>
@@ -26530,6 +26532,7 @@
                   </a:solidFill>
                 </a:uFill>
                 <a:latin typeface="Arial"/>
+                <a:ea typeface="DejaVu Sans"/>
               </a:rPr>
               <a:t>Conclusion</a:t>
             </a:r>
@@ -26556,7 +26559,7 @@
         <p:spPr>
           <a:xfrm>
             <a:off x="503640" y="2108520"/>
-            <a:ext cx="9068040" cy="4385160"/>
+            <a:ext cx="9067680" cy="4384800"/>
           </a:xfrm>
           <a:prstGeom prst="rect">
             <a:avLst/>
@@ -26577,7 +26580,7 @@
             <a:normAutofit/>
           </a:bodyPr>
           <a:p>
-            <a:pPr marL="432000" indent="-323640">
+            <a:pPr marL="432000" indent="-323280">
               <a:lnSpc>
                 <a:spcPct val="100000"/>
               </a:lnSpc>
@@ -26602,6 +26605,7 @@
                   </a:solidFill>
                 </a:uFill>
                 <a:latin typeface="Arial"/>
+                <a:ea typeface="DejaVu Sans"/>
               </a:rPr>
               <a:t>Vital Steps</a:t>
             </a:r>
@@ -26618,7 +26622,7 @@
             </a:endParaRPr>
           </a:p>
           <a:p>
-            <a:pPr lvl="1" marL="864000" indent="-323640">
+            <a:pPr lvl="1" marL="864000" indent="-323280">
               <a:lnSpc>
                 <a:spcPct val="100000"/>
               </a:lnSpc>
@@ -26643,6 +26647,7 @@
                   </a:solidFill>
                 </a:uFill>
                 <a:latin typeface="Arial"/>
+                <a:ea typeface="DejaVu Sans"/>
               </a:rPr>
               <a:t>Feature Engineering</a:t>
             </a:r>
@@ -26659,7 +26664,7 @@
             </a:endParaRPr>
           </a:p>
           <a:p>
-            <a:pPr lvl="2" marL="1296000" indent="-287640">
+            <a:pPr lvl="2" marL="1296000" indent="-287280">
               <a:lnSpc>
                 <a:spcPct val="100000"/>
               </a:lnSpc>
@@ -26684,6 +26689,7 @@
                   </a:solidFill>
                 </a:uFill>
                 <a:latin typeface="Arial"/>
+                <a:ea typeface="DejaVu Sans"/>
               </a:rPr>
               <a:t>Surprising results with respect to most important features based on coefficients</a:t>
             </a:r>
@@ -26700,7 +26706,7 @@
             </a:endParaRPr>
           </a:p>
           <a:p>
-            <a:pPr lvl="1" marL="864000" indent="-323640">
+            <a:pPr lvl="1" marL="864000" indent="-323280">
               <a:lnSpc>
                 <a:spcPct val="100000"/>
               </a:lnSpc>
@@ -26725,6 +26731,7 @@
                   </a:solidFill>
                 </a:uFill>
                 <a:latin typeface="Arial"/>
+                <a:ea typeface="DejaVu Sans"/>
               </a:rPr>
               <a:t>Hyperparameters Tuning</a:t>
             </a:r>
@@ -26741,7 +26748,7 @@
             </a:endParaRPr>
           </a:p>
           <a:p>
-            <a:pPr marL="432000" indent="-323640">
+            <a:pPr marL="432000" indent="-323280">
               <a:lnSpc>
                 <a:spcPct val="100000"/>
               </a:lnSpc>
@@ -26766,6 +26773,7 @@
                   </a:solidFill>
                 </a:uFill>
                 <a:latin typeface="Arial"/>
+                <a:ea typeface="DejaVu Sans"/>
               </a:rPr>
               <a:t>Model Performance:</a:t>
             </a:r>
@@ -26782,7 +26790,7 @@
             </a:endParaRPr>
           </a:p>
           <a:p>
-            <a:pPr lvl="1" marL="864000" indent="-323640">
+            <a:pPr lvl="1" marL="864000" indent="-323280">
               <a:lnSpc>
                 <a:spcPct val="100000"/>
               </a:lnSpc>
@@ -26806,6 +26814,7 @@
                   </a:solidFill>
                 </a:uFill>
                 <a:latin typeface="Arial"/>
+                <a:ea typeface="DejaVu Sans"/>
               </a:rPr>
               <a:t> </a:t>
             </a:r>
@@ -26820,6 +26829,7 @@
                   </a:solidFill>
                 </a:uFill>
                 <a:latin typeface="Arial"/>
+                <a:ea typeface="DejaVu Sans"/>
               </a:rPr>
               <a:t>Ridge Regression</a:t>
             </a:r>
@@ -26836,7 +26846,7 @@
             </a:endParaRPr>
           </a:p>
           <a:p>
-            <a:pPr lvl="1" marL="864000" indent="-323640">
+            <a:pPr lvl="1" marL="864000" indent="-323280">
               <a:lnSpc>
                 <a:spcPct val="100000"/>
               </a:lnSpc>
@@ -26860,6 +26870,7 @@
                   </a:solidFill>
                 </a:uFill>
                 <a:latin typeface="Arial"/>
+                <a:ea typeface="DejaVu Sans"/>
               </a:rPr>
               <a:t> </a:t>
             </a:r>
@@ -26874,6 +26885,7 @@
                   </a:solidFill>
                 </a:uFill>
                 <a:latin typeface="Arial"/>
+                <a:ea typeface="DejaVu Sans"/>
               </a:rPr>
               <a:t>Lasso Regression (within ensembling process)    </a:t>
             </a:r>
@@ -26949,7 +26961,7 @@
         <p:spPr>
           <a:xfrm>
             <a:off x="539640" y="180000"/>
-            <a:ext cx="9065520" cy="1260000"/>
+            <a:ext cx="9065160" cy="1259640"/>
           </a:xfrm>
           <a:prstGeom prst="rect">
             <a:avLst/>
@@ -27015,7 +27027,7 @@
         <p:spPr>
           <a:xfrm>
             <a:off x="539640" y="1224720"/>
-            <a:ext cx="9283320" cy="5922360"/>
+            <a:ext cx="9282960" cy="5922000"/>
           </a:xfrm>
           <a:prstGeom prst="rect">
             <a:avLst/>
@@ -27083,7 +27095,7 @@
         <p:spPr>
           <a:xfrm>
             <a:off x="503640" y="301320"/>
-            <a:ext cx="9065520" cy="1260000"/>
+            <a:ext cx="9065160" cy="1259640"/>
           </a:xfrm>
           <a:prstGeom prst="rect">
             <a:avLst/>
@@ -27149,7 +27161,7 @@
         <p:spPr>
           <a:xfrm>
             <a:off x="1079280" y="1440360"/>
-            <a:ext cx="8157600" cy="5204520"/>
+            <a:ext cx="8157240" cy="5204160"/>
           </a:xfrm>
           <a:prstGeom prst="rect">
             <a:avLst/>
@@ -27217,7 +27229,7 @@
         <p:spPr>
           <a:xfrm>
             <a:off x="503640" y="301320"/>
-            <a:ext cx="9065520" cy="1260000"/>
+            <a:ext cx="9065160" cy="1259640"/>
           </a:xfrm>
           <a:prstGeom prst="rect">
             <a:avLst/>
@@ -27283,7 +27295,7 @@
         <p:spPr>
           <a:xfrm>
             <a:off x="1233360" y="1800360"/>
-            <a:ext cx="7391160" cy="4715280"/>
+            <a:ext cx="7390800" cy="4714920"/>
           </a:xfrm>
           <a:prstGeom prst="rect">
             <a:avLst/>
@@ -27351,7 +27363,7 @@
         <p:spPr>
           <a:xfrm>
             <a:off x="503640" y="301320"/>
-            <a:ext cx="9066600" cy="1261080"/>
+            <a:ext cx="9066240" cy="1260720"/>
           </a:xfrm>
           <a:prstGeom prst="rect">
             <a:avLst/>
@@ -27417,7 +27429,7 @@
         <p:spPr>
           <a:xfrm>
             <a:off x="955440" y="1756080"/>
-            <a:ext cx="7887960" cy="5670360"/>
+            <a:ext cx="7887600" cy="5670000"/>
           </a:xfrm>
           <a:prstGeom prst="rect">
             <a:avLst/>
@@ -27485,7 +27497,7 @@
         <p:spPr>
           <a:xfrm>
             <a:off x="503640" y="301320"/>
-            <a:ext cx="9066600" cy="1261080"/>
+            <a:ext cx="9066240" cy="1260720"/>
           </a:xfrm>
           <a:prstGeom prst="rect">
             <a:avLst/>
@@ -27551,7 +27563,7 @@
         <p:spPr>
           <a:xfrm>
             <a:off x="966600" y="1563840"/>
-            <a:ext cx="7826040" cy="5663520"/>
+            <a:ext cx="7825680" cy="5663160"/>
           </a:xfrm>
           <a:prstGeom prst="rect">
             <a:avLst/>

</xml_diff>

<commit_message>
Added Variable Importance Plots for Random Forests and Gradient Boosting
</commit_message>
<xml_diff>
--- a/Least Squares Presentation.pptx
+++ b/Least Squares Presentation.pptx
@@ -9812,8 +9812,8 @@
         </p:nvSpPr>
         <p:spPr>
           <a:xfrm>
-            <a:off x="503640" y="301320"/>
-            <a:ext cx="9067680" cy="1261440"/>
+            <a:off x="503640" y="301680"/>
+            <a:ext cx="9068760" cy="1262160"/>
           </a:xfrm>
           <a:prstGeom prst="rect">
             <a:avLst/>
@@ -12117,7 +12117,7 @@
         <p:spPr>
           <a:xfrm>
             <a:off x="468000" y="2340360"/>
-            <a:ext cx="9065160" cy="1260000"/>
+            <a:ext cx="9064800" cy="1259640"/>
           </a:xfrm>
           <a:prstGeom prst="rect">
             <a:avLst/>
@@ -12295,7 +12295,7 @@
         <p:spPr>
           <a:xfrm>
             <a:off x="503640" y="301320"/>
-            <a:ext cx="9065160" cy="1259640"/>
+            <a:ext cx="9064800" cy="1259280"/>
           </a:xfrm>
           <a:prstGeom prst="rect">
             <a:avLst/>
@@ -12361,7 +12361,7 @@
         <p:spPr>
           <a:xfrm>
             <a:off x="617760" y="1440360"/>
-            <a:ext cx="9001440" cy="5742360"/>
+            <a:ext cx="9001080" cy="5742000"/>
           </a:xfrm>
           <a:prstGeom prst="rect">
             <a:avLst/>
@@ -12429,7 +12429,7 @@
         <p:spPr>
           <a:xfrm>
             <a:off x="468000" y="2700720"/>
-            <a:ext cx="9065880" cy="1260360"/>
+            <a:ext cx="9065520" cy="1260000"/>
           </a:xfrm>
           <a:prstGeom prst="rect">
             <a:avLst/>
@@ -12540,7 +12540,7 @@
         <p:spPr>
           <a:xfrm>
             <a:off x="4935600" y="1554840"/>
-            <a:ext cx="4477320" cy="5669640"/>
+            <a:ext cx="4476960" cy="5669280"/>
           </a:xfrm>
           <a:prstGeom prst="rect">
             <a:avLst/>
@@ -12570,7 +12570,7 @@
         <p:spPr>
           <a:xfrm>
             <a:off x="1096560" y="1554840"/>
-            <a:ext cx="3471840" cy="5669640"/>
+            <a:ext cx="3471480" cy="5669280"/>
           </a:xfrm>
           <a:prstGeom prst="rect">
             <a:avLst/>
@@ -12600,7 +12600,7 @@
         <p:spPr>
           <a:xfrm>
             <a:off x="1736640" y="1737720"/>
-            <a:ext cx="2100960" cy="768960"/>
+            <a:ext cx="2100600" cy="768600"/>
           </a:xfrm>
           <a:prstGeom prst="rect">
             <a:avLst/>
@@ -12685,7 +12685,7 @@
         <p:spPr>
           <a:xfrm>
             <a:off x="1462320" y="2574720"/>
-            <a:ext cx="2557800" cy="1553400"/>
+            <a:ext cx="2557440" cy="1553040"/>
           </a:xfrm>
           <a:prstGeom prst="rect">
             <a:avLst/>
@@ -12715,7 +12715,7 @@
         <p:spPr>
           <a:xfrm>
             <a:off x="1553760" y="2682000"/>
-            <a:ext cx="2009520" cy="1354680"/>
+            <a:ext cx="2009160" cy="1354320"/>
           </a:xfrm>
           <a:prstGeom prst="rect">
             <a:avLst/>
@@ -12762,7 +12762,7 @@
             </a:endParaRPr>
           </a:p>
           <a:p>
-            <a:pPr marL="216000" indent="-214560">
+            <a:pPr marL="216000" indent="-214200">
               <a:lnSpc>
                 <a:spcPct val="100000"/>
               </a:lnSpc>
@@ -12801,7 +12801,7 @@
             </a:endParaRPr>
           </a:p>
           <a:p>
-            <a:pPr marL="216000" indent="-214560">
+            <a:pPr marL="216000" indent="-214200">
               <a:lnSpc>
                 <a:spcPct val="100000"/>
               </a:lnSpc>
@@ -12840,7 +12840,7 @@
             </a:endParaRPr>
           </a:p>
           <a:p>
-            <a:pPr marL="216000" indent="-214560">
+            <a:pPr marL="216000" indent="-214200">
               <a:lnSpc>
                 <a:spcPct val="100000"/>
               </a:lnSpc>
@@ -12879,7 +12879,7 @@
             </a:endParaRPr>
           </a:p>
           <a:p>
-            <a:pPr marL="216000" indent="-214560">
+            <a:pPr marL="216000" indent="-214200">
               <a:lnSpc>
                 <a:spcPct val="100000"/>
               </a:lnSpc>
@@ -12928,7 +12928,7 @@
         <p:spPr>
           <a:xfrm>
             <a:off x="5591880" y="2610720"/>
-            <a:ext cx="3015000" cy="1096200"/>
+            <a:ext cx="3014640" cy="1095840"/>
           </a:xfrm>
           <a:prstGeom prst="rect">
             <a:avLst/>
@@ -12958,7 +12958,7 @@
         <p:spPr>
           <a:xfrm>
             <a:off x="1462320" y="4427640"/>
-            <a:ext cx="2557800" cy="1882440"/>
+            <a:ext cx="2557440" cy="1882080"/>
           </a:xfrm>
           <a:prstGeom prst="rect">
             <a:avLst/>
@@ -12988,7 +12988,7 @@
         <p:spPr>
           <a:xfrm>
             <a:off x="1553760" y="4390560"/>
-            <a:ext cx="2192400" cy="1861200"/>
+            <a:ext cx="2192040" cy="1860840"/>
           </a:xfrm>
           <a:prstGeom prst="rect">
             <a:avLst/>
@@ -13035,7 +13035,7 @@
             </a:endParaRPr>
           </a:p>
           <a:p>
-            <a:pPr marL="216000" indent="-214560">
+            <a:pPr marL="216000" indent="-214200">
               <a:lnSpc>
                 <a:spcPct val="100000"/>
               </a:lnSpc>
@@ -13074,7 +13074,7 @@
             </a:endParaRPr>
           </a:p>
           <a:p>
-            <a:pPr marL="216000" indent="-214560">
+            <a:pPr marL="216000" indent="-214200">
               <a:lnSpc>
                 <a:spcPct val="100000"/>
               </a:lnSpc>
@@ -13113,7 +13113,7 @@
             </a:endParaRPr>
           </a:p>
           <a:p>
-            <a:pPr marL="216000" indent="-214560">
+            <a:pPr marL="216000" indent="-214200">
               <a:lnSpc>
                 <a:spcPct val="100000"/>
               </a:lnSpc>
@@ -13152,7 +13152,7 @@
             </a:endParaRPr>
           </a:p>
           <a:p>
-            <a:pPr marL="216000" indent="-214560">
+            <a:pPr marL="216000" indent="-214200">
               <a:lnSpc>
                 <a:spcPct val="100000"/>
               </a:lnSpc>
@@ -13191,7 +13191,7 @@
             </a:endParaRPr>
           </a:p>
           <a:p>
-            <a:pPr marL="216000" indent="-214560">
+            <a:pPr marL="216000" indent="-214200">
               <a:lnSpc>
                 <a:spcPct val="100000"/>
               </a:lnSpc>
@@ -13230,7 +13230,7 @@
             </a:endParaRPr>
           </a:p>
           <a:p>
-            <a:pPr marL="216000" indent="-214560">
+            <a:pPr marL="216000" indent="-214200">
               <a:lnSpc>
                 <a:spcPct val="100000"/>
               </a:lnSpc>
@@ -13279,7 +13279,7 @@
         <p:spPr>
           <a:xfrm>
             <a:off x="5941080" y="1738080"/>
-            <a:ext cx="1918080" cy="824400"/>
+            <a:ext cx="1917720" cy="824040"/>
           </a:xfrm>
           <a:prstGeom prst="rect">
             <a:avLst/>
@@ -13364,7 +13364,7 @@
         <p:spPr>
           <a:xfrm>
             <a:off x="5666760" y="2718000"/>
-            <a:ext cx="3197880" cy="1080360"/>
+            <a:ext cx="3197520" cy="1080000"/>
           </a:xfrm>
           <a:prstGeom prst="rect">
             <a:avLst/>
@@ -13411,7 +13411,7 @@
             </a:endParaRPr>
           </a:p>
           <a:p>
-            <a:pPr marL="216000" indent="-214560">
+            <a:pPr marL="216000" indent="-214200">
               <a:lnSpc>
                 <a:spcPct val="100000"/>
               </a:lnSpc>
@@ -13450,7 +13450,7 @@
             </a:endParaRPr>
           </a:p>
           <a:p>
-            <a:pPr marL="216000" indent="-214560">
+            <a:pPr marL="216000" indent="-214200">
               <a:lnSpc>
                 <a:spcPct val="100000"/>
               </a:lnSpc>
@@ -13499,7 +13499,7 @@
         <p:spPr>
           <a:xfrm>
             <a:off x="5849640" y="4427640"/>
-            <a:ext cx="2557800" cy="1882440"/>
+            <a:ext cx="2557440" cy="1882080"/>
           </a:xfrm>
           <a:prstGeom prst="rect">
             <a:avLst/>
@@ -13529,7 +13529,7 @@
         <p:spPr>
           <a:xfrm>
             <a:off x="5941080" y="4519080"/>
-            <a:ext cx="2192400" cy="1607760"/>
+            <a:ext cx="2192040" cy="1607400"/>
           </a:xfrm>
           <a:prstGeom prst="rect">
             <a:avLst/>
@@ -13576,7 +13576,7 @@
             </a:endParaRPr>
           </a:p>
           <a:p>
-            <a:pPr marL="216000" indent="-214560">
+            <a:pPr marL="216000" indent="-214200">
               <a:lnSpc>
                 <a:spcPct val="100000"/>
               </a:lnSpc>
@@ -13615,7 +13615,7 @@
             </a:endParaRPr>
           </a:p>
           <a:p>
-            <a:pPr marL="216000" indent="-214560">
+            <a:pPr marL="216000" indent="-214200">
               <a:lnSpc>
                 <a:spcPct val="100000"/>
               </a:lnSpc>
@@ -13654,7 +13654,7 @@
             </a:endParaRPr>
           </a:p>
           <a:p>
-            <a:pPr marL="216000" indent="-214560">
+            <a:pPr marL="216000" indent="-214200">
               <a:lnSpc>
                 <a:spcPct val="100000"/>
               </a:lnSpc>
@@ -13693,7 +13693,7 @@
             </a:endParaRPr>
           </a:p>
           <a:p>
-            <a:pPr marL="216000" indent="-214560">
+            <a:pPr marL="216000" indent="-214200">
               <a:lnSpc>
                 <a:spcPct val="100000"/>
               </a:lnSpc>
@@ -13742,7 +13742,7 @@
         <p:spPr>
           <a:xfrm>
             <a:off x="3228480" y="640080"/>
-            <a:ext cx="3259440" cy="712800"/>
+            <a:ext cx="3259080" cy="712440"/>
           </a:xfrm>
           <a:prstGeom prst="rect">
             <a:avLst/>
@@ -13853,7 +13853,7 @@
         <p:spPr>
           <a:xfrm>
             <a:off x="539640" y="-166680"/>
-            <a:ext cx="9065160" cy="1259640"/>
+            <a:ext cx="9064800" cy="1259280"/>
           </a:xfrm>
           <a:prstGeom prst="rect">
             <a:avLst/>
@@ -13919,7 +13919,7 @@
         <p:spPr>
           <a:xfrm>
             <a:off x="1046160" y="767520"/>
-            <a:ext cx="8092800" cy="6683400"/>
+            <a:ext cx="8092440" cy="6683040"/>
           </a:xfrm>
           <a:prstGeom prst="rect">
             <a:avLst/>
@@ -13938,7 +13938,7 @@
         <p:spPr>
           <a:xfrm>
             <a:off x="4661280" y="1737720"/>
-            <a:ext cx="546120" cy="363600"/>
+            <a:ext cx="545760" cy="363240"/>
           </a:xfrm>
           <a:custGeom>
             <a:avLst/>
@@ -14000,7 +14000,7 @@
         <p:spPr>
           <a:xfrm>
             <a:off x="4661280" y="3897000"/>
-            <a:ext cx="546120" cy="363600"/>
+            <a:ext cx="545760" cy="363240"/>
           </a:xfrm>
           <a:custGeom>
             <a:avLst/>
@@ -14062,7 +14062,7 @@
         <p:spPr>
           <a:xfrm>
             <a:off x="4680720" y="6036840"/>
-            <a:ext cx="546120" cy="363600"/>
+            <a:ext cx="545760" cy="363240"/>
           </a:xfrm>
           <a:custGeom>
             <a:avLst/>
@@ -14173,7 +14173,7 @@
         <p:spPr>
           <a:xfrm>
             <a:off x="503640" y="301320"/>
-            <a:ext cx="9066960" cy="1261440"/>
+            <a:ext cx="9066600" cy="1261080"/>
           </a:xfrm>
           <a:prstGeom prst="rect">
             <a:avLst/>
@@ -14235,7 +14235,7 @@
         <p:spPr>
           <a:xfrm>
             <a:off x="503640" y="1769400"/>
-            <a:ext cx="9066960" cy="5103000"/>
+            <a:ext cx="9066600" cy="5102640"/>
           </a:xfrm>
           <a:prstGeom prst="rect">
             <a:avLst/>
@@ -14254,7 +14254,7 @@
         <p:txBody>
           <a:bodyPr lIns="0" rIns="0" tIns="0" bIns="0"/>
           <a:p>
-            <a:pPr marL="432000" indent="-329400">
+            <a:pPr marL="432000" indent="-329040">
               <a:lnSpc>
                 <a:spcPct val="100000"/>
               </a:lnSpc>
@@ -14293,7 +14293,7 @@
             </a:endParaRPr>
           </a:p>
           <a:p>
-            <a:pPr lvl="1" marL="864000" indent="-342360">
+            <a:pPr lvl="1" marL="864000" indent="-342000">
               <a:lnSpc>
                 <a:spcPct val="100000"/>
               </a:lnSpc>
@@ -14332,7 +14332,7 @@
             </a:endParaRPr>
           </a:p>
           <a:p>
-            <a:pPr lvl="1" marL="864000" indent="-342360">
+            <a:pPr lvl="1" marL="864000" indent="-342000">
               <a:lnSpc>
                 <a:spcPct val="100000"/>
               </a:lnSpc>
@@ -14371,7 +14371,7 @@
             </a:endParaRPr>
           </a:p>
           <a:p>
-            <a:pPr lvl="1" marL="864000" indent="-342360">
+            <a:pPr lvl="1" marL="864000" indent="-342000">
               <a:lnSpc>
                 <a:spcPct val="100000"/>
               </a:lnSpc>
@@ -14410,7 +14410,7 @@
             </a:endParaRPr>
           </a:p>
           <a:p>
-            <a:pPr marL="457200" indent="-354600">
+            <a:pPr marL="457200" indent="-354240">
               <a:lnSpc>
                 <a:spcPct val="100000"/>
               </a:lnSpc>
@@ -14428,7 +14428,7 @@
             </a:endParaRPr>
           </a:p>
           <a:p>
-            <a:pPr marL="432000" indent="-329400">
+            <a:pPr marL="432000" indent="-329040">
               <a:lnSpc>
                 <a:spcPct val="100000"/>
               </a:lnSpc>
@@ -14470,7 +14470,7 @@
             </a:endParaRPr>
           </a:p>
           <a:p>
-            <a:pPr lvl="1" marL="864000" indent="-329400">
+            <a:pPr lvl="1" marL="864000" indent="-329040">
               <a:lnSpc>
                 <a:spcPct val="100000"/>
               </a:lnSpc>
@@ -14512,7 +14512,7 @@
             </a:endParaRPr>
           </a:p>
           <a:p>
-            <a:pPr lvl="1" marL="864000" indent="-329400">
+            <a:pPr lvl="1" marL="864000" indent="-329040">
               <a:lnSpc>
                 <a:spcPct val="100000"/>
               </a:lnSpc>
@@ -14634,7 +14634,7 @@
         <p:spPr>
           <a:xfrm>
             <a:off x="503640" y="301320"/>
-            <a:ext cx="9066240" cy="1260720"/>
+            <a:ext cx="9065880" cy="1260360"/>
           </a:xfrm>
           <a:prstGeom prst="rect">
             <a:avLst/>
@@ -14696,7 +14696,7 @@
         <p:spPr>
           <a:xfrm>
             <a:off x="581760" y="1714680"/>
-            <a:ext cx="9066240" cy="5754240"/>
+            <a:ext cx="9065880" cy="5753880"/>
           </a:xfrm>
           <a:prstGeom prst="rect">
             <a:avLst/>
@@ -16666,7 +16666,7 @@
         <p:spPr>
           <a:xfrm>
             <a:off x="503640" y="301320"/>
-            <a:ext cx="9066240" cy="1260720"/>
+            <a:ext cx="9065880" cy="1260360"/>
           </a:xfrm>
           <a:prstGeom prst="rect">
             <a:avLst/>
@@ -16732,7 +16732,7 @@
         <p:spPr>
           <a:xfrm>
             <a:off x="1541160" y="1563840"/>
-            <a:ext cx="7049160" cy="5984280"/>
+            <a:ext cx="7048800" cy="5983920"/>
           </a:xfrm>
           <a:prstGeom prst="rect">
             <a:avLst/>
@@ -16800,7 +16800,7 @@
         <p:spPr>
           <a:xfrm>
             <a:off x="573840" y="1755360"/>
-            <a:ext cx="9066240" cy="4384440"/>
+            <a:ext cx="9065880" cy="4384080"/>
           </a:xfrm>
           <a:prstGeom prst="rect">
             <a:avLst/>
@@ -17386,7 +17386,7 @@
         <p:spPr>
           <a:xfrm>
             <a:off x="503640" y="301320"/>
-            <a:ext cx="9066240" cy="1260720"/>
+            <a:ext cx="9065880" cy="1260360"/>
           </a:xfrm>
           <a:prstGeom prst="rect">
             <a:avLst/>
@@ -17497,7 +17497,7 @@
         <p:spPr>
           <a:xfrm>
             <a:off x="468000" y="2700720"/>
-            <a:ext cx="9065880" cy="1260360"/>
+            <a:ext cx="9065520" cy="1260000"/>
           </a:xfrm>
           <a:prstGeom prst="rect">
             <a:avLst/>
@@ -17608,7 +17608,7 @@
         <p:spPr>
           <a:xfrm>
             <a:off x="503640" y="301320"/>
-            <a:ext cx="9066960" cy="1261440"/>
+            <a:ext cx="9066600" cy="1261080"/>
           </a:xfrm>
           <a:prstGeom prst="rect">
             <a:avLst/>
@@ -17670,7 +17670,7 @@
         <p:spPr>
           <a:xfrm>
             <a:off x="573840" y="1755360"/>
-            <a:ext cx="9066960" cy="4385160"/>
+            <a:ext cx="9066600" cy="4384800"/>
           </a:xfrm>
           <a:prstGeom prst="rect">
             <a:avLst/>
@@ -17689,7 +17689,7 @@
         <p:txBody>
           <a:bodyPr lIns="0" rIns="0" tIns="0" bIns="0"/>
           <a:p>
-            <a:pPr marL="457200" indent="-430560">
+            <a:pPr marL="457200" indent="-430200">
               <a:lnSpc>
                 <a:spcPct val="100000"/>
               </a:lnSpc>
@@ -17745,7 +17745,7 @@
             </a:endParaRPr>
           </a:p>
           <a:p>
-            <a:pPr marL="457200" indent="-430560">
+            <a:pPr marL="457200" indent="-430200">
               <a:lnSpc>
                 <a:spcPct val="100000"/>
               </a:lnSpc>
@@ -17783,7 +17783,7 @@
             </a:endParaRPr>
           </a:p>
           <a:p>
-            <a:pPr marL="457200" indent="-430560">
+            <a:pPr marL="457200" indent="-430200">
               <a:lnSpc>
                 <a:spcPct val="100000"/>
               </a:lnSpc>
@@ -17854,7 +17854,7 @@
             </a:endParaRPr>
           </a:p>
           <a:p>
-            <a:pPr marL="457200" indent="-430560">
+            <a:pPr marL="457200" indent="-430200">
               <a:lnSpc>
                 <a:spcPct val="100000"/>
               </a:lnSpc>
@@ -18047,7 +18047,7 @@
         <p:spPr>
           <a:xfrm>
             <a:off x="503640" y="301320"/>
-            <a:ext cx="9065880" cy="1260360"/>
+            <a:ext cx="9065520" cy="1260000"/>
           </a:xfrm>
           <a:prstGeom prst="rect">
             <a:avLst/>
@@ -18109,7 +18109,7 @@
         <p:spPr>
           <a:xfrm>
             <a:off x="503640" y="1769400"/>
-            <a:ext cx="9065880" cy="4384080"/>
+            <a:ext cx="9065520" cy="4383720"/>
           </a:xfrm>
           <a:prstGeom prst="rect">
             <a:avLst/>
@@ -18139,7 +18139,7 @@
         <p:spPr>
           <a:xfrm>
             <a:off x="392040" y="1700280"/>
-            <a:ext cx="9329760" cy="5438880"/>
+            <a:ext cx="9329400" cy="5438520"/>
           </a:xfrm>
           <a:prstGeom prst="rect">
             <a:avLst/>
@@ -18207,7 +18207,7 @@
         <p:spPr>
           <a:xfrm>
             <a:off x="503640" y="301320"/>
-            <a:ext cx="9066960" cy="1261440"/>
+            <a:ext cx="9066600" cy="1261080"/>
           </a:xfrm>
           <a:prstGeom prst="rect">
             <a:avLst/>
@@ -18269,7 +18269,7 @@
         <p:spPr>
           <a:xfrm>
             <a:off x="573840" y="1755360"/>
-            <a:ext cx="9066960" cy="4385160"/>
+            <a:ext cx="9066600" cy="4384800"/>
           </a:xfrm>
           <a:prstGeom prst="rect">
             <a:avLst/>
@@ -18321,7 +18321,7 @@
             </a:endParaRPr>
           </a:p>
           <a:p>
-            <a:pPr marL="914400" indent="-430560">
+            <a:pPr marL="914400" indent="-430200">
               <a:lnSpc>
                 <a:spcPct val="100000"/>
               </a:lnSpc>
@@ -18359,7 +18359,7 @@
             </a:endParaRPr>
           </a:p>
           <a:p>
-            <a:pPr marL="914400" indent="-430560">
+            <a:pPr marL="914400" indent="-430200">
               <a:lnSpc>
                 <a:spcPct val="100000"/>
               </a:lnSpc>
@@ -18448,7 +18448,7 @@
             </a:endParaRPr>
           </a:p>
           <a:p>
-            <a:pPr marL="914400" indent="-430560">
+            <a:pPr marL="914400" indent="-430200">
               <a:lnSpc>
                 <a:spcPct val="100000"/>
               </a:lnSpc>
@@ -18486,7 +18486,7 @@
             </a:endParaRPr>
           </a:p>
           <a:p>
-            <a:pPr marL="914400" indent="-430560">
+            <a:pPr marL="914400" indent="-430200">
               <a:lnSpc>
                 <a:spcPct val="100000"/>
               </a:lnSpc>
@@ -18601,7 +18601,7 @@
         <p:spPr>
           <a:xfrm>
             <a:off x="503640" y="301320"/>
-            <a:ext cx="9066960" cy="1261440"/>
+            <a:ext cx="9066600" cy="1261080"/>
           </a:xfrm>
           <a:prstGeom prst="rect">
             <a:avLst/>
@@ -18663,7 +18663,7 @@
         <p:spPr>
           <a:xfrm>
             <a:off x="573840" y="1755360"/>
-            <a:ext cx="9066960" cy="4385160"/>
+            <a:ext cx="9066600" cy="4384800"/>
           </a:xfrm>
           <a:prstGeom prst="rect">
             <a:avLst/>
@@ -18682,7 +18682,7 @@
         <p:txBody>
           <a:bodyPr lIns="0" rIns="0" tIns="0" bIns="0"/>
           <a:p>
-            <a:pPr marL="457200" indent="-430560">
+            <a:pPr marL="457200" indent="-430200">
               <a:lnSpc>
                 <a:spcPct val="150000"/>
               </a:lnSpc>
@@ -18720,7 +18720,7 @@
             </a:endParaRPr>
           </a:p>
           <a:p>
-            <a:pPr marL="457200" indent="-430560">
+            <a:pPr marL="457200" indent="-430200">
               <a:lnSpc>
                 <a:spcPct val="150000"/>
               </a:lnSpc>
@@ -18758,7 +18758,7 @@
             </a:endParaRPr>
           </a:p>
           <a:p>
-            <a:pPr lvl="1" marL="914400" indent="-430560">
+            <a:pPr lvl="1" marL="914400" indent="-430200">
               <a:lnSpc>
                 <a:spcPct val="150000"/>
               </a:lnSpc>
@@ -18796,7 +18796,7 @@
             </a:endParaRPr>
           </a:p>
           <a:p>
-            <a:pPr marL="457200" indent="-430560">
+            <a:pPr marL="457200" indent="-430200">
               <a:lnSpc>
                 <a:spcPct val="150000"/>
               </a:lnSpc>
@@ -18834,7 +18834,7 @@
             </a:endParaRPr>
           </a:p>
           <a:p>
-            <a:pPr marL="457200" indent="-430560">
+            <a:pPr marL="457200" indent="-430200">
               <a:lnSpc>
                 <a:spcPct val="150000"/>
               </a:lnSpc>
@@ -18931,7 +18931,7 @@
         <p:spPr>
           <a:xfrm>
             <a:off x="503640" y="301320"/>
-            <a:ext cx="9066960" cy="1261440"/>
+            <a:ext cx="9066600" cy="1261080"/>
           </a:xfrm>
           <a:prstGeom prst="rect">
             <a:avLst/>
@@ -18993,7 +18993,7 @@
         <p:spPr>
           <a:xfrm>
             <a:off x="573840" y="1666080"/>
-            <a:ext cx="9066960" cy="4385160"/>
+            <a:ext cx="9066600" cy="4384800"/>
           </a:xfrm>
           <a:prstGeom prst="rect">
             <a:avLst/>
@@ -19059,7 +19059,7 @@
         <p:spPr>
           <a:xfrm>
             <a:off x="1267560" y="2342160"/>
-            <a:ext cx="7514280" cy="3931920"/>
+            <a:ext cx="7513920" cy="3931560"/>
           </a:xfrm>
           <a:prstGeom prst="rect">
             <a:avLst/>
@@ -19127,7 +19127,7 @@
         <p:spPr>
           <a:xfrm>
             <a:off x="503640" y="301320"/>
-            <a:ext cx="9066960" cy="1261440"/>
+            <a:ext cx="9066600" cy="1261080"/>
           </a:xfrm>
           <a:prstGeom prst="rect">
             <a:avLst/>
@@ -19189,7 +19189,7 @@
         <p:spPr>
           <a:xfrm>
             <a:off x="573840" y="1755360"/>
-            <a:ext cx="9066960" cy="4385160"/>
+            <a:ext cx="9066600" cy="4384800"/>
           </a:xfrm>
           <a:prstGeom prst="rect">
             <a:avLst/>
@@ -19991,7 +19991,7 @@
         <p:spPr>
           <a:xfrm>
             <a:off x="579960" y="301320"/>
-            <a:ext cx="9066960" cy="1261440"/>
+            <a:ext cx="9066600" cy="1261080"/>
           </a:xfrm>
           <a:prstGeom prst="rect">
             <a:avLst/>
@@ -20053,7 +20053,7 @@
         <p:spPr>
           <a:xfrm>
             <a:off x="650160" y="1755360"/>
-            <a:ext cx="9066960" cy="4385160"/>
+            <a:ext cx="9066600" cy="4384800"/>
           </a:xfrm>
           <a:prstGeom prst="rect">
             <a:avLst/>
@@ -21553,7 +21553,7 @@
         <p:spPr>
           <a:xfrm>
             <a:off x="503640" y="301320"/>
-            <a:ext cx="9066960" cy="1261440"/>
+            <a:ext cx="9066600" cy="1261080"/>
           </a:xfrm>
           <a:prstGeom prst="rect">
             <a:avLst/>
@@ -21615,7 +21615,7 @@
         <p:spPr>
           <a:xfrm>
             <a:off x="573840" y="1755360"/>
-            <a:ext cx="9066960" cy="4385160"/>
+            <a:ext cx="9066600" cy="4384800"/>
           </a:xfrm>
           <a:prstGeom prst="rect">
             <a:avLst/>
@@ -21645,7 +21645,7 @@
         <p:spPr>
           <a:xfrm>
             <a:off x="932040" y="1838880"/>
-            <a:ext cx="8345160" cy="4507200"/>
+            <a:ext cx="8344800" cy="4506840"/>
           </a:xfrm>
           <a:prstGeom prst="rect">
             <a:avLst/>
@@ -21713,7 +21713,7 @@
         <p:spPr>
           <a:xfrm>
             <a:off x="503640" y="301320"/>
-            <a:ext cx="9066960" cy="1261440"/>
+            <a:ext cx="9066600" cy="1261080"/>
           </a:xfrm>
           <a:prstGeom prst="rect">
             <a:avLst/>
@@ -21775,7 +21775,7 @@
         <p:spPr>
           <a:xfrm>
             <a:off x="573840" y="1755360"/>
-            <a:ext cx="9066960" cy="4385160"/>
+            <a:ext cx="9066600" cy="4384800"/>
           </a:xfrm>
           <a:prstGeom prst="rect">
             <a:avLst/>
@@ -22577,7 +22577,7 @@
         <p:spPr>
           <a:xfrm>
             <a:off x="503640" y="301320"/>
-            <a:ext cx="9066960" cy="1261440"/>
+            <a:ext cx="9066600" cy="1261080"/>
           </a:xfrm>
           <a:prstGeom prst="rect">
             <a:avLst/>
@@ -24120,7 +24120,7 @@
         <p:spPr>
           <a:xfrm>
             <a:off x="468000" y="2700720"/>
-            <a:ext cx="9065880" cy="1260360"/>
+            <a:ext cx="9065520" cy="1260000"/>
           </a:xfrm>
           <a:prstGeom prst="rect">
             <a:avLst/>
@@ -24231,7 +24231,7 @@
         <p:spPr>
           <a:xfrm>
             <a:off x="503640" y="301320"/>
-            <a:ext cx="9065160" cy="1259640"/>
+            <a:ext cx="9064800" cy="1259280"/>
           </a:xfrm>
           <a:prstGeom prst="rect">
             <a:avLst/>
@@ -24297,7 +24297,7 @@
         <p:spPr>
           <a:xfrm>
             <a:off x="62280" y="2110320"/>
-            <a:ext cx="9771840" cy="4007520"/>
+            <a:ext cx="9771480" cy="4007160"/>
           </a:xfrm>
           <a:prstGeom prst="rect">
             <a:avLst/>
@@ -24365,7 +24365,7 @@
         <p:spPr>
           <a:xfrm>
             <a:off x="468000" y="2700720"/>
-            <a:ext cx="9065160" cy="1259640"/>
+            <a:ext cx="9064800" cy="1259280"/>
           </a:xfrm>
           <a:prstGeom prst="rect">
             <a:avLst/>
@@ -24467,16 +24467,39 @@
           <a:chExt cx="0" cy="0"/>
         </a:xfrm>
       </p:grpSpPr>
-      <p:sp>
-        <p:nvSpPr>
-          <p:cNvPr id="303" name="CustomShape 1"/>
+      <p:pic>
+        <p:nvPicPr>
+          <p:cNvPr id="303" name="Shape 289" descr=""/>
+          <p:cNvPicPr/>
+          <p:nvPr/>
+        </p:nvPicPr>
+        <p:blipFill>
+          <a:blip r:embed="rId1"/>
+          <a:stretch/>
+        </p:blipFill>
+        <p:spPr>
+          <a:xfrm>
+            <a:off x="1073160" y="1829160"/>
+            <a:ext cx="7911000" cy="4619880"/>
+          </a:xfrm>
+          <a:prstGeom prst="rect">
+            <a:avLst/>
+          </a:prstGeom>
+          <a:ln>
+            <a:noFill/>
+          </a:ln>
+        </p:spPr>
+      </p:pic>
+      <p:sp>
+        <p:nvSpPr>
+          <p:cNvPr id="304" name="CustomShape 1"/>
           <p:cNvSpPr/>
           <p:nvPr/>
         </p:nvSpPr>
         <p:spPr>
           <a:xfrm>
             <a:off x="503640" y="301320"/>
-            <a:ext cx="9065160" cy="1259640"/>
+            <a:ext cx="9066240" cy="1260000"/>
           </a:xfrm>
           <a:prstGeom prst="rect">
             <a:avLst/>
@@ -24529,29 +24552,6 @@
           </a:p>
         </p:txBody>
       </p:sp>
-      <p:pic>
-        <p:nvPicPr>
-          <p:cNvPr id="304" name="Shape 284" descr=""/>
-          <p:cNvPicPr/>
-          <p:nvPr/>
-        </p:nvPicPr>
-        <p:blipFill>
-          <a:blip r:embed="rId1"/>
-          <a:stretch/>
-        </p:blipFill>
-        <p:spPr>
-          <a:xfrm>
-            <a:off x="1300320" y="1980360"/>
-            <a:ext cx="7142400" cy="4377960"/>
-          </a:xfrm>
-          <a:prstGeom prst="rect">
-            <a:avLst/>
-          </a:prstGeom>
-          <a:ln>
-            <a:noFill/>
-          </a:ln>
-        </p:spPr>
-      </p:pic>
     </p:spTree>
   </p:cSld>
   <p:timing>
@@ -24601,39 +24601,16 @@
           <a:chExt cx="0" cy="0"/>
         </a:xfrm>
       </p:grpSpPr>
-      <p:pic>
-        <p:nvPicPr>
-          <p:cNvPr id="305" name="Shape 289" descr=""/>
-          <p:cNvPicPr/>
-          <p:nvPr/>
-        </p:nvPicPr>
-        <p:blipFill>
-          <a:blip r:embed="rId1"/>
-          <a:stretch/>
-        </p:blipFill>
-        <p:spPr>
-          <a:xfrm>
-            <a:off x="1073160" y="1829160"/>
-            <a:ext cx="7911360" cy="4620240"/>
-          </a:xfrm>
-          <a:prstGeom prst="rect">
-            <a:avLst/>
-          </a:prstGeom>
-          <a:ln>
-            <a:noFill/>
-          </a:ln>
-        </p:spPr>
-      </p:pic>
-      <p:sp>
-        <p:nvSpPr>
-          <p:cNvPr id="306" name="CustomShape 1"/>
+      <p:sp>
+        <p:nvSpPr>
+          <p:cNvPr id="305" name="CustomShape 1"/>
           <p:cNvSpPr/>
           <p:nvPr/>
         </p:nvSpPr>
         <p:spPr>
           <a:xfrm>
             <a:off x="503640" y="301320"/>
-            <a:ext cx="9066600" cy="1260360"/>
+            <a:ext cx="9064800" cy="1259280"/>
           </a:xfrm>
           <a:prstGeom prst="rect">
             <a:avLst/>
@@ -24670,7 +24647,7 @@
                 <a:latin typeface="Arial"/>
                 <a:ea typeface="Arial"/>
               </a:rPr>
-              <a:t>Decision Trees</a:t>
+              <a:t>Random Forest</a:t>
             </a:r>
             <a:endParaRPr b="0" lang="en-US" sz="4400" spc="-1" strike="noStrike">
               <a:solidFill>
@@ -24686,6 +24663,29 @@
           </a:p>
         </p:txBody>
       </p:sp>
+      <p:pic>
+        <p:nvPicPr>
+          <p:cNvPr id="306" name="Shape 296" descr=""/>
+          <p:cNvPicPr/>
+          <p:nvPr/>
+        </p:nvPicPr>
+        <p:blipFill>
+          <a:blip r:embed="rId1"/>
+          <a:stretch/>
+        </p:blipFill>
+        <p:spPr>
+          <a:xfrm>
+            <a:off x="60120" y="2120040"/>
+            <a:ext cx="9772560" cy="3997440"/>
+          </a:xfrm>
+          <a:prstGeom prst="rect">
+            <a:avLst/>
+          </a:prstGeom>
+          <a:ln>
+            <a:noFill/>
+          </a:ln>
+        </p:spPr>
+      </p:pic>
     </p:spTree>
   </p:cSld>
   <p:timing>
@@ -24735,16 +24735,39 @@
           <a:chExt cx="0" cy="0"/>
         </a:xfrm>
       </p:grpSpPr>
-      <p:sp>
-        <p:nvSpPr>
-          <p:cNvPr id="307" name="CustomShape 1"/>
+      <p:pic>
+        <p:nvPicPr>
+          <p:cNvPr id="307" name="Shape 301" descr=""/>
+          <p:cNvPicPr/>
+          <p:nvPr/>
+        </p:nvPicPr>
+        <p:blipFill>
+          <a:blip r:embed="rId1"/>
+          <a:stretch/>
+        </p:blipFill>
+        <p:spPr>
+          <a:xfrm>
+            <a:off x="205200" y="1427400"/>
+            <a:ext cx="9588600" cy="5599800"/>
+          </a:xfrm>
+          <a:prstGeom prst="rect">
+            <a:avLst/>
+          </a:prstGeom>
+          <a:ln>
+            <a:noFill/>
+          </a:ln>
+        </p:spPr>
+      </p:pic>
+      <p:sp>
+        <p:nvSpPr>
+          <p:cNvPr id="308" name="CustomShape 1"/>
           <p:cNvSpPr/>
           <p:nvPr/>
         </p:nvSpPr>
         <p:spPr>
           <a:xfrm>
             <a:off x="503640" y="301320"/>
-            <a:ext cx="9065160" cy="1259640"/>
+            <a:ext cx="9066240" cy="1260000"/>
           </a:xfrm>
           <a:prstGeom prst="rect">
             <a:avLst/>
@@ -24781,7 +24804,7 @@
                 <a:latin typeface="Arial"/>
                 <a:ea typeface="Arial"/>
               </a:rPr>
-              <a:t>Random Forest</a:t>
+              <a:t>Random Forests</a:t>
             </a:r>
             <a:endParaRPr b="0" lang="en-US" sz="4400" spc="-1" strike="noStrike">
               <a:solidFill>
@@ -24797,29 +24820,6 @@
           </a:p>
         </p:txBody>
       </p:sp>
-      <p:pic>
-        <p:nvPicPr>
-          <p:cNvPr id="308" name="Shape 296" descr=""/>
-          <p:cNvPicPr/>
-          <p:nvPr/>
-        </p:nvPicPr>
-        <p:blipFill>
-          <a:blip r:embed="rId1"/>
-          <a:stretch/>
-        </p:blipFill>
-        <p:spPr>
-          <a:xfrm>
-            <a:off x="60120" y="2120040"/>
-            <a:ext cx="9772920" cy="3997800"/>
-          </a:xfrm>
-          <a:prstGeom prst="rect">
-            <a:avLst/>
-          </a:prstGeom>
-          <a:ln>
-            <a:noFill/>
-          </a:ln>
-        </p:spPr>
-      </p:pic>
     </p:spTree>
   </p:cSld>
   <p:timing>
@@ -24869,39 +24869,16 @@
           <a:chExt cx="0" cy="0"/>
         </a:xfrm>
       </p:grpSpPr>
-      <p:pic>
-        <p:nvPicPr>
-          <p:cNvPr id="309" name="Shape 301" descr=""/>
-          <p:cNvPicPr/>
-          <p:nvPr/>
-        </p:nvPicPr>
-        <p:blipFill>
-          <a:blip r:embed="rId1"/>
-          <a:stretch/>
-        </p:blipFill>
-        <p:spPr>
-          <a:xfrm>
-            <a:off x="205200" y="1427400"/>
-            <a:ext cx="9588960" cy="5600160"/>
-          </a:xfrm>
-          <a:prstGeom prst="rect">
-            <a:avLst/>
-          </a:prstGeom>
-          <a:ln>
-            <a:noFill/>
-          </a:ln>
-        </p:spPr>
-      </p:pic>
-      <p:sp>
-        <p:nvSpPr>
-          <p:cNvPr id="310" name="CustomShape 1"/>
+      <p:sp>
+        <p:nvSpPr>
+          <p:cNvPr id="309" name="CustomShape 1"/>
           <p:cNvSpPr/>
           <p:nvPr/>
         </p:nvSpPr>
         <p:spPr>
           <a:xfrm>
             <a:off x="503640" y="301320"/>
-            <a:ext cx="9066600" cy="1260360"/>
+            <a:ext cx="9064800" cy="1259280"/>
           </a:xfrm>
           <a:prstGeom prst="rect">
             <a:avLst/>
@@ -24938,7 +24915,7 @@
                 <a:latin typeface="Arial"/>
                 <a:ea typeface="Arial"/>
               </a:rPr>
-              <a:t>Random Forests</a:t>
+              <a:t>Gradient Boosting</a:t>
             </a:r>
             <a:endParaRPr b="0" lang="en-US" sz="4400" spc="-1" strike="noStrike">
               <a:solidFill>
@@ -24954,6 +24931,29 @@
           </a:p>
         </p:txBody>
       </p:sp>
+      <p:pic>
+        <p:nvPicPr>
+          <p:cNvPr id="310" name="" descr=""/>
+          <p:cNvPicPr/>
+          <p:nvPr/>
+        </p:nvPicPr>
+        <p:blipFill>
+          <a:blip r:embed="rId1"/>
+          <a:stretch/>
+        </p:blipFill>
+        <p:spPr>
+          <a:xfrm>
+            <a:off x="29160" y="1916280"/>
+            <a:ext cx="9937440" cy="4060440"/>
+          </a:xfrm>
+          <a:prstGeom prst="rect">
+            <a:avLst/>
+          </a:prstGeom>
+          <a:ln>
+            <a:noFill/>
+          </a:ln>
+        </p:spPr>
+      </p:pic>
     </p:spTree>
   </p:cSld>
   <p:timing>
@@ -25003,16 +25003,39 @@
           <a:chExt cx="0" cy="0"/>
         </a:xfrm>
       </p:grpSpPr>
-      <p:sp>
-        <p:nvSpPr>
-          <p:cNvPr id="311" name="CustomShape 1"/>
+      <p:pic>
+        <p:nvPicPr>
+          <p:cNvPr id="311" name="Shape 313" descr=""/>
+          <p:cNvPicPr/>
+          <p:nvPr/>
+        </p:nvPicPr>
+        <p:blipFill>
+          <a:blip r:embed="rId1"/>
+          <a:stretch/>
+        </p:blipFill>
+        <p:spPr>
+          <a:xfrm>
+            <a:off x="135000" y="1313640"/>
+            <a:ext cx="9599760" cy="5606280"/>
+          </a:xfrm>
+          <a:prstGeom prst="rect">
+            <a:avLst/>
+          </a:prstGeom>
+          <a:ln>
+            <a:noFill/>
+          </a:ln>
+        </p:spPr>
+      </p:pic>
+      <p:sp>
+        <p:nvSpPr>
+          <p:cNvPr id="312" name="CustomShape 1"/>
           <p:cNvSpPr/>
           <p:nvPr/>
         </p:nvSpPr>
         <p:spPr>
           <a:xfrm>
             <a:off x="503640" y="301320"/>
-            <a:ext cx="9065160" cy="1259640"/>
+            <a:ext cx="9066240" cy="1260000"/>
           </a:xfrm>
           <a:prstGeom prst="rect">
             <a:avLst/>
@@ -25065,29 +25088,6 @@
           </a:p>
         </p:txBody>
       </p:sp>
-      <p:pic>
-        <p:nvPicPr>
-          <p:cNvPr id="312" name="" descr=""/>
-          <p:cNvPicPr/>
-          <p:nvPr/>
-        </p:nvPicPr>
-        <p:blipFill>
-          <a:blip r:embed="rId1"/>
-          <a:stretch/>
-        </p:blipFill>
-        <p:spPr>
-          <a:xfrm>
-            <a:off x="29160" y="1916280"/>
-            <a:ext cx="9937800" cy="4060800"/>
-          </a:xfrm>
-          <a:prstGeom prst="rect">
-            <a:avLst/>
-          </a:prstGeom>
-          <a:ln>
-            <a:noFill/>
-          </a:ln>
-        </p:spPr>
-      </p:pic>
     </p:spTree>
   </p:cSld>
   <p:timing>
@@ -25137,39 +25137,16 @@
           <a:chExt cx="0" cy="0"/>
         </a:xfrm>
       </p:grpSpPr>
-      <p:pic>
-        <p:nvPicPr>
-          <p:cNvPr id="313" name="Shape 313" descr=""/>
-          <p:cNvPicPr/>
-          <p:nvPr/>
-        </p:nvPicPr>
-        <p:blipFill>
-          <a:blip r:embed="rId1"/>
-          <a:stretch/>
-        </p:blipFill>
-        <p:spPr>
-          <a:xfrm>
-            <a:off x="135000" y="1313640"/>
-            <a:ext cx="9600120" cy="5606640"/>
-          </a:xfrm>
-          <a:prstGeom prst="rect">
-            <a:avLst/>
-          </a:prstGeom>
-          <a:ln>
-            <a:noFill/>
-          </a:ln>
-        </p:spPr>
-      </p:pic>
-      <p:sp>
-        <p:nvSpPr>
-          <p:cNvPr id="314" name="CustomShape 1"/>
+      <p:sp>
+        <p:nvSpPr>
+          <p:cNvPr id="313" name="CustomShape 1"/>
           <p:cNvSpPr/>
           <p:nvPr/>
         </p:nvSpPr>
         <p:spPr>
           <a:xfrm>
-            <a:off x="503640" y="301320"/>
-            <a:ext cx="9066600" cy="1260360"/>
+            <a:off x="548640" y="-162000"/>
+            <a:ext cx="9064800" cy="1259280"/>
           </a:xfrm>
           <a:prstGeom prst="rect">
             <a:avLst/>
@@ -25206,7 +25183,7 @@
                 <a:latin typeface="Arial"/>
                 <a:ea typeface="Arial"/>
               </a:rPr>
-              <a:t>Gradient Boosting</a:t>
+              <a:t>Tree Based Variable Importance</a:t>
             </a:r>
             <a:endParaRPr b="0" lang="en-US" sz="4400" spc="-1" strike="noStrike">
               <a:solidFill>
@@ -25222,6 +25199,75 @@
           </a:p>
         </p:txBody>
       </p:sp>
+      <p:pic>
+        <p:nvPicPr>
+          <p:cNvPr id="314" name="Shape 284" descr=""/>
+          <p:cNvPicPr/>
+          <p:nvPr/>
+        </p:nvPicPr>
+        <p:blipFill>
+          <a:blip r:embed="rId1"/>
+          <a:stretch/>
+        </p:blipFill>
+        <p:spPr>
+          <a:xfrm>
+            <a:off x="60120" y="786960"/>
+            <a:ext cx="5015160" cy="3074040"/>
+          </a:xfrm>
+          <a:prstGeom prst="rect">
+            <a:avLst/>
+          </a:prstGeom>
+          <a:ln>
+            <a:noFill/>
+          </a:ln>
+        </p:spPr>
+      </p:pic>
+      <p:pic>
+        <p:nvPicPr>
+          <p:cNvPr id="315" name="" descr=""/>
+          <p:cNvPicPr/>
+          <p:nvPr/>
+        </p:nvPicPr>
+        <p:blipFill>
+          <a:blip r:embed="rId2"/>
+          <a:stretch/>
+        </p:blipFill>
+        <p:spPr>
+          <a:xfrm>
+            <a:off x="5081760" y="812160"/>
+            <a:ext cx="4938480" cy="3031920"/>
+          </a:xfrm>
+          <a:prstGeom prst="rect">
+            <a:avLst/>
+          </a:prstGeom>
+          <a:ln>
+            <a:noFill/>
+          </a:ln>
+        </p:spPr>
+      </p:pic>
+      <p:pic>
+        <p:nvPicPr>
+          <p:cNvPr id="316" name="" descr=""/>
+          <p:cNvPicPr/>
+          <p:nvPr/>
+        </p:nvPicPr>
+        <p:blipFill>
+          <a:blip r:embed="rId3"/>
+          <a:stretch/>
+        </p:blipFill>
+        <p:spPr>
+          <a:xfrm>
+            <a:off x="2286000" y="3900600"/>
+            <a:ext cx="5873400" cy="3597480"/>
+          </a:xfrm>
+          <a:prstGeom prst="rect">
+            <a:avLst/>
+          </a:prstGeom>
+          <a:ln>
+            <a:noFill/>
+          </a:ln>
+        </p:spPr>
+      </p:pic>
     </p:spTree>
   </p:cSld>
   <p:timing>
@@ -25273,14 +25319,14 @@
       </p:grpSpPr>
       <p:sp>
         <p:nvSpPr>
-          <p:cNvPr id="315" name="CustomShape 1"/>
+          <p:cNvPr id="317" name="CustomShape 1"/>
           <p:cNvSpPr/>
           <p:nvPr/>
         </p:nvSpPr>
         <p:spPr>
           <a:xfrm>
             <a:off x="503640" y="301320"/>
-            <a:ext cx="9066240" cy="1260000"/>
+            <a:ext cx="9065880" cy="1259640"/>
           </a:xfrm>
           <a:prstGeom prst="rect">
             <a:avLst/>
@@ -25368,14 +25414,14 @@
       </p:sp>
       <p:sp>
         <p:nvSpPr>
-          <p:cNvPr id="316" name="CustomShape 2"/>
+          <p:cNvPr id="318" name="CustomShape 2"/>
           <p:cNvSpPr/>
           <p:nvPr/>
         </p:nvSpPr>
         <p:spPr>
           <a:xfrm>
             <a:off x="503640" y="1769040"/>
-            <a:ext cx="9066240" cy="4383360"/>
+            <a:ext cx="9065880" cy="4383000"/>
           </a:xfrm>
           <a:prstGeom prst="rect">
             <a:avLst/>
@@ -25394,13 +25440,13 @@
       </p:sp>
       <p:graphicFrame>
         <p:nvGraphicFramePr>
-          <p:cNvPr id="317" name="Object 3"/>
+          <p:cNvPr id="319" name="Object 3"/>
           <p:cNvGraphicFramePr/>
           <p:nvPr/>
         </p:nvGraphicFramePr>
         <p:xfrm>
           <a:off x="922320" y="2195280"/>
-          <a:ext cx="8453880" cy="2286000"/>
+          <a:ext cx="8453520" cy="2285640"/>
         </p:xfrm>
         <a:graphic>
           <a:graphicData uri="http://schemas.openxmlformats.org/presentationml/2006/ole">
@@ -25408,7 +25454,7 @@
               <p:embed/>
               <p:pic>
                 <p:nvPicPr>
-                  <p:cNvPr id="318" name="" descr=""/>
+                  <p:cNvPr id="320" name="" descr=""/>
                   <p:cNvPicPr/>
                   <p:nvPr/>
                 </p:nvPicPr>
@@ -25419,7 +25465,7 @@
                 <p:spPr>
                   <a:xfrm>
                     <a:off x="922320" y="2195280"/>
-                    <a:ext cx="8453880" cy="2286000"/>
+                    <a:ext cx="8453520" cy="2285640"/>
                   </a:xfrm>
                   <a:prstGeom prst="rect">
                     <a:avLst/>
@@ -25484,14 +25530,14 @@
       </p:grpSpPr>
       <p:sp>
         <p:nvSpPr>
-          <p:cNvPr id="319" name="CustomShape 1"/>
+          <p:cNvPr id="321" name="CustomShape 1"/>
           <p:cNvSpPr/>
           <p:nvPr/>
         </p:nvSpPr>
         <p:spPr>
           <a:xfrm>
             <a:off x="182520" y="1920600"/>
-            <a:ext cx="2649240" cy="2468160"/>
+            <a:ext cx="2648880" cy="2467800"/>
           </a:xfrm>
           <a:prstGeom prst="rect">
             <a:avLst/>
@@ -25514,14 +25560,14 @@
       </p:sp>
       <p:sp>
         <p:nvSpPr>
-          <p:cNvPr id="320" name="CustomShape 2"/>
+          <p:cNvPr id="322" name="CustomShape 2"/>
           <p:cNvSpPr/>
           <p:nvPr/>
         </p:nvSpPr>
         <p:spPr>
           <a:xfrm>
             <a:off x="833760" y="277200"/>
-            <a:ext cx="8408160" cy="1368000"/>
+            <a:ext cx="8407800" cy="1367640"/>
           </a:xfrm>
           <a:prstGeom prst="rect">
             <a:avLst/>
@@ -25719,7 +25765,7 @@
       </p:sp>
       <p:pic>
         <p:nvPicPr>
-          <p:cNvPr id="321" name="" descr=""/>
+          <p:cNvPr id="323" name="" descr=""/>
           <p:cNvPicPr/>
           <p:nvPr/>
         </p:nvPicPr>
@@ -25730,7 +25776,7 @@
         <p:spPr>
           <a:xfrm>
             <a:off x="3747240" y="1554840"/>
-            <a:ext cx="5848560" cy="4788000"/>
+            <a:ext cx="5848200" cy="4787640"/>
           </a:xfrm>
           <a:prstGeom prst="rect">
             <a:avLst/>
@@ -25742,14 +25788,14 @@
       </p:pic>
       <p:sp>
         <p:nvSpPr>
-          <p:cNvPr id="322" name="CustomShape 3"/>
+          <p:cNvPr id="324" name="CustomShape 3"/>
           <p:cNvSpPr/>
           <p:nvPr/>
         </p:nvSpPr>
         <p:spPr>
           <a:xfrm>
             <a:off x="273960" y="2286720"/>
-            <a:ext cx="3288960" cy="1637640"/>
+            <a:ext cx="3288600" cy="1637280"/>
           </a:xfrm>
           <a:prstGeom prst="rect">
             <a:avLst/>
@@ -25881,14 +25927,14 @@
       </p:sp>
       <p:sp>
         <p:nvSpPr>
-          <p:cNvPr id="323" name="CustomShape 4"/>
+          <p:cNvPr id="325" name="CustomShape 4"/>
           <p:cNvSpPr/>
           <p:nvPr/>
         </p:nvSpPr>
         <p:spPr>
           <a:xfrm>
             <a:off x="2924640" y="2926800"/>
-            <a:ext cx="1004040" cy="455760"/>
+            <a:ext cx="1003680" cy="455400"/>
           </a:xfrm>
           <a:custGeom>
             <a:avLst/>
@@ -25945,14 +25991,14 @@
       </p:sp>
       <p:sp>
         <p:nvSpPr>
-          <p:cNvPr id="324" name="CustomShape 5"/>
+          <p:cNvPr id="326" name="CustomShape 5"/>
           <p:cNvSpPr/>
           <p:nvPr/>
         </p:nvSpPr>
         <p:spPr>
           <a:xfrm>
             <a:off x="456840" y="6585840"/>
-            <a:ext cx="3289320" cy="456120"/>
+            <a:ext cx="3288960" cy="455760"/>
           </a:xfrm>
           <a:prstGeom prst="rect">
             <a:avLst/>
@@ -25999,6 +26045,211 @@
             </a:endParaRPr>
           </a:p>
         </p:txBody>
+      </p:sp>
+      <p:sp>
+        <p:nvSpPr>
+          <p:cNvPr id="327" name="CustomShape 6"/>
+          <p:cNvSpPr/>
+          <p:nvPr/>
+        </p:nvSpPr>
+        <p:spPr>
+          <a:xfrm>
+            <a:off x="185760" y="4555800"/>
+            <a:ext cx="2648880" cy="1097280"/>
+          </a:xfrm>
+          <a:prstGeom prst="rect">
+            <a:avLst/>
+          </a:prstGeom>
+          <a:solidFill>
+            <a:srgbClr val="b0c4de"/>
+          </a:solidFill>
+          <a:ln>
+            <a:solidFill>
+              <a:srgbClr val="3465a4"/>
+            </a:solidFill>
+          </a:ln>
+        </p:spPr>
+        <p:style>
+          <a:lnRef idx="0"/>
+          <a:fillRef idx="0"/>
+          <a:effectRef idx="0"/>
+          <a:fontRef idx="minor"/>
+        </p:style>
+      </p:sp>
+      <p:sp>
+        <p:nvSpPr>
+          <p:cNvPr id="328" name="CustomShape 7"/>
+          <p:cNvSpPr/>
+          <p:nvPr/>
+        </p:nvSpPr>
+        <p:spPr>
+          <a:xfrm>
+            <a:off x="186120" y="4021200"/>
+            <a:ext cx="3288600" cy="1637280"/>
+          </a:xfrm>
+          <a:prstGeom prst="rect">
+            <a:avLst/>
+          </a:prstGeom>
+          <a:noFill/>
+          <a:ln>
+            <a:noFill/>
+          </a:ln>
+        </p:spPr>
+        <p:style>
+          <a:lnRef idx="0"/>
+          <a:fillRef idx="0"/>
+          <a:effectRef idx="0"/>
+          <a:fontRef idx="minor"/>
+        </p:style>
+        <p:txBody>
+          <a:bodyPr lIns="90000" rIns="90000" tIns="45000" bIns="45000"/>
+          <a:p>
+            <a:endParaRPr b="0" lang="en-US" sz="1800" spc="-1" strike="noStrike">
+              <a:solidFill>
+                <a:srgbClr val="000000"/>
+              </a:solidFill>
+              <a:uFill>
+                <a:solidFill>
+                  <a:srgbClr val="ffffff"/>
+                </a:solidFill>
+              </a:uFill>
+              <a:latin typeface="Arial"/>
+            </a:endParaRPr>
+          </a:p>
+          <a:p>
+            <a:endParaRPr b="0" lang="en-US" sz="1800" spc="-1" strike="noStrike">
+              <a:solidFill>
+                <a:srgbClr val="000000"/>
+              </a:solidFill>
+              <a:uFill>
+                <a:solidFill>
+                  <a:srgbClr val="ffffff"/>
+                </a:solidFill>
+              </a:uFill>
+              <a:latin typeface="Arial"/>
+            </a:endParaRPr>
+          </a:p>
+          <a:p>
+            <a:r>
+              <a:rPr b="0" lang="en-US" sz="2200" spc="-1" strike="noStrike">
+                <a:solidFill>
+                  <a:srgbClr val="000000"/>
+                </a:solidFill>
+                <a:uFill>
+                  <a:solidFill>
+                    <a:srgbClr val="ffffff"/>
+                  </a:solidFill>
+                </a:uFill>
+                <a:latin typeface="Arial"/>
+                <a:ea typeface="DejaVu Sans"/>
+              </a:rPr>
+              <a:t>Lasso </a:t>
+            </a:r>
+            <a:endParaRPr b="0" lang="en-US" sz="2200" spc="-1" strike="noStrike">
+              <a:solidFill>
+                <a:srgbClr val="000000"/>
+              </a:solidFill>
+              <a:uFill>
+                <a:solidFill>
+                  <a:srgbClr val="ffffff"/>
+                </a:solidFill>
+              </a:uFill>
+              <a:latin typeface="Arial"/>
+            </a:endParaRPr>
+          </a:p>
+          <a:p>
+            <a:r>
+              <a:rPr b="0" lang="en-US" sz="2200" spc="-1" strike="noStrike">
+                <a:solidFill>
+                  <a:srgbClr val="000000"/>
+                </a:solidFill>
+                <a:uFill>
+                  <a:solidFill>
+                    <a:srgbClr val="ffffff"/>
+                  </a:solidFill>
+                </a:uFill>
+                <a:latin typeface="Arial"/>
+                <a:ea typeface="DejaVu Sans"/>
+              </a:rPr>
+              <a:t>Meta Regressor</a:t>
+            </a:r>
+            <a:endParaRPr b="0" lang="en-US" sz="2200" spc="-1" strike="noStrike">
+              <a:solidFill>
+                <a:srgbClr val="000000"/>
+              </a:solidFill>
+              <a:uFill>
+                <a:solidFill>
+                  <a:srgbClr val="ffffff"/>
+                </a:solidFill>
+              </a:uFill>
+              <a:latin typeface="Arial"/>
+            </a:endParaRPr>
+          </a:p>
+        </p:txBody>
+      </p:sp>
+      <p:sp>
+        <p:nvSpPr>
+          <p:cNvPr id="329" name="CustomShape 8"/>
+          <p:cNvSpPr/>
+          <p:nvPr/>
+        </p:nvSpPr>
+        <p:spPr>
+          <a:xfrm>
+            <a:off x="2926080" y="4756680"/>
+            <a:ext cx="2194560" cy="455400"/>
+          </a:xfrm>
+          <a:custGeom>
+            <a:avLst/>
+            <a:gdLst/>
+            <a:ahLst/>
+            <a:rect l="l" t="t" r="r" b="b"/>
+            <a:pathLst>
+              <a:path w="2796" h="1272">
+                <a:moveTo>
+                  <a:pt x="0" y="317"/>
+                </a:moveTo>
+                <a:lnTo>
+                  <a:pt x="2096" y="317"/>
+                </a:lnTo>
+                <a:lnTo>
+                  <a:pt x="2096" y="0"/>
+                </a:lnTo>
+                <a:lnTo>
+                  <a:pt x="2795" y="635"/>
+                </a:lnTo>
+                <a:lnTo>
+                  <a:pt x="2096" y="1271"/>
+                </a:lnTo>
+                <a:lnTo>
+                  <a:pt x="2096" y="953"/>
+                </a:lnTo>
+                <a:lnTo>
+                  <a:pt x="0" y="953"/>
+                </a:lnTo>
+                <a:lnTo>
+                  <a:pt x="349" y="635"/>
+                </a:lnTo>
+                <a:lnTo>
+                  <a:pt x="0" y="317"/>
+                </a:lnTo>
+              </a:path>
+            </a:pathLst>
+          </a:custGeom>
+          <a:solidFill>
+            <a:srgbClr val="729fcf"/>
+          </a:solidFill>
+          <a:ln>
+            <a:solidFill>
+              <a:srgbClr val="3465a4"/>
+            </a:solidFill>
+          </a:ln>
+        </p:spPr>
+        <p:style>
+          <a:lnRef idx="0"/>
+          <a:fillRef idx="0"/>
+          <a:effectRef idx="0"/>
+          <a:fontRef idx="minor"/>
+        </p:style>
       </p:sp>
     </p:spTree>
   </p:cSld>
@@ -26051,14 +26302,14 @@
       </p:grpSpPr>
       <p:sp>
         <p:nvSpPr>
-          <p:cNvPr id="325" name="CustomShape 1"/>
+          <p:cNvPr id="330" name="CustomShape 1"/>
           <p:cNvSpPr/>
           <p:nvPr/>
         </p:nvSpPr>
         <p:spPr>
           <a:xfrm>
             <a:off x="2227680" y="1063080"/>
-            <a:ext cx="5997240" cy="1335960"/>
+            <a:ext cx="5996880" cy="1335600"/>
           </a:xfrm>
           <a:prstGeom prst="rect">
             <a:avLst/>
@@ -26113,13 +26364,13 @@
       </p:sp>
       <p:graphicFrame>
         <p:nvGraphicFramePr>
-          <p:cNvPr id="326" name="Object 2"/>
+          <p:cNvPr id="331" name="Object 2"/>
           <p:cNvGraphicFramePr/>
           <p:nvPr/>
         </p:nvGraphicFramePr>
         <p:xfrm>
           <a:off x="1333800" y="3056400"/>
-          <a:ext cx="7877520" cy="1515960"/>
+          <a:ext cx="7877160" cy="1515600"/>
         </p:xfrm>
         <a:graphic>
           <a:graphicData uri="http://schemas.openxmlformats.org/presentationml/2006/ole">
@@ -26127,7 +26378,7 @@
               <p:embed/>
               <p:pic>
                 <p:nvPicPr>
-                  <p:cNvPr id="327" name="" descr=""/>
+                  <p:cNvPr id="332" name="" descr=""/>
                   <p:cNvPicPr/>
                   <p:nvPr/>
                 </p:nvPicPr>
@@ -26138,7 +26389,7 @@
                 <p:spPr>
                   <a:xfrm>
                     <a:off x="1333800" y="3056400"/>
-                    <a:ext cx="7877520" cy="1515960"/>
+                    <a:ext cx="7877160" cy="1515600"/>
                   </a:xfrm>
                   <a:prstGeom prst="rect">
                     <a:avLst/>
@@ -26203,13 +26454,13 @@
       </p:grpSpPr>
       <p:graphicFrame>
         <p:nvGraphicFramePr>
-          <p:cNvPr id="328" name="Object 1"/>
+          <p:cNvPr id="333" name="Object 1"/>
           <p:cNvGraphicFramePr/>
           <p:nvPr/>
         </p:nvGraphicFramePr>
         <p:xfrm>
           <a:off x="1279440" y="3018240"/>
-          <a:ext cx="7687440" cy="2656800"/>
+          <a:ext cx="7687080" cy="2656440"/>
         </p:xfrm>
         <a:graphic>
           <a:graphicData uri="http://schemas.openxmlformats.org/presentationml/2006/ole">
@@ -26217,7 +26468,7 @@
               <p:embed/>
               <p:pic>
                 <p:nvPicPr>
-                  <p:cNvPr id="329" name="" descr=""/>
+                  <p:cNvPr id="334" name="" descr=""/>
                   <p:cNvPicPr/>
                   <p:nvPr/>
                 </p:nvPicPr>
@@ -26228,7 +26479,7 @@
                 <p:spPr>
                   <a:xfrm>
                     <a:off x="1279440" y="3018240"/>
-                    <a:ext cx="7687440" cy="2656800"/>
+                    <a:ext cx="7687080" cy="2656440"/>
                   </a:xfrm>
                   <a:prstGeom prst="rect">
                     <a:avLst/>
@@ -26244,14 +26495,14 @@
       </p:graphicFrame>
       <p:sp>
         <p:nvSpPr>
-          <p:cNvPr id="330" name="CustomShape 2"/>
+          <p:cNvPr id="335" name="CustomShape 2"/>
           <p:cNvSpPr/>
           <p:nvPr/>
         </p:nvSpPr>
         <p:spPr>
           <a:xfrm>
             <a:off x="503640" y="301680"/>
-            <a:ext cx="9067680" cy="1261440"/>
+            <a:ext cx="9067320" cy="1261080"/>
           </a:xfrm>
           <a:prstGeom prst="rect">
             <a:avLst/>
@@ -26363,7 +26614,7 @@
         <p:spPr>
           <a:xfrm>
             <a:off x="503640" y="301320"/>
-            <a:ext cx="9065880" cy="1260360"/>
+            <a:ext cx="9065520" cy="1260000"/>
           </a:xfrm>
           <a:prstGeom prst="rect">
             <a:avLst/>
@@ -26429,7 +26680,7 @@
         <p:spPr>
           <a:xfrm>
             <a:off x="456840" y="1486800"/>
-            <a:ext cx="9235800" cy="5702040"/>
+            <a:ext cx="9235440" cy="5701680"/>
           </a:xfrm>
           <a:prstGeom prst="rect">
             <a:avLst/>
@@ -26490,14 +26741,14 @@
       </p:grpSpPr>
       <p:sp>
         <p:nvSpPr>
-          <p:cNvPr id="331" name="CustomShape 1"/>
+          <p:cNvPr id="336" name="CustomShape 1"/>
           <p:cNvSpPr/>
           <p:nvPr/>
         </p:nvSpPr>
         <p:spPr>
           <a:xfrm>
             <a:off x="503640" y="301320"/>
-            <a:ext cx="9067680" cy="1261440"/>
+            <a:ext cx="9067320" cy="1261080"/>
           </a:xfrm>
           <a:prstGeom prst="rect">
             <a:avLst/>
@@ -26552,14 +26803,14 @@
       </p:sp>
       <p:sp>
         <p:nvSpPr>
-          <p:cNvPr id="332" name="CustomShape 2"/>
+          <p:cNvPr id="337" name="CustomShape 2"/>
           <p:cNvSpPr/>
           <p:nvPr/>
         </p:nvSpPr>
         <p:spPr>
           <a:xfrm>
             <a:off x="503640" y="2108520"/>
-            <a:ext cx="9067680" cy="4384800"/>
+            <a:ext cx="9067320" cy="4384440"/>
           </a:xfrm>
           <a:prstGeom prst="rect">
             <a:avLst/>
@@ -26580,7 +26831,7 @@
             <a:normAutofit/>
           </a:bodyPr>
           <a:p>
-            <a:pPr marL="432000" indent="-323280">
+            <a:pPr marL="432000" indent="-322920">
               <a:lnSpc>
                 <a:spcPct val="100000"/>
               </a:lnSpc>
@@ -26622,7 +26873,7 @@
             </a:endParaRPr>
           </a:p>
           <a:p>
-            <a:pPr lvl="1" marL="864000" indent="-323280">
+            <a:pPr lvl="1" marL="864000" indent="-322920">
               <a:lnSpc>
                 <a:spcPct val="100000"/>
               </a:lnSpc>
@@ -26664,7 +26915,7 @@
             </a:endParaRPr>
           </a:p>
           <a:p>
-            <a:pPr lvl="2" marL="1296000" indent="-287280">
+            <a:pPr lvl="2" marL="1296000" indent="-286920">
               <a:lnSpc>
                 <a:spcPct val="100000"/>
               </a:lnSpc>
@@ -26706,7 +26957,7 @@
             </a:endParaRPr>
           </a:p>
           <a:p>
-            <a:pPr lvl="1" marL="864000" indent="-323280">
+            <a:pPr lvl="1" marL="864000" indent="-322920">
               <a:lnSpc>
                 <a:spcPct val="100000"/>
               </a:lnSpc>
@@ -26748,7 +26999,7 @@
             </a:endParaRPr>
           </a:p>
           <a:p>
-            <a:pPr marL="432000" indent="-323280">
+            <a:pPr marL="432000" indent="-322920">
               <a:lnSpc>
                 <a:spcPct val="100000"/>
               </a:lnSpc>
@@ -26790,7 +27041,7 @@
             </a:endParaRPr>
           </a:p>
           <a:p>
-            <a:pPr lvl="1" marL="864000" indent="-323280">
+            <a:pPr lvl="1" marL="864000" indent="-322920">
               <a:lnSpc>
                 <a:spcPct val="100000"/>
               </a:lnSpc>
@@ -26846,7 +27097,7 @@
             </a:endParaRPr>
           </a:p>
           <a:p>
-            <a:pPr lvl="1" marL="864000" indent="-323280">
+            <a:pPr lvl="1" marL="864000" indent="-322920">
               <a:lnSpc>
                 <a:spcPct val="100000"/>
               </a:lnSpc>
@@ -26961,7 +27212,7 @@
         <p:spPr>
           <a:xfrm>
             <a:off x="539640" y="180000"/>
-            <a:ext cx="9065160" cy="1259640"/>
+            <a:ext cx="9064800" cy="1259280"/>
           </a:xfrm>
           <a:prstGeom prst="rect">
             <a:avLst/>
@@ -27027,7 +27278,7 @@
         <p:spPr>
           <a:xfrm>
             <a:off x="539640" y="1224720"/>
-            <a:ext cx="9282960" cy="5922000"/>
+            <a:ext cx="9282600" cy="5921640"/>
           </a:xfrm>
           <a:prstGeom prst="rect">
             <a:avLst/>
@@ -27095,7 +27346,7 @@
         <p:spPr>
           <a:xfrm>
             <a:off x="503640" y="301320"/>
-            <a:ext cx="9065160" cy="1259640"/>
+            <a:ext cx="9064800" cy="1259280"/>
           </a:xfrm>
           <a:prstGeom prst="rect">
             <a:avLst/>
@@ -27161,7 +27412,7 @@
         <p:spPr>
           <a:xfrm>
             <a:off x="1079280" y="1440360"/>
-            <a:ext cx="8157240" cy="5204160"/>
+            <a:ext cx="8156880" cy="5203800"/>
           </a:xfrm>
           <a:prstGeom prst="rect">
             <a:avLst/>
@@ -27229,7 +27480,7 @@
         <p:spPr>
           <a:xfrm>
             <a:off x="503640" y="301320"/>
-            <a:ext cx="9065160" cy="1259640"/>
+            <a:ext cx="9064800" cy="1259280"/>
           </a:xfrm>
           <a:prstGeom prst="rect">
             <a:avLst/>
@@ -27295,7 +27546,7 @@
         <p:spPr>
           <a:xfrm>
             <a:off x="1233360" y="1800360"/>
-            <a:ext cx="7390800" cy="4714920"/>
+            <a:ext cx="7390440" cy="4714560"/>
           </a:xfrm>
           <a:prstGeom prst="rect">
             <a:avLst/>
@@ -27363,7 +27614,7 @@
         <p:spPr>
           <a:xfrm>
             <a:off x="503640" y="301320"/>
-            <a:ext cx="9066240" cy="1260720"/>
+            <a:ext cx="9065880" cy="1260360"/>
           </a:xfrm>
           <a:prstGeom prst="rect">
             <a:avLst/>
@@ -27429,7 +27680,7 @@
         <p:spPr>
           <a:xfrm>
             <a:off x="955440" y="1756080"/>
-            <a:ext cx="7887600" cy="5670000"/>
+            <a:ext cx="7887240" cy="5669640"/>
           </a:xfrm>
           <a:prstGeom prst="rect">
             <a:avLst/>
@@ -27497,7 +27748,7 @@
         <p:spPr>
           <a:xfrm>
             <a:off x="503640" y="301320"/>
-            <a:ext cx="9066240" cy="1260720"/>
+            <a:ext cx="9065880" cy="1260360"/>
           </a:xfrm>
           <a:prstGeom prst="rect">
             <a:avLst/>
@@ -27563,7 +27814,7 @@
         <p:spPr>
           <a:xfrm>
             <a:off x="966600" y="1563840"/>
-            <a:ext cx="7825680" cy="5663160"/>
+            <a:ext cx="7825320" cy="5662800"/>
           </a:xfrm>
           <a:prstGeom prst="rect">
             <a:avLst/>

</xml_diff>